<commit_message>
Personas Version 1.0 fertig
</commit_message>
<xml_diff>
--- a/Personas und Szenarien/Personas_Redsign_RZ.pptx
+++ b/Personas und Szenarien/Personas_Redsign_RZ.pptx
@@ -4721,14 +4721,14 @@
           <p:nvPr>
             <p:extLst>
               <p:ext uri="{D42A27DB-BD31-4B8C-83A1-F6EECF244321}">
-                <p14:modId xmlns:p14="http://schemas.microsoft.com/office/powerpoint/2010/main" val="2838990688"/>
+                <p14:modId xmlns:p14="http://schemas.microsoft.com/office/powerpoint/2010/main" val="163185019"/>
               </p:ext>
             </p:extLst>
           </p:nvPr>
         </p:nvGraphicFramePr>
         <p:xfrm>
           <a:off x="3203848" y="1772816"/>
-          <a:ext cx="5472608" cy="3940399"/>
+          <a:ext cx="5472608" cy="4046222"/>
         </p:xfrm>
         <a:graphic>
           <a:graphicData uri="http://schemas.openxmlformats.org/drawingml/2006/table">
@@ -4841,16 +4841,6 @@
                         </a:rPr>
                         <a:t>48</a:t>
                       </a:r>
-                      <a:endParaRPr kumimoji="0" lang="en-US" sz="1000" b="0" i="0" u="none" strike="noStrike" cap="none" normalizeH="0" baseline="0" dirty="0" smtClean="0">
-                        <a:ln>
-                          <a:noFill/>
-                        </a:ln>
-                        <a:solidFill>
-                          <a:schemeClr val="tx1"/>
-                        </a:solidFill>
-                        <a:effectLst/>
-                        <a:latin typeface="Arial" charset="0"/>
-                      </a:endParaRPr>
                     </a:p>
                   </a:txBody>
                   <a:tcPr marL="90488" marR="90488" marT="44450" marB="44450" horzOverflow="overflow">
@@ -5027,16 +5017,6 @@
                         </a:rPr>
                         <a:t> </a:t>
                       </a:r>
-                      <a:endParaRPr kumimoji="0" lang="en-US" sz="1000" b="0" i="0" u="none" strike="noStrike" cap="none" normalizeH="0" baseline="0" dirty="0" smtClean="0">
-                        <a:ln>
-                          <a:noFill/>
-                        </a:ln>
-                        <a:solidFill>
-                          <a:schemeClr val="tx1"/>
-                        </a:solidFill>
-                        <a:effectLst/>
-                        <a:latin typeface="Arial" charset="0"/>
-                      </a:endParaRPr>
                     </a:p>
                   </a:txBody>
                   <a:tcPr marL="90488" marR="90488" marT="44450" marB="44450" horzOverflow="overflow">
@@ -5161,6 +5141,679 @@
                   <a:txBody>
                     <a:bodyPr/>
                     <a:lstStyle/>
+                    <a:p>
+                      <a:pPr marL="0" marR="0" lvl="0" indent="0" algn="l" defTabSz="914400" rtl="0" eaLnBrk="1" fontAlgn="base" latinLnBrk="0" hangingPunct="1">
+                        <a:lnSpc>
+                          <a:spcPct val="100000"/>
+                        </a:lnSpc>
+                        <a:spcBef>
+                          <a:spcPct val="20000"/>
+                        </a:spcBef>
+                        <a:spcAft>
+                          <a:spcPct val="0"/>
+                        </a:spcAft>
+                        <a:buClr>
+                          <a:schemeClr val="accent2"/>
+                        </a:buClr>
+                        <a:buSzPct val="100000"/>
+                        <a:buFont typeface="Wingdings" pitchFamily="2" charset="2"/>
+                        <a:buChar char="§"/>
+                        <a:tabLst/>
+                        <a:defRPr/>
+                      </a:pPr>
+                      <a:r>
+                        <a:rPr kumimoji="0" lang="en-US" sz="1000" b="0" i="0" u="none" strike="noStrike" cap="none" normalizeH="0" baseline="0" dirty="0" err="1" smtClean="0">
+                          <a:ln>
+                            <a:noFill/>
+                          </a:ln>
+                          <a:solidFill>
+                            <a:schemeClr val="tx1"/>
+                          </a:solidFill>
+                          <a:effectLst/>
+                          <a:latin typeface="Arial" charset="0"/>
+                        </a:rPr>
+                        <a:t>Ändert</a:t>
+                      </a:r>
+                      <a:r>
+                        <a:rPr kumimoji="0" lang="en-US" sz="1000" b="0" i="0" u="none" strike="noStrike" cap="none" normalizeH="0" baseline="0" dirty="0" smtClean="0">
+                          <a:ln>
+                            <a:noFill/>
+                          </a:ln>
+                          <a:solidFill>
+                            <a:schemeClr val="tx1"/>
+                          </a:solidFill>
+                          <a:effectLst/>
+                          <a:latin typeface="Arial" charset="0"/>
+                        </a:rPr>
+                        <a:t> sein </a:t>
+                      </a:r>
+                      <a:r>
+                        <a:rPr kumimoji="0" lang="en-US" sz="1000" b="0" i="0" u="none" strike="noStrike" cap="none" normalizeH="0" baseline="0" dirty="0" err="1" smtClean="0">
+                          <a:ln>
+                            <a:noFill/>
+                          </a:ln>
+                          <a:solidFill>
+                            <a:schemeClr val="tx1"/>
+                          </a:solidFill>
+                          <a:effectLst/>
+                          <a:latin typeface="Arial" charset="0"/>
+                        </a:rPr>
+                        <a:t>Passwort</a:t>
+                      </a:r>
+                      <a:r>
+                        <a:rPr kumimoji="0" lang="en-US" sz="1000" b="0" i="0" u="none" strike="noStrike" cap="none" normalizeH="0" baseline="0" dirty="0" smtClean="0">
+                          <a:ln>
+                            <a:noFill/>
+                          </a:ln>
+                          <a:solidFill>
+                            <a:schemeClr val="tx1"/>
+                          </a:solidFill>
+                          <a:effectLst/>
+                          <a:latin typeface="Arial" charset="0"/>
+                        </a:rPr>
+                        <a:t> </a:t>
+                      </a:r>
+                      <a:r>
+                        <a:rPr kumimoji="0" lang="en-US" sz="1000" b="0" i="0" u="none" strike="noStrike" cap="none" normalizeH="0" baseline="0" dirty="0" err="1" smtClean="0">
+                          <a:ln>
+                            <a:noFill/>
+                          </a:ln>
+                          <a:solidFill>
+                            <a:schemeClr val="tx1"/>
+                          </a:solidFill>
+                          <a:effectLst/>
+                          <a:latin typeface="Arial" charset="0"/>
+                        </a:rPr>
+                        <a:t>wenn</a:t>
+                      </a:r>
+                      <a:r>
+                        <a:rPr kumimoji="0" lang="en-US" sz="1000" b="0" i="0" u="none" strike="noStrike" cap="none" normalizeH="0" baseline="0" dirty="0" smtClean="0">
+                          <a:ln>
+                            <a:noFill/>
+                          </a:ln>
+                          <a:solidFill>
+                            <a:schemeClr val="tx1"/>
+                          </a:solidFill>
+                          <a:effectLst/>
+                          <a:latin typeface="Arial" charset="0"/>
+                        </a:rPr>
+                        <a:t> </a:t>
+                      </a:r>
+                      <a:r>
+                        <a:rPr kumimoji="0" lang="en-US" sz="1000" b="0" i="0" u="none" strike="noStrike" cap="none" normalizeH="0" baseline="0" dirty="0" err="1" smtClean="0">
+                          <a:ln>
+                            <a:noFill/>
+                          </a:ln>
+                          <a:solidFill>
+                            <a:schemeClr val="tx1"/>
+                          </a:solidFill>
+                          <a:effectLst/>
+                          <a:latin typeface="Arial" charset="0"/>
+                        </a:rPr>
+                        <a:t>er</a:t>
+                      </a:r>
+                      <a:r>
+                        <a:rPr kumimoji="0" lang="en-US" sz="1000" b="0" i="0" u="none" strike="noStrike" cap="none" normalizeH="0" baseline="0" dirty="0" smtClean="0">
+                          <a:ln>
+                            <a:noFill/>
+                          </a:ln>
+                          <a:solidFill>
+                            <a:schemeClr val="tx1"/>
+                          </a:solidFill>
+                          <a:effectLst/>
+                          <a:latin typeface="Arial" charset="0"/>
+                        </a:rPr>
+                        <a:t> </a:t>
+                      </a:r>
+                      <a:r>
+                        <a:rPr kumimoji="0" lang="en-US" sz="1000" b="0" i="0" u="none" strike="noStrike" cap="none" normalizeH="0" baseline="0" dirty="0" err="1" smtClean="0">
+                          <a:ln>
+                            <a:noFill/>
+                          </a:ln>
+                          <a:solidFill>
+                            <a:schemeClr val="tx1"/>
+                          </a:solidFill>
+                          <a:effectLst/>
+                          <a:latin typeface="Arial" charset="0"/>
+                        </a:rPr>
+                        <a:t>dazu</a:t>
+                      </a:r>
+                      <a:r>
+                        <a:rPr kumimoji="0" lang="en-US" sz="1000" b="0" i="0" u="none" strike="noStrike" cap="none" normalizeH="0" baseline="0" dirty="0" smtClean="0">
+                          <a:ln>
+                            <a:noFill/>
+                          </a:ln>
+                          <a:solidFill>
+                            <a:schemeClr val="tx1"/>
+                          </a:solidFill>
+                          <a:effectLst/>
+                          <a:latin typeface="Arial" charset="0"/>
+                        </a:rPr>
+                        <a:t> </a:t>
+                      </a:r>
+                      <a:r>
+                        <a:rPr kumimoji="0" lang="en-US" sz="1000" b="0" i="0" u="none" strike="noStrike" cap="none" normalizeH="0" baseline="0" dirty="0" err="1" smtClean="0">
+                          <a:ln>
+                            <a:noFill/>
+                          </a:ln>
+                          <a:solidFill>
+                            <a:schemeClr val="tx1"/>
+                          </a:solidFill>
+                          <a:effectLst/>
+                          <a:latin typeface="Arial" charset="0"/>
+                        </a:rPr>
+                        <a:t>aufgerufen</a:t>
+                      </a:r>
+                      <a:r>
+                        <a:rPr kumimoji="0" lang="en-US" sz="1000" b="0" i="0" u="none" strike="noStrike" cap="none" normalizeH="0" baseline="0" dirty="0" smtClean="0">
+                          <a:ln>
+                            <a:noFill/>
+                          </a:ln>
+                          <a:solidFill>
+                            <a:schemeClr val="tx1"/>
+                          </a:solidFill>
+                          <a:effectLst/>
+                          <a:latin typeface="Arial" charset="0"/>
+                        </a:rPr>
+                        <a:t> </a:t>
+                      </a:r>
+                      <a:r>
+                        <a:rPr kumimoji="0" lang="en-US" sz="1000" b="0" i="0" u="none" strike="noStrike" cap="none" normalizeH="0" baseline="0" dirty="0" err="1" smtClean="0">
+                          <a:ln>
+                            <a:noFill/>
+                          </a:ln>
+                          <a:solidFill>
+                            <a:schemeClr val="tx1"/>
+                          </a:solidFill>
+                          <a:effectLst/>
+                          <a:latin typeface="Arial" charset="0"/>
+                        </a:rPr>
+                        <a:t>wird</a:t>
+                      </a:r>
+                      <a:endParaRPr kumimoji="0" lang="en-US" sz="1000" b="0" i="0" u="none" strike="noStrike" cap="none" normalizeH="0" baseline="0" dirty="0" smtClean="0">
+                        <a:ln>
+                          <a:noFill/>
+                        </a:ln>
+                        <a:solidFill>
+                          <a:schemeClr val="tx1"/>
+                        </a:solidFill>
+                        <a:effectLst/>
+                        <a:latin typeface="Arial" charset="0"/>
+                      </a:endParaRPr>
+                    </a:p>
+                    <a:p>
+                      <a:pPr marL="0" marR="0" lvl="0" indent="0" algn="l" defTabSz="914400" rtl="0" eaLnBrk="1" fontAlgn="base" latinLnBrk="0" hangingPunct="1">
+                        <a:lnSpc>
+                          <a:spcPct val="100000"/>
+                        </a:lnSpc>
+                        <a:spcBef>
+                          <a:spcPct val="20000"/>
+                        </a:spcBef>
+                        <a:spcAft>
+                          <a:spcPct val="0"/>
+                        </a:spcAft>
+                        <a:buClr>
+                          <a:schemeClr val="accent2"/>
+                        </a:buClr>
+                        <a:buSzPct val="100000"/>
+                        <a:buFont typeface="Wingdings" pitchFamily="2" charset="2"/>
+                        <a:buChar char="§"/>
+                        <a:tabLst/>
+                        <a:defRPr/>
+                      </a:pPr>
+                      <a:r>
+                        <a:rPr kumimoji="0" lang="en-US" sz="1000" b="0" i="0" u="none" strike="noStrike" cap="none" normalizeH="0" baseline="0" dirty="0" err="1" smtClean="0">
+                          <a:ln>
+                            <a:noFill/>
+                          </a:ln>
+                          <a:solidFill>
+                            <a:schemeClr val="tx1"/>
+                          </a:solidFill>
+                          <a:effectLst/>
+                          <a:latin typeface="Arial" charset="0"/>
+                        </a:rPr>
+                        <a:t>Benutzt</a:t>
+                      </a:r>
+                      <a:r>
+                        <a:rPr kumimoji="0" lang="en-US" sz="1000" b="0" i="0" u="none" strike="noStrike" cap="none" normalizeH="0" baseline="0" dirty="0" smtClean="0">
+                          <a:ln>
+                            <a:noFill/>
+                          </a:ln>
+                          <a:solidFill>
+                            <a:schemeClr val="tx1"/>
+                          </a:solidFill>
+                          <a:effectLst/>
+                          <a:latin typeface="Arial" charset="0"/>
+                        </a:rPr>
+                        <a:t> die </a:t>
+                      </a:r>
+                      <a:r>
+                        <a:rPr kumimoji="0" lang="en-US" sz="1000" b="0" i="0" u="none" strike="noStrike" cap="none" normalizeH="0" baseline="0" dirty="0" err="1" smtClean="0">
+                          <a:ln>
+                            <a:noFill/>
+                          </a:ln>
+                          <a:solidFill>
+                            <a:schemeClr val="tx1"/>
+                          </a:solidFill>
+                          <a:effectLst/>
+                          <a:latin typeface="Arial" charset="0"/>
+                        </a:rPr>
+                        <a:t>Seite</a:t>
+                      </a:r>
+                      <a:r>
+                        <a:rPr kumimoji="0" lang="en-US" sz="1000" b="0" i="0" u="none" strike="noStrike" cap="none" normalizeH="0" baseline="0" dirty="0" smtClean="0">
+                          <a:ln>
+                            <a:noFill/>
+                          </a:ln>
+                          <a:solidFill>
+                            <a:schemeClr val="tx1"/>
+                          </a:solidFill>
+                          <a:effectLst/>
+                          <a:latin typeface="Arial" charset="0"/>
+                        </a:rPr>
+                        <a:t> </a:t>
+                      </a:r>
+                      <a:r>
+                        <a:rPr kumimoji="0" lang="en-US" sz="1000" b="0" i="0" u="none" strike="noStrike" cap="none" normalizeH="0" baseline="0" dirty="0" err="1" smtClean="0">
+                          <a:ln>
+                            <a:noFill/>
+                          </a:ln>
+                          <a:solidFill>
+                            <a:schemeClr val="tx1"/>
+                          </a:solidFill>
+                          <a:effectLst/>
+                          <a:latin typeface="Arial" charset="0"/>
+                        </a:rPr>
+                        <a:t>gelegentlich</a:t>
+                      </a:r>
+                      <a:endParaRPr kumimoji="0" lang="en-US" sz="1000" b="0" i="0" u="none" strike="noStrike" cap="none" normalizeH="0" baseline="0" dirty="0" smtClean="0">
+                        <a:ln>
+                          <a:noFill/>
+                        </a:ln>
+                        <a:solidFill>
+                          <a:schemeClr val="tx1"/>
+                        </a:solidFill>
+                        <a:effectLst/>
+                        <a:latin typeface="Arial" charset="0"/>
+                      </a:endParaRPr>
+                    </a:p>
+                    <a:p>
+                      <a:pPr marL="0" marR="0" lvl="0" indent="0" algn="l" defTabSz="914400" rtl="0" eaLnBrk="1" fontAlgn="base" latinLnBrk="0" hangingPunct="1">
+                        <a:lnSpc>
+                          <a:spcPct val="100000"/>
+                        </a:lnSpc>
+                        <a:spcBef>
+                          <a:spcPct val="20000"/>
+                        </a:spcBef>
+                        <a:spcAft>
+                          <a:spcPct val="0"/>
+                        </a:spcAft>
+                        <a:buClr>
+                          <a:schemeClr val="accent2"/>
+                        </a:buClr>
+                        <a:buSzPct val="100000"/>
+                        <a:buFont typeface="Wingdings" pitchFamily="2" charset="2"/>
+                        <a:buChar char="§"/>
+                        <a:tabLst/>
+                        <a:defRPr/>
+                      </a:pPr>
+                      <a:r>
+                        <a:rPr kumimoji="0" lang="en-US" sz="1000" b="0" i="0" u="none" strike="noStrike" cap="none" normalizeH="0" baseline="0" dirty="0" smtClean="0">
+                          <a:ln>
+                            <a:noFill/>
+                          </a:ln>
+                          <a:solidFill>
+                            <a:schemeClr val="tx1"/>
+                          </a:solidFill>
+                          <a:effectLst/>
+                          <a:latin typeface="Arial" charset="0"/>
+                        </a:rPr>
+                        <a:t> </a:t>
+                      </a:r>
+                      <a:r>
+                        <a:rPr kumimoji="0" lang="en-US" sz="1000" b="0" i="0" u="none" strike="noStrike" cap="none" normalizeH="0" baseline="0" dirty="0" err="1" smtClean="0">
+                          <a:ln>
+                            <a:noFill/>
+                          </a:ln>
+                          <a:solidFill>
+                            <a:schemeClr val="tx1"/>
+                          </a:solidFill>
+                          <a:effectLst/>
+                          <a:latin typeface="Arial" charset="0"/>
+                        </a:rPr>
+                        <a:t>Vier</a:t>
+                      </a:r>
+                      <a:r>
+                        <a:rPr kumimoji="0" lang="en-US" sz="1000" b="0" i="0" u="none" strike="noStrike" cap="none" normalizeH="0" baseline="0" dirty="0" smtClean="0">
+                          <a:ln>
+                            <a:noFill/>
+                          </a:ln>
+                          <a:solidFill>
+                            <a:schemeClr val="tx1"/>
+                          </a:solidFill>
+                          <a:effectLst/>
+                          <a:latin typeface="Arial" charset="0"/>
+                        </a:rPr>
+                        <a:t> Kinder, </a:t>
+                      </a:r>
+                      <a:r>
+                        <a:rPr kumimoji="0" lang="en-US" sz="1000" b="0" i="0" u="none" strike="noStrike" cap="none" normalizeH="0" baseline="0" dirty="0" err="1" smtClean="0">
+                          <a:ln>
+                            <a:noFill/>
+                          </a:ln>
+                          <a:solidFill>
+                            <a:schemeClr val="tx1"/>
+                          </a:solidFill>
+                          <a:effectLst/>
+                          <a:latin typeface="Arial" charset="0"/>
+                        </a:rPr>
+                        <a:t>eins</a:t>
+                      </a:r>
+                      <a:r>
+                        <a:rPr kumimoji="0" lang="en-US" sz="1000" b="0" i="0" u="none" strike="noStrike" cap="none" normalizeH="0" baseline="0" dirty="0" smtClean="0">
+                          <a:ln>
+                            <a:noFill/>
+                          </a:ln>
+                          <a:solidFill>
+                            <a:schemeClr val="tx1"/>
+                          </a:solidFill>
+                          <a:effectLst/>
+                          <a:latin typeface="Arial" charset="0"/>
+                        </a:rPr>
+                        <a:t> </a:t>
+                      </a:r>
+                      <a:r>
+                        <a:rPr kumimoji="0" lang="en-US" sz="1000" b="0" i="0" u="none" strike="noStrike" cap="none" normalizeH="0" baseline="0" dirty="0" err="1" smtClean="0">
+                          <a:ln>
+                            <a:noFill/>
+                          </a:ln>
+                          <a:solidFill>
+                            <a:schemeClr val="tx1"/>
+                          </a:solidFill>
+                          <a:effectLst/>
+                          <a:latin typeface="Arial" charset="0"/>
+                        </a:rPr>
+                        <a:t>studiert</a:t>
+                      </a:r>
+                      <a:r>
+                        <a:rPr kumimoji="0" lang="en-US" sz="1000" b="0" i="0" u="none" strike="noStrike" cap="none" normalizeH="0" baseline="0" dirty="0" smtClean="0">
+                          <a:ln>
+                            <a:noFill/>
+                          </a:ln>
+                          <a:solidFill>
+                            <a:schemeClr val="tx1"/>
+                          </a:solidFill>
+                          <a:effectLst/>
+                          <a:latin typeface="Arial" charset="0"/>
+                        </a:rPr>
+                        <a:t> an der </a:t>
+                      </a:r>
+                      <a:r>
+                        <a:rPr kumimoji="0" lang="en-US" sz="1000" b="0" i="0" u="none" strike="noStrike" cap="none" normalizeH="0" baseline="0" dirty="0" err="1" smtClean="0">
+                          <a:ln>
+                            <a:noFill/>
+                          </a:ln>
+                          <a:solidFill>
+                            <a:schemeClr val="tx1"/>
+                          </a:solidFill>
+                          <a:effectLst/>
+                          <a:latin typeface="Arial" charset="0"/>
+                        </a:rPr>
+                        <a:t>Uni</a:t>
+                      </a:r>
+                      <a:r>
+                        <a:rPr kumimoji="0" lang="en-US" sz="1000" b="0" i="0" u="none" strike="noStrike" cap="none" normalizeH="0" baseline="0" dirty="0" smtClean="0">
+                          <a:ln>
+                            <a:noFill/>
+                          </a:ln>
+                          <a:solidFill>
+                            <a:schemeClr val="tx1"/>
+                          </a:solidFill>
+                          <a:effectLst/>
+                          <a:latin typeface="Arial" charset="0"/>
+                        </a:rPr>
+                        <a:t> Regensburg </a:t>
+                      </a:r>
+                      <a:r>
+                        <a:rPr kumimoji="0" lang="en-US" sz="1000" b="0" i="0" u="none" strike="noStrike" cap="none" normalizeH="0" baseline="0" dirty="0" err="1" smtClean="0">
+                          <a:ln>
+                            <a:noFill/>
+                          </a:ln>
+                          <a:solidFill>
+                            <a:schemeClr val="tx1"/>
+                          </a:solidFill>
+                          <a:effectLst/>
+                          <a:latin typeface="Arial" charset="0"/>
+                        </a:rPr>
+                        <a:t>Chemie</a:t>
+                      </a:r>
+                      <a:endParaRPr kumimoji="0" lang="en-US" sz="1000" b="0" i="0" u="none" strike="noStrike" cap="none" normalizeH="0" baseline="0" dirty="0" smtClean="0">
+                        <a:ln>
+                          <a:noFill/>
+                        </a:ln>
+                        <a:solidFill>
+                          <a:schemeClr val="tx1"/>
+                        </a:solidFill>
+                        <a:effectLst/>
+                        <a:latin typeface="Arial" charset="0"/>
+                      </a:endParaRPr>
+                    </a:p>
+                    <a:p>
+                      <a:pPr marL="0" marR="0" lvl="0" indent="0" algn="l" defTabSz="914400" rtl="0" eaLnBrk="1" fontAlgn="base" latinLnBrk="0" hangingPunct="1">
+                        <a:lnSpc>
+                          <a:spcPct val="100000"/>
+                        </a:lnSpc>
+                        <a:spcBef>
+                          <a:spcPct val="20000"/>
+                        </a:spcBef>
+                        <a:spcAft>
+                          <a:spcPct val="0"/>
+                        </a:spcAft>
+                        <a:buClr>
+                          <a:schemeClr val="accent2"/>
+                        </a:buClr>
+                        <a:buSzPct val="100000"/>
+                        <a:buFont typeface="Wingdings" pitchFamily="2" charset="2"/>
+                        <a:buChar char="§"/>
+                        <a:tabLst/>
+                        <a:defRPr/>
+                      </a:pPr>
+                      <a:r>
+                        <a:rPr kumimoji="0" lang="en-US" sz="1000" b="0" i="0" u="none" strike="noStrike" cap="none" normalizeH="0" baseline="0" dirty="0" smtClean="0">
+                          <a:ln>
+                            <a:noFill/>
+                          </a:ln>
+                          <a:solidFill>
+                            <a:schemeClr val="tx1"/>
+                          </a:solidFill>
+                          <a:effectLst/>
+                          <a:latin typeface="Arial" charset="0"/>
+                        </a:rPr>
+                        <a:t> </a:t>
+                      </a:r>
+                      <a:r>
+                        <a:rPr kumimoji="0" lang="en-US" sz="1000" b="0" i="0" u="none" strike="noStrike" cap="none" normalizeH="0" baseline="0" dirty="0" err="1" smtClean="0">
+                          <a:ln>
+                            <a:noFill/>
+                          </a:ln>
+                          <a:solidFill>
+                            <a:schemeClr val="tx1"/>
+                          </a:solidFill>
+                          <a:effectLst/>
+                          <a:latin typeface="Arial" charset="0"/>
+                        </a:rPr>
+                        <a:t>Lässt</a:t>
+                      </a:r>
+                      <a:r>
+                        <a:rPr kumimoji="0" lang="en-US" sz="1000" b="0" i="0" u="none" strike="noStrike" cap="none" normalizeH="0" baseline="0" dirty="0" smtClean="0">
+                          <a:ln>
+                            <a:noFill/>
+                          </a:ln>
+                          <a:solidFill>
+                            <a:schemeClr val="tx1"/>
+                          </a:solidFill>
+                          <a:effectLst/>
+                          <a:latin typeface="Arial" charset="0"/>
+                        </a:rPr>
+                        <a:t> </a:t>
+                      </a:r>
+                      <a:r>
+                        <a:rPr kumimoji="0" lang="en-US" sz="1000" b="0" i="0" u="none" strike="noStrike" cap="none" normalizeH="0" baseline="0" dirty="0" err="1" smtClean="0">
+                          <a:ln>
+                            <a:noFill/>
+                          </a:ln>
+                          <a:solidFill>
+                            <a:schemeClr val="tx1"/>
+                          </a:solidFill>
+                          <a:effectLst/>
+                          <a:latin typeface="Arial" charset="0"/>
+                        </a:rPr>
+                        <a:t>sich</a:t>
+                      </a:r>
+                      <a:r>
+                        <a:rPr kumimoji="0" lang="en-US" sz="1000" b="0" i="0" u="none" strike="noStrike" cap="none" normalizeH="0" baseline="0" dirty="0" smtClean="0">
+                          <a:ln>
+                            <a:noFill/>
+                          </a:ln>
+                          <a:solidFill>
+                            <a:schemeClr val="tx1"/>
+                          </a:solidFill>
+                          <a:effectLst/>
+                          <a:latin typeface="Arial" charset="0"/>
+                        </a:rPr>
+                        <a:t> </a:t>
+                      </a:r>
+                      <a:r>
+                        <a:rPr kumimoji="0" lang="en-US" sz="1000" b="0" i="0" u="none" strike="noStrike" cap="none" normalizeH="0" baseline="0" dirty="0" err="1" smtClean="0">
+                          <a:ln>
+                            <a:noFill/>
+                          </a:ln>
+                          <a:solidFill>
+                            <a:schemeClr val="tx1"/>
+                          </a:solidFill>
+                          <a:effectLst/>
+                          <a:latin typeface="Arial" charset="0"/>
+                        </a:rPr>
+                        <a:t>bei</a:t>
+                      </a:r>
+                      <a:r>
+                        <a:rPr kumimoji="0" lang="en-US" sz="1000" b="0" i="0" u="none" strike="noStrike" cap="none" normalizeH="0" baseline="0" dirty="0" smtClean="0">
+                          <a:ln>
+                            <a:noFill/>
+                          </a:ln>
+                          <a:solidFill>
+                            <a:schemeClr val="tx1"/>
+                          </a:solidFill>
+                          <a:effectLst/>
+                          <a:latin typeface="Arial" charset="0"/>
+                        </a:rPr>
+                        <a:t> </a:t>
+                      </a:r>
+                      <a:r>
+                        <a:rPr kumimoji="0" lang="en-US" sz="1000" b="0" i="0" u="none" strike="noStrike" cap="none" normalizeH="0" baseline="0" dirty="0" err="1" smtClean="0">
+                          <a:ln>
+                            <a:noFill/>
+                          </a:ln>
+                          <a:solidFill>
+                            <a:schemeClr val="tx1"/>
+                          </a:solidFill>
+                          <a:effectLst/>
+                          <a:latin typeface="Arial" charset="0"/>
+                        </a:rPr>
+                        <a:t>technischen</a:t>
+                      </a:r>
+                      <a:r>
+                        <a:rPr kumimoji="0" lang="en-US" sz="1000" b="0" i="0" u="none" strike="noStrike" cap="none" normalizeH="0" baseline="0" dirty="0" smtClean="0">
+                          <a:ln>
+                            <a:noFill/>
+                          </a:ln>
+                          <a:solidFill>
+                            <a:schemeClr val="tx1"/>
+                          </a:solidFill>
+                          <a:effectLst/>
+                          <a:latin typeface="Arial" charset="0"/>
+                        </a:rPr>
+                        <a:t> </a:t>
+                      </a:r>
+                      <a:r>
+                        <a:rPr kumimoji="0" lang="en-US" sz="1000" b="0" i="0" u="none" strike="noStrike" cap="none" normalizeH="0" baseline="0" dirty="0" err="1" smtClean="0">
+                          <a:ln>
+                            <a:noFill/>
+                          </a:ln>
+                          <a:solidFill>
+                            <a:schemeClr val="tx1"/>
+                          </a:solidFill>
+                          <a:effectLst/>
+                          <a:latin typeface="Arial" charset="0"/>
+                        </a:rPr>
+                        <a:t>Sachen</a:t>
+                      </a:r>
+                      <a:r>
+                        <a:rPr kumimoji="0" lang="en-US" sz="1000" b="0" i="0" u="none" strike="noStrike" cap="none" normalizeH="0" baseline="0" dirty="0" smtClean="0">
+                          <a:ln>
+                            <a:noFill/>
+                          </a:ln>
+                          <a:solidFill>
+                            <a:schemeClr val="tx1"/>
+                          </a:solidFill>
+                          <a:effectLst/>
+                          <a:latin typeface="Arial" charset="0"/>
+                        </a:rPr>
+                        <a:t> von </a:t>
+                      </a:r>
+                      <a:r>
+                        <a:rPr kumimoji="0" lang="en-US" sz="1000" b="0" i="0" u="none" strike="noStrike" cap="none" normalizeH="0" baseline="0" dirty="0" err="1" smtClean="0">
+                          <a:ln>
+                            <a:noFill/>
+                          </a:ln>
+                          <a:solidFill>
+                            <a:schemeClr val="tx1"/>
+                          </a:solidFill>
+                          <a:effectLst/>
+                          <a:latin typeface="Arial" charset="0"/>
+                        </a:rPr>
+                        <a:t>Kindern</a:t>
+                      </a:r>
+                      <a:r>
+                        <a:rPr kumimoji="0" lang="en-US" sz="1000" b="0" i="0" u="none" strike="noStrike" cap="none" normalizeH="0" baseline="0" dirty="0" smtClean="0">
+                          <a:ln>
+                            <a:noFill/>
+                          </a:ln>
+                          <a:solidFill>
+                            <a:schemeClr val="tx1"/>
+                          </a:solidFill>
+                          <a:effectLst/>
+                          <a:latin typeface="Arial" charset="0"/>
+                        </a:rPr>
+                        <a:t> </a:t>
+                      </a:r>
+                      <a:r>
+                        <a:rPr kumimoji="0" lang="en-US" sz="1000" b="0" i="0" u="none" strike="noStrike" cap="none" normalizeH="0" baseline="0" dirty="0" err="1" smtClean="0">
+                          <a:ln>
+                            <a:noFill/>
+                          </a:ln>
+                          <a:solidFill>
+                            <a:schemeClr val="tx1"/>
+                          </a:solidFill>
+                          <a:effectLst/>
+                          <a:latin typeface="Arial" charset="0"/>
+                        </a:rPr>
+                        <a:t>helfen</a:t>
+                      </a:r>
+                      <a:r>
+                        <a:rPr kumimoji="0" lang="en-US" sz="1000" b="0" i="0" u="none" strike="noStrike" cap="none" normalizeH="0" baseline="0" dirty="0" smtClean="0">
+                          <a:ln>
+                            <a:noFill/>
+                          </a:ln>
+                          <a:solidFill>
+                            <a:schemeClr val="tx1"/>
+                          </a:solidFill>
+                          <a:effectLst/>
+                          <a:latin typeface="Arial" charset="0"/>
+                        </a:rPr>
+                        <a:t> </a:t>
+                      </a:r>
+                    </a:p>
                     <a:p>
                       <a:pPr marL="0" marR="0" lvl="0" indent="0" algn="l" defTabSz="914400" rtl="0" eaLnBrk="1" fontAlgn="base" latinLnBrk="0" hangingPunct="1">
                         <a:lnSpc>
@@ -5413,18 +6066,513 @@
                         <a:tabLst/>
                       </a:pPr>
                       <a:r>
-                        <a:rPr kumimoji="0" lang="en-US" sz="1000" b="0" i="0" u="none" strike="noStrike" cap="none" normalizeH="0" baseline="0" smtClean="0">
-                          <a:ln>
-                            <a:noFill/>
-                          </a:ln>
-                          <a:solidFill>
-                            <a:schemeClr val="tx1"/>
-                          </a:solidFill>
-                          <a:effectLst/>
-                          <a:latin typeface="Arial" charset="0"/>
-                        </a:rPr>
-                        <a:t> …</a:t>
-                      </a:r>
+                        <a:rPr kumimoji="0" lang="en-US" sz="1000" b="0" i="0" u="none" strike="noStrike" cap="none" normalizeH="0" baseline="0" dirty="0" smtClean="0">
+                          <a:ln>
+                            <a:noFill/>
+                          </a:ln>
+                          <a:solidFill>
+                            <a:schemeClr val="tx1"/>
+                          </a:solidFill>
+                          <a:effectLst/>
+                          <a:latin typeface="Arial" charset="0"/>
+                        </a:rPr>
+                        <a:t> </a:t>
+                      </a:r>
+                      <a:r>
+                        <a:rPr kumimoji="0" lang="en-US" sz="1000" b="0" i="0" u="none" strike="noStrike" cap="none" normalizeH="0" baseline="0" dirty="0" err="1" smtClean="0">
+                          <a:ln>
+                            <a:noFill/>
+                          </a:ln>
+                          <a:solidFill>
+                            <a:schemeClr val="tx1"/>
+                          </a:solidFill>
+                          <a:effectLst/>
+                          <a:latin typeface="Arial" charset="0"/>
+                        </a:rPr>
+                        <a:t>Kam</a:t>
+                      </a:r>
+                      <a:r>
+                        <a:rPr kumimoji="0" lang="en-US" sz="1000" b="0" i="0" u="none" strike="noStrike" cap="none" normalizeH="0" baseline="0" dirty="0" smtClean="0">
+                          <a:ln>
+                            <a:noFill/>
+                          </a:ln>
+                          <a:solidFill>
+                            <a:schemeClr val="tx1"/>
+                          </a:solidFill>
+                          <a:effectLst/>
+                          <a:latin typeface="Arial" charset="0"/>
+                        </a:rPr>
+                        <a:t> </a:t>
+                      </a:r>
+                      <a:r>
+                        <a:rPr kumimoji="0" lang="en-US" sz="1000" b="0" i="0" u="none" strike="noStrike" cap="none" normalizeH="0" baseline="0" dirty="0" err="1" smtClean="0">
+                          <a:ln>
+                            <a:noFill/>
+                          </a:ln>
+                          <a:solidFill>
+                            <a:schemeClr val="tx1"/>
+                          </a:solidFill>
+                          <a:effectLst/>
+                          <a:latin typeface="Arial" charset="0"/>
+                        </a:rPr>
+                        <a:t>mit</a:t>
+                      </a:r>
+                      <a:r>
+                        <a:rPr kumimoji="0" lang="en-US" sz="1000" b="0" i="0" u="none" strike="noStrike" cap="none" normalizeH="0" baseline="0" dirty="0" smtClean="0">
+                          <a:ln>
+                            <a:noFill/>
+                          </a:ln>
+                          <a:solidFill>
+                            <a:schemeClr val="tx1"/>
+                          </a:solidFill>
+                          <a:effectLst/>
+                          <a:latin typeface="Arial" charset="0"/>
+                        </a:rPr>
+                        <a:t> der </a:t>
+                      </a:r>
+                      <a:r>
+                        <a:rPr kumimoji="0" lang="en-US" sz="1000" b="0" i="0" u="none" strike="noStrike" cap="none" normalizeH="0" baseline="0" dirty="0" err="1" smtClean="0">
+                          <a:ln>
+                            <a:noFill/>
+                          </a:ln>
+                          <a:solidFill>
+                            <a:schemeClr val="tx1"/>
+                          </a:solidFill>
+                          <a:effectLst/>
+                          <a:latin typeface="Arial" charset="0"/>
+                        </a:rPr>
+                        <a:t>alten</a:t>
+                      </a:r>
+                      <a:r>
+                        <a:rPr kumimoji="0" lang="en-US" sz="1000" b="0" i="0" u="none" strike="noStrike" cap="none" normalizeH="0" baseline="0" dirty="0" smtClean="0">
+                          <a:ln>
+                            <a:noFill/>
+                          </a:ln>
+                          <a:solidFill>
+                            <a:schemeClr val="tx1"/>
+                          </a:solidFill>
+                          <a:effectLst/>
+                          <a:latin typeface="Arial" charset="0"/>
+                        </a:rPr>
+                        <a:t> </a:t>
+                      </a:r>
+                      <a:r>
+                        <a:rPr kumimoji="0" lang="en-US" sz="1000" b="0" i="0" u="none" strike="noStrike" cap="none" normalizeH="0" baseline="0" dirty="0" err="1" smtClean="0">
+                          <a:ln>
+                            <a:noFill/>
+                          </a:ln>
+                          <a:solidFill>
+                            <a:schemeClr val="tx1"/>
+                          </a:solidFill>
+                          <a:effectLst/>
+                          <a:latin typeface="Arial" charset="0"/>
+                        </a:rPr>
+                        <a:t>Seite</a:t>
+                      </a:r>
+                      <a:r>
+                        <a:rPr kumimoji="0" lang="en-US" sz="1000" b="0" i="0" u="none" strike="noStrike" cap="none" normalizeH="0" baseline="0" dirty="0" smtClean="0">
+                          <a:ln>
+                            <a:noFill/>
+                          </a:ln>
+                          <a:solidFill>
+                            <a:schemeClr val="tx1"/>
+                          </a:solidFill>
+                          <a:effectLst/>
+                          <a:latin typeface="Arial" charset="0"/>
+                        </a:rPr>
+                        <a:t> </a:t>
+                      </a:r>
+                      <a:r>
+                        <a:rPr kumimoji="0" lang="en-US" sz="1000" b="0" i="0" u="none" strike="noStrike" cap="none" normalizeH="0" baseline="0" dirty="0" err="1" smtClean="0">
+                          <a:ln>
+                            <a:noFill/>
+                          </a:ln>
+                          <a:solidFill>
+                            <a:schemeClr val="tx1"/>
+                          </a:solidFill>
+                          <a:effectLst/>
+                          <a:latin typeface="Arial" charset="0"/>
+                        </a:rPr>
+                        <a:t>soweit</a:t>
+                      </a:r>
+                      <a:r>
+                        <a:rPr kumimoji="0" lang="en-US" sz="1000" b="0" i="0" u="none" strike="noStrike" cap="none" normalizeH="0" baseline="0" dirty="0" smtClean="0">
+                          <a:ln>
+                            <a:noFill/>
+                          </a:ln>
+                          <a:solidFill>
+                            <a:schemeClr val="tx1"/>
+                          </a:solidFill>
+                          <a:effectLst/>
+                          <a:latin typeface="Arial" charset="0"/>
+                        </a:rPr>
+                        <a:t> gut </a:t>
+                      </a:r>
+                      <a:r>
+                        <a:rPr kumimoji="0" lang="en-US" sz="1000" b="0" i="0" u="none" strike="noStrike" cap="none" normalizeH="0" baseline="0" dirty="0" err="1" smtClean="0">
+                          <a:ln>
+                            <a:noFill/>
+                          </a:ln>
+                          <a:solidFill>
+                            <a:schemeClr val="tx1"/>
+                          </a:solidFill>
+                          <a:effectLst/>
+                          <a:latin typeface="Arial" charset="0"/>
+                        </a:rPr>
+                        <a:t>zurecht</a:t>
+                      </a:r>
+                      <a:r>
+                        <a:rPr kumimoji="0" lang="en-US" sz="1000" b="0" i="0" u="none" strike="noStrike" cap="none" normalizeH="0" baseline="0" dirty="0" smtClean="0">
+                          <a:ln>
+                            <a:noFill/>
+                          </a:ln>
+                          <a:solidFill>
+                            <a:schemeClr val="tx1"/>
+                          </a:solidFill>
+                          <a:effectLst/>
+                          <a:latin typeface="Arial" charset="0"/>
+                        </a:rPr>
+                        <a:t> und </a:t>
+                      </a:r>
+                      <a:r>
+                        <a:rPr kumimoji="0" lang="en-US" sz="1000" b="0" i="0" u="none" strike="noStrike" cap="none" normalizeH="0" baseline="0" dirty="0" err="1" smtClean="0">
+                          <a:ln>
+                            <a:noFill/>
+                          </a:ln>
+                          <a:solidFill>
+                            <a:schemeClr val="tx1"/>
+                          </a:solidFill>
+                          <a:effectLst/>
+                          <a:latin typeface="Arial" charset="0"/>
+                        </a:rPr>
+                        <a:t>hofft</a:t>
+                      </a:r>
+                      <a:r>
+                        <a:rPr kumimoji="0" lang="en-US" sz="1000" b="0" i="0" u="none" strike="noStrike" cap="none" normalizeH="0" baseline="0" dirty="0" smtClean="0">
+                          <a:ln>
+                            <a:noFill/>
+                          </a:ln>
+                          <a:solidFill>
+                            <a:schemeClr val="tx1"/>
+                          </a:solidFill>
+                          <a:effectLst/>
+                          <a:latin typeface="Arial" charset="0"/>
+                        </a:rPr>
+                        <a:t>, </a:t>
+                      </a:r>
+                      <a:r>
+                        <a:rPr kumimoji="0" lang="en-US" sz="1000" b="0" i="0" u="none" strike="noStrike" cap="none" normalizeH="0" baseline="0" dirty="0" err="1" smtClean="0">
+                          <a:ln>
+                            <a:noFill/>
+                          </a:ln>
+                          <a:solidFill>
+                            <a:schemeClr val="tx1"/>
+                          </a:solidFill>
+                          <a:effectLst/>
+                          <a:latin typeface="Arial" charset="0"/>
+                        </a:rPr>
+                        <a:t>dass</a:t>
+                      </a:r>
+                      <a:r>
+                        <a:rPr kumimoji="0" lang="en-US" sz="1000" b="0" i="0" u="none" strike="noStrike" cap="none" normalizeH="0" baseline="0" dirty="0" smtClean="0">
+                          <a:ln>
+                            <a:noFill/>
+                          </a:ln>
+                          <a:solidFill>
+                            <a:schemeClr val="tx1"/>
+                          </a:solidFill>
+                          <a:effectLst/>
+                          <a:latin typeface="Arial" charset="0"/>
+                        </a:rPr>
+                        <a:t> der </a:t>
+                      </a:r>
+                      <a:r>
+                        <a:rPr kumimoji="0" lang="en-US" sz="1000" b="0" i="0" u="none" strike="noStrike" cap="none" normalizeH="0" baseline="0" dirty="0" err="1" smtClean="0">
+                          <a:ln>
+                            <a:noFill/>
+                          </a:ln>
+                          <a:solidFill>
+                            <a:schemeClr val="tx1"/>
+                          </a:solidFill>
+                          <a:effectLst/>
+                          <a:latin typeface="Arial" charset="0"/>
+                        </a:rPr>
+                        <a:t>neue</a:t>
+                      </a:r>
+                      <a:r>
+                        <a:rPr kumimoji="0" lang="en-US" sz="1000" b="0" i="0" u="none" strike="noStrike" cap="none" normalizeH="0" baseline="0" dirty="0" smtClean="0">
+                          <a:ln>
+                            <a:noFill/>
+                          </a:ln>
+                          <a:solidFill>
+                            <a:schemeClr val="tx1"/>
+                          </a:solidFill>
+                          <a:effectLst/>
+                          <a:latin typeface="Arial" charset="0"/>
+                        </a:rPr>
+                        <a:t> </a:t>
+                      </a:r>
+                      <a:r>
+                        <a:rPr kumimoji="0" lang="en-US" sz="1000" b="0" i="0" u="none" strike="noStrike" cap="none" normalizeH="0" baseline="0" dirty="0" err="1" smtClean="0">
+                          <a:ln>
+                            <a:noFill/>
+                          </a:ln>
+                          <a:solidFill>
+                            <a:schemeClr val="tx1"/>
+                          </a:solidFill>
+                          <a:effectLst/>
+                          <a:latin typeface="Arial" charset="0"/>
+                        </a:rPr>
+                        <a:t>Aufbau</a:t>
+                      </a:r>
+                      <a:r>
+                        <a:rPr kumimoji="0" lang="en-US" sz="1000" b="0" i="0" u="none" strike="noStrike" cap="none" normalizeH="0" baseline="0" dirty="0" smtClean="0">
+                          <a:ln>
+                            <a:noFill/>
+                          </a:ln>
+                          <a:solidFill>
+                            <a:schemeClr val="tx1"/>
+                          </a:solidFill>
+                          <a:effectLst/>
+                          <a:latin typeface="Arial" charset="0"/>
+                        </a:rPr>
+                        <a:t> </a:t>
+                      </a:r>
+                      <a:r>
+                        <a:rPr kumimoji="0" lang="en-US" sz="1000" b="0" i="0" u="none" strike="noStrike" cap="none" normalizeH="0" baseline="0" dirty="0" err="1" smtClean="0">
+                          <a:ln>
+                            <a:noFill/>
+                          </a:ln>
+                          <a:solidFill>
+                            <a:schemeClr val="tx1"/>
+                          </a:solidFill>
+                          <a:effectLst/>
+                          <a:latin typeface="Arial" charset="0"/>
+                        </a:rPr>
+                        <a:t>nicht</a:t>
+                      </a:r>
+                      <a:r>
+                        <a:rPr kumimoji="0" lang="en-US" sz="1000" b="0" i="0" u="none" strike="noStrike" cap="none" normalizeH="0" baseline="0" dirty="0" smtClean="0">
+                          <a:ln>
+                            <a:noFill/>
+                          </a:ln>
+                          <a:solidFill>
+                            <a:schemeClr val="tx1"/>
+                          </a:solidFill>
+                          <a:effectLst/>
+                          <a:latin typeface="Arial" charset="0"/>
+                        </a:rPr>
+                        <a:t> </a:t>
+                      </a:r>
+                      <a:r>
+                        <a:rPr kumimoji="0" lang="en-US" sz="1000" b="0" i="0" u="none" strike="noStrike" cap="none" normalizeH="0" baseline="0" dirty="0" err="1" smtClean="0">
+                          <a:ln>
+                            <a:noFill/>
+                          </a:ln>
+                          <a:solidFill>
+                            <a:schemeClr val="tx1"/>
+                          </a:solidFill>
+                          <a:effectLst/>
+                          <a:latin typeface="Arial" charset="0"/>
+                        </a:rPr>
+                        <a:t>schlechter</a:t>
+                      </a:r>
+                      <a:r>
+                        <a:rPr kumimoji="0" lang="en-US" sz="1000" b="0" i="0" u="none" strike="noStrike" cap="none" normalizeH="0" baseline="0" dirty="0" smtClean="0">
+                          <a:ln>
+                            <a:noFill/>
+                          </a:ln>
+                          <a:solidFill>
+                            <a:schemeClr val="tx1"/>
+                          </a:solidFill>
+                          <a:effectLst/>
+                          <a:latin typeface="Arial" charset="0"/>
+                        </a:rPr>
+                        <a:t> </a:t>
+                      </a:r>
+                      <a:r>
+                        <a:rPr kumimoji="0" lang="en-US" sz="1000" b="0" i="0" u="none" strike="noStrike" cap="none" normalizeH="0" baseline="0" dirty="0" err="1" smtClean="0">
+                          <a:ln>
+                            <a:noFill/>
+                          </a:ln>
+                          <a:solidFill>
+                            <a:schemeClr val="tx1"/>
+                          </a:solidFill>
+                          <a:effectLst/>
+                          <a:latin typeface="Arial" charset="0"/>
+                        </a:rPr>
+                        <a:t>ist</a:t>
+                      </a:r>
+                      <a:endParaRPr kumimoji="0" lang="en-US" sz="1000" b="0" i="0" u="none" strike="noStrike" cap="none" normalizeH="0" baseline="0" dirty="0" smtClean="0">
+                        <a:ln>
+                          <a:noFill/>
+                        </a:ln>
+                        <a:solidFill>
+                          <a:schemeClr val="tx1"/>
+                        </a:solidFill>
+                        <a:effectLst/>
+                        <a:latin typeface="Arial" charset="0"/>
+                      </a:endParaRPr>
+                    </a:p>
+                    <a:p>
+                      <a:pPr marL="0" marR="0" lvl="0" indent="0" algn="l" defTabSz="914400" rtl="0" eaLnBrk="1" fontAlgn="base" latinLnBrk="0" hangingPunct="1">
+                        <a:lnSpc>
+                          <a:spcPct val="100000"/>
+                        </a:lnSpc>
+                        <a:spcBef>
+                          <a:spcPct val="20000"/>
+                        </a:spcBef>
+                        <a:spcAft>
+                          <a:spcPct val="0"/>
+                        </a:spcAft>
+                        <a:buClr>
+                          <a:schemeClr val="accent2"/>
+                        </a:buClr>
+                        <a:buSzPct val="100000"/>
+                        <a:buFont typeface="Wingdings" pitchFamily="2" charset="2"/>
+                        <a:buChar char="§"/>
+                        <a:tabLst/>
+                      </a:pPr>
+                      <a:r>
+                        <a:rPr kumimoji="0" lang="en-US" sz="1000" b="0" i="0" u="none" strike="noStrike" cap="none" normalizeH="0" baseline="0" dirty="0" smtClean="0">
+                          <a:ln>
+                            <a:noFill/>
+                          </a:ln>
+                          <a:solidFill>
+                            <a:schemeClr val="tx1"/>
+                          </a:solidFill>
+                          <a:effectLst/>
+                          <a:latin typeface="Arial" charset="0"/>
+                        </a:rPr>
+                        <a:t> </a:t>
+                      </a:r>
+                      <a:r>
+                        <a:rPr kumimoji="0" lang="en-US" sz="1000" b="0" i="0" u="none" strike="noStrike" cap="none" normalizeH="0" baseline="0" dirty="0" err="1" smtClean="0">
+                          <a:ln>
+                            <a:noFill/>
+                          </a:ln>
+                          <a:solidFill>
+                            <a:schemeClr val="tx1"/>
+                          </a:solidFill>
+                          <a:effectLst/>
+                          <a:latin typeface="Arial" charset="0"/>
+                        </a:rPr>
+                        <a:t>Ist</a:t>
+                      </a:r>
+                      <a:r>
+                        <a:rPr kumimoji="0" lang="en-US" sz="1000" b="0" i="0" u="none" strike="noStrike" cap="none" normalizeH="0" baseline="0" dirty="0" smtClean="0">
+                          <a:ln>
+                            <a:noFill/>
+                          </a:ln>
+                          <a:solidFill>
+                            <a:schemeClr val="tx1"/>
+                          </a:solidFill>
+                          <a:effectLst/>
+                          <a:latin typeface="Arial" charset="0"/>
+                        </a:rPr>
+                        <a:t> </a:t>
+                      </a:r>
+                      <a:r>
+                        <a:rPr kumimoji="0" lang="en-US" sz="1000" b="0" i="0" u="none" strike="noStrike" cap="none" normalizeH="0" baseline="0" dirty="0" err="1" smtClean="0">
+                          <a:ln>
+                            <a:noFill/>
+                          </a:ln>
+                          <a:solidFill>
+                            <a:schemeClr val="tx1"/>
+                          </a:solidFill>
+                          <a:effectLst/>
+                          <a:latin typeface="Arial" charset="0"/>
+                        </a:rPr>
+                        <a:t>jedoch</a:t>
+                      </a:r>
+                      <a:r>
+                        <a:rPr kumimoji="0" lang="en-US" sz="1000" b="0" i="0" u="none" strike="noStrike" cap="none" normalizeH="0" baseline="0" dirty="0" smtClean="0">
+                          <a:ln>
+                            <a:noFill/>
+                          </a:ln>
+                          <a:solidFill>
+                            <a:schemeClr val="tx1"/>
+                          </a:solidFill>
+                          <a:effectLst/>
+                          <a:latin typeface="Arial" charset="0"/>
+                        </a:rPr>
+                        <a:t> von </a:t>
+                      </a:r>
+                      <a:r>
+                        <a:rPr kumimoji="0" lang="en-US" sz="1000" b="0" i="0" u="none" strike="noStrike" cap="none" normalizeH="0" baseline="0" dirty="0" err="1" smtClean="0">
+                          <a:ln>
+                            <a:noFill/>
+                          </a:ln>
+                          <a:solidFill>
+                            <a:schemeClr val="tx1"/>
+                          </a:solidFill>
+                          <a:effectLst/>
+                          <a:latin typeface="Arial" charset="0"/>
+                        </a:rPr>
+                        <a:t>neuem</a:t>
+                      </a:r>
+                      <a:r>
+                        <a:rPr kumimoji="0" lang="en-US" sz="1000" b="0" i="0" u="none" strike="noStrike" cap="none" normalizeH="0" baseline="0" dirty="0" smtClean="0">
+                          <a:ln>
+                            <a:noFill/>
+                          </a:ln>
+                          <a:solidFill>
+                            <a:schemeClr val="tx1"/>
+                          </a:solidFill>
+                          <a:effectLst/>
+                          <a:latin typeface="Arial" charset="0"/>
+                        </a:rPr>
+                        <a:t> </a:t>
+                      </a:r>
+                      <a:r>
+                        <a:rPr kumimoji="0" lang="en-US" sz="1000" b="0" i="0" u="none" strike="noStrike" cap="none" normalizeH="0" baseline="0" dirty="0" err="1" smtClean="0">
+                          <a:ln>
+                            <a:noFill/>
+                          </a:ln>
+                          <a:solidFill>
+                            <a:schemeClr val="tx1"/>
+                          </a:solidFill>
+                          <a:effectLst/>
+                          <a:latin typeface="Arial" charset="0"/>
+                        </a:rPr>
+                        <a:t>Aufbau</a:t>
+                      </a:r>
+                      <a:r>
+                        <a:rPr kumimoji="0" lang="en-US" sz="1000" b="0" i="0" u="none" strike="noStrike" cap="none" normalizeH="0" baseline="0" dirty="0" smtClean="0">
+                          <a:ln>
+                            <a:noFill/>
+                          </a:ln>
+                          <a:solidFill>
+                            <a:schemeClr val="tx1"/>
+                          </a:solidFill>
+                          <a:effectLst/>
+                          <a:latin typeface="Arial" charset="0"/>
+                        </a:rPr>
+                        <a:t> </a:t>
+                      </a:r>
+                      <a:r>
+                        <a:rPr kumimoji="0" lang="en-US" sz="1000" b="0" i="0" u="none" strike="noStrike" cap="none" normalizeH="0" baseline="0" dirty="0" err="1" smtClean="0">
+                          <a:ln>
+                            <a:noFill/>
+                          </a:ln>
+                          <a:solidFill>
+                            <a:schemeClr val="tx1"/>
+                          </a:solidFill>
+                          <a:effectLst/>
+                          <a:latin typeface="Arial" charset="0"/>
+                        </a:rPr>
+                        <a:t>angetan</a:t>
+                      </a:r>
+                      <a:endParaRPr kumimoji="0" lang="en-US" sz="1000" b="0" i="0" u="none" strike="noStrike" cap="none" normalizeH="0" baseline="0" dirty="0" smtClean="0">
+                        <a:ln>
+                          <a:noFill/>
+                        </a:ln>
+                        <a:solidFill>
+                          <a:schemeClr val="tx1"/>
+                        </a:solidFill>
+                        <a:effectLst/>
+                        <a:latin typeface="Arial" charset="0"/>
+                      </a:endParaRPr>
                     </a:p>
                   </a:txBody>
                   <a:tcPr marL="90488" marR="90488" marT="44450" marB="44450" horzOverflow="overflow">
@@ -5487,7 +6635,7 @@
                         <a:tabLst/>
                       </a:pPr>
                       <a:r>
-                        <a:rPr kumimoji="0" lang="en-US" sz="1000" b="1" i="0" u="none" strike="noStrike" cap="none" normalizeH="0" baseline="0" smtClean="0">
+                        <a:rPr kumimoji="0" lang="en-US" sz="1000" b="1" i="0" u="none" strike="noStrike" cap="none" normalizeH="0" baseline="0" dirty="0" smtClean="0">
                           <a:ln>
                             <a:noFill/>
                           </a:ln>
@@ -5553,18 +6701,379 @@
                         <a:tabLst/>
                       </a:pPr>
                       <a:r>
-                        <a:rPr kumimoji="0" lang="en-US" sz="1000" b="0" i="0" u="none" strike="noStrike" cap="none" normalizeH="0" baseline="0" smtClean="0">
-                          <a:ln>
-                            <a:noFill/>
-                          </a:ln>
-                          <a:solidFill>
-                            <a:schemeClr val="tx1"/>
-                          </a:solidFill>
-                          <a:effectLst/>
-                          <a:latin typeface="Arial" charset="0"/>
-                        </a:rPr>
-                        <a:t> …</a:t>
-                      </a:r>
+                        <a:rPr kumimoji="0" lang="en-US" sz="1000" b="0" i="0" u="none" strike="noStrike" cap="none" normalizeH="0" baseline="0" dirty="0" smtClean="0">
+                          <a:ln>
+                            <a:noFill/>
+                          </a:ln>
+                          <a:solidFill>
+                            <a:schemeClr val="tx1"/>
+                          </a:solidFill>
+                          <a:effectLst/>
+                          <a:latin typeface="Arial" charset="0"/>
+                        </a:rPr>
+                        <a:t> </a:t>
+                      </a:r>
+                      <a:r>
+                        <a:rPr kumimoji="0" lang="en-US" sz="1000" b="0" i="0" u="none" strike="noStrike" cap="none" normalizeH="0" baseline="0" dirty="0" err="1" smtClean="0">
+                          <a:ln>
+                            <a:noFill/>
+                          </a:ln>
+                          <a:solidFill>
+                            <a:schemeClr val="tx1"/>
+                          </a:solidFill>
+                          <a:effectLst/>
+                          <a:latin typeface="Arial" charset="0"/>
+                        </a:rPr>
+                        <a:t>liest</a:t>
+                      </a:r>
+                      <a:r>
+                        <a:rPr kumimoji="0" lang="en-US" sz="1000" b="0" i="0" u="none" strike="noStrike" cap="none" normalizeH="0" baseline="0" dirty="0" smtClean="0">
+                          <a:ln>
+                            <a:noFill/>
+                          </a:ln>
+                          <a:solidFill>
+                            <a:schemeClr val="tx1"/>
+                          </a:solidFill>
+                          <a:effectLst/>
+                          <a:latin typeface="Arial" charset="0"/>
+                        </a:rPr>
+                        <a:t> </a:t>
+                      </a:r>
+                      <a:r>
+                        <a:rPr kumimoji="0" lang="en-US" sz="1000" b="0" i="0" u="none" strike="noStrike" cap="none" normalizeH="0" baseline="0" dirty="0" err="1" smtClean="0">
+                          <a:ln>
+                            <a:noFill/>
+                          </a:ln>
+                          <a:solidFill>
+                            <a:schemeClr val="tx1"/>
+                          </a:solidFill>
+                          <a:effectLst/>
+                          <a:latin typeface="Arial" charset="0"/>
+                        </a:rPr>
+                        <a:t>sich</a:t>
+                      </a:r>
+                      <a:r>
+                        <a:rPr kumimoji="0" lang="en-US" sz="1000" b="0" i="0" u="none" strike="noStrike" cap="none" normalizeH="0" baseline="0" dirty="0" smtClean="0">
+                          <a:ln>
+                            <a:noFill/>
+                          </a:ln>
+                          <a:solidFill>
+                            <a:schemeClr val="tx1"/>
+                          </a:solidFill>
+                          <a:effectLst/>
+                          <a:latin typeface="Arial" charset="0"/>
+                        </a:rPr>
+                        <a:t> </a:t>
+                      </a:r>
+                      <a:r>
+                        <a:rPr kumimoji="0" lang="en-US" sz="1000" b="0" i="0" u="none" strike="noStrike" cap="none" normalizeH="0" baseline="0" dirty="0" err="1" smtClean="0">
+                          <a:ln>
+                            <a:noFill/>
+                          </a:ln>
+                          <a:solidFill>
+                            <a:schemeClr val="tx1"/>
+                          </a:solidFill>
+                          <a:effectLst/>
+                          <a:latin typeface="Arial" charset="0"/>
+                        </a:rPr>
+                        <a:t>gerne</a:t>
+                      </a:r>
+                      <a:r>
+                        <a:rPr kumimoji="0" lang="en-US" sz="1000" b="0" i="0" u="none" strike="noStrike" cap="none" normalizeH="0" baseline="0" dirty="0" smtClean="0">
+                          <a:ln>
+                            <a:noFill/>
+                          </a:ln>
+                          <a:solidFill>
+                            <a:schemeClr val="tx1"/>
+                          </a:solidFill>
+                          <a:effectLst/>
+                          <a:latin typeface="Arial" charset="0"/>
+                        </a:rPr>
+                        <a:t> in </a:t>
+                      </a:r>
+                      <a:r>
+                        <a:rPr kumimoji="0" lang="en-US" sz="1000" b="0" i="0" u="none" strike="noStrike" cap="none" normalizeH="0" baseline="0" dirty="0" err="1" smtClean="0">
+                          <a:ln>
+                            <a:noFill/>
+                          </a:ln>
+                          <a:solidFill>
+                            <a:schemeClr val="tx1"/>
+                          </a:solidFill>
+                          <a:effectLst/>
+                          <a:latin typeface="Arial" charset="0"/>
+                        </a:rPr>
+                        <a:t>Sachen</a:t>
+                      </a:r>
+                      <a:r>
+                        <a:rPr kumimoji="0" lang="en-US" sz="1000" b="0" i="0" u="none" strike="noStrike" cap="none" normalizeH="0" baseline="0" dirty="0" smtClean="0">
+                          <a:ln>
+                            <a:noFill/>
+                          </a:ln>
+                          <a:solidFill>
+                            <a:schemeClr val="tx1"/>
+                          </a:solidFill>
+                          <a:effectLst/>
+                          <a:latin typeface="Arial" charset="0"/>
+                        </a:rPr>
+                        <a:t> </a:t>
+                      </a:r>
+                      <a:r>
+                        <a:rPr kumimoji="0" lang="en-US" sz="1000" b="0" i="0" u="none" strike="noStrike" cap="none" normalizeH="0" baseline="0" dirty="0" err="1" smtClean="0">
+                          <a:ln>
+                            <a:noFill/>
+                          </a:ln>
+                          <a:solidFill>
+                            <a:schemeClr val="tx1"/>
+                          </a:solidFill>
+                          <a:effectLst/>
+                          <a:latin typeface="Arial" charset="0"/>
+                        </a:rPr>
+                        <a:t>ein</a:t>
+                      </a:r>
+                      <a:r>
+                        <a:rPr kumimoji="0" lang="en-US" sz="1000" b="0" i="0" u="none" strike="noStrike" cap="none" normalizeH="0" baseline="0" dirty="0" smtClean="0">
+                          <a:ln>
+                            <a:noFill/>
+                          </a:ln>
+                          <a:solidFill>
+                            <a:schemeClr val="tx1"/>
+                          </a:solidFill>
+                          <a:effectLst/>
+                          <a:latin typeface="Arial" charset="0"/>
+                        </a:rPr>
+                        <a:t>. </a:t>
+                      </a:r>
+                      <a:r>
+                        <a:rPr kumimoji="0" lang="en-US" sz="1000" b="0" i="0" u="none" strike="noStrike" cap="none" normalizeH="0" baseline="0" dirty="0" err="1" smtClean="0">
+                          <a:ln>
+                            <a:noFill/>
+                          </a:ln>
+                          <a:solidFill>
+                            <a:schemeClr val="tx1"/>
+                          </a:solidFill>
+                          <a:effectLst/>
+                          <a:latin typeface="Arial" charset="0"/>
+                        </a:rPr>
+                        <a:t>Würde</a:t>
+                      </a:r>
+                      <a:r>
+                        <a:rPr kumimoji="0" lang="en-US" sz="1000" b="0" i="0" u="none" strike="noStrike" cap="none" normalizeH="0" baseline="0" dirty="0" smtClean="0">
+                          <a:ln>
+                            <a:noFill/>
+                          </a:ln>
+                          <a:solidFill>
+                            <a:schemeClr val="tx1"/>
+                          </a:solidFill>
+                          <a:effectLst/>
+                          <a:latin typeface="Arial" charset="0"/>
+                        </a:rPr>
+                        <a:t> </a:t>
+                      </a:r>
+                      <a:r>
+                        <a:rPr kumimoji="0" lang="en-US" sz="1000" b="0" i="0" u="none" strike="noStrike" cap="none" normalizeH="0" baseline="0" dirty="0" err="1" smtClean="0">
+                          <a:ln>
+                            <a:noFill/>
+                          </a:ln>
+                          <a:solidFill>
+                            <a:schemeClr val="tx1"/>
+                          </a:solidFill>
+                          <a:effectLst/>
+                          <a:latin typeface="Arial" charset="0"/>
+                        </a:rPr>
+                        <a:t>Angebot</a:t>
+                      </a:r>
+                      <a:r>
+                        <a:rPr kumimoji="0" lang="en-US" sz="1000" b="0" i="0" u="none" strike="noStrike" cap="none" normalizeH="0" baseline="0" dirty="0" smtClean="0">
+                          <a:ln>
+                            <a:noFill/>
+                          </a:ln>
+                          <a:solidFill>
+                            <a:schemeClr val="tx1"/>
+                          </a:solidFill>
+                          <a:effectLst/>
+                          <a:latin typeface="Arial" charset="0"/>
+                        </a:rPr>
+                        <a:t> </a:t>
+                      </a:r>
+                      <a:r>
+                        <a:rPr kumimoji="0" lang="en-US" sz="1000" b="0" i="0" u="none" strike="noStrike" cap="none" normalizeH="0" baseline="0" dirty="0" err="1" smtClean="0">
+                          <a:ln>
+                            <a:noFill/>
+                          </a:ln>
+                          <a:solidFill>
+                            <a:schemeClr val="tx1"/>
+                          </a:solidFill>
+                          <a:effectLst/>
+                          <a:latin typeface="Arial" charset="0"/>
+                        </a:rPr>
+                        <a:t>nutzen</a:t>
+                      </a:r>
+                      <a:r>
+                        <a:rPr kumimoji="0" lang="en-US" sz="1000" b="0" i="0" u="none" strike="noStrike" cap="none" normalizeH="0" baseline="0" dirty="0" smtClean="0">
+                          <a:ln>
+                            <a:noFill/>
+                          </a:ln>
+                          <a:solidFill>
+                            <a:schemeClr val="tx1"/>
+                          </a:solidFill>
+                          <a:effectLst/>
+                          <a:latin typeface="Arial" charset="0"/>
+                        </a:rPr>
+                        <a:t> </a:t>
+                      </a:r>
+                      <a:r>
+                        <a:rPr kumimoji="0" lang="en-US" sz="1000" b="0" i="0" u="none" strike="noStrike" cap="none" normalizeH="0" baseline="0" dirty="0" err="1" smtClean="0">
+                          <a:ln>
+                            <a:noFill/>
+                          </a:ln>
+                          <a:solidFill>
+                            <a:schemeClr val="tx1"/>
+                          </a:solidFill>
+                          <a:effectLst/>
+                          <a:latin typeface="Arial" charset="0"/>
+                        </a:rPr>
+                        <a:t>wenn</a:t>
+                      </a:r>
+                      <a:r>
+                        <a:rPr kumimoji="0" lang="en-US" sz="1000" b="0" i="0" u="none" strike="noStrike" cap="none" normalizeH="0" baseline="0" dirty="0" smtClean="0">
+                          <a:ln>
+                            <a:noFill/>
+                          </a:ln>
+                          <a:solidFill>
+                            <a:schemeClr val="tx1"/>
+                          </a:solidFill>
+                          <a:effectLst/>
+                          <a:latin typeface="Arial" charset="0"/>
+                        </a:rPr>
+                        <a:t> </a:t>
+                      </a:r>
+                      <a:r>
+                        <a:rPr kumimoji="0" lang="en-US" sz="1000" b="0" i="0" u="none" strike="noStrike" cap="none" normalizeH="0" baseline="0" dirty="0" err="1" smtClean="0">
+                          <a:ln>
+                            <a:noFill/>
+                          </a:ln>
+                          <a:solidFill>
+                            <a:schemeClr val="tx1"/>
+                          </a:solidFill>
+                          <a:effectLst/>
+                          <a:latin typeface="Arial" charset="0"/>
+                        </a:rPr>
+                        <a:t>Struktur</a:t>
+                      </a:r>
+                      <a:r>
+                        <a:rPr kumimoji="0" lang="en-US" sz="1000" b="0" i="0" u="none" strike="noStrike" cap="none" normalizeH="0" baseline="0" dirty="0" smtClean="0">
+                          <a:ln>
+                            <a:noFill/>
+                          </a:ln>
+                          <a:solidFill>
+                            <a:schemeClr val="tx1"/>
+                          </a:solidFill>
+                          <a:effectLst/>
+                          <a:latin typeface="Arial" charset="0"/>
+                        </a:rPr>
+                        <a:t> </a:t>
+                      </a:r>
+                      <a:r>
+                        <a:rPr kumimoji="0" lang="en-US" sz="1000" b="0" i="0" u="none" strike="noStrike" cap="none" normalizeH="0" baseline="0" dirty="0" err="1" smtClean="0">
+                          <a:ln>
+                            <a:noFill/>
+                          </a:ln>
+                          <a:solidFill>
+                            <a:schemeClr val="tx1"/>
+                          </a:solidFill>
+                          <a:effectLst/>
+                          <a:latin typeface="Arial" charset="0"/>
+                        </a:rPr>
+                        <a:t>sinnvoll</a:t>
+                      </a:r>
+                      <a:r>
+                        <a:rPr kumimoji="0" lang="en-US" sz="1000" b="0" i="0" u="none" strike="noStrike" cap="none" normalizeH="0" baseline="0" dirty="0" smtClean="0">
+                          <a:ln>
+                            <a:noFill/>
+                          </a:ln>
+                          <a:solidFill>
+                            <a:schemeClr val="tx1"/>
+                          </a:solidFill>
+                          <a:effectLst/>
+                          <a:latin typeface="Arial" charset="0"/>
+                        </a:rPr>
+                        <a:t> und </a:t>
+                      </a:r>
+                      <a:r>
+                        <a:rPr kumimoji="0" lang="en-US" sz="1000" b="0" i="0" u="none" strike="noStrike" cap="none" normalizeH="0" baseline="0" dirty="0" err="1" smtClean="0">
+                          <a:ln>
+                            <a:noFill/>
+                          </a:ln>
+                          <a:solidFill>
+                            <a:schemeClr val="tx1"/>
+                          </a:solidFill>
+                          <a:effectLst/>
+                          <a:latin typeface="Arial" charset="0"/>
+                        </a:rPr>
+                        <a:t>konsistent</a:t>
+                      </a:r>
+                      <a:r>
+                        <a:rPr kumimoji="0" lang="en-US" sz="1000" b="0" i="0" u="none" strike="noStrike" cap="none" normalizeH="0" baseline="0" dirty="0" smtClean="0">
+                          <a:ln>
+                            <a:noFill/>
+                          </a:ln>
+                          <a:solidFill>
+                            <a:schemeClr val="tx1"/>
+                          </a:solidFill>
+                          <a:effectLst/>
+                          <a:latin typeface="Arial" charset="0"/>
+                        </a:rPr>
+                        <a:t> </a:t>
+                      </a:r>
+                      <a:r>
+                        <a:rPr kumimoji="0" lang="en-US" sz="1000" b="0" i="0" u="none" strike="noStrike" cap="none" normalizeH="0" baseline="0" dirty="0" err="1" smtClean="0">
+                          <a:ln>
+                            <a:noFill/>
+                          </a:ln>
+                          <a:solidFill>
+                            <a:schemeClr val="tx1"/>
+                          </a:solidFill>
+                          <a:effectLst/>
+                          <a:latin typeface="Arial" charset="0"/>
+                        </a:rPr>
+                        <a:t>aufgebaut</a:t>
+                      </a:r>
+                      <a:r>
+                        <a:rPr kumimoji="0" lang="en-US" sz="1000" b="0" i="0" u="none" strike="noStrike" cap="none" normalizeH="0" baseline="0" dirty="0" smtClean="0">
+                          <a:ln>
+                            <a:noFill/>
+                          </a:ln>
+                          <a:solidFill>
+                            <a:schemeClr val="tx1"/>
+                          </a:solidFill>
+                          <a:effectLst/>
+                          <a:latin typeface="Arial" charset="0"/>
+                        </a:rPr>
+                        <a:t> </a:t>
+                      </a:r>
+                      <a:r>
+                        <a:rPr kumimoji="0" lang="en-US" sz="1000" b="0" i="0" u="none" strike="noStrike" cap="none" normalizeH="0" baseline="0" dirty="0" err="1" smtClean="0">
+                          <a:ln>
+                            <a:noFill/>
+                          </a:ln>
+                          <a:solidFill>
+                            <a:schemeClr val="tx1"/>
+                          </a:solidFill>
+                          <a:effectLst/>
+                          <a:latin typeface="Arial" charset="0"/>
+                        </a:rPr>
+                        <a:t>ist</a:t>
+                      </a:r>
+                      <a:endParaRPr kumimoji="0" lang="en-US" sz="1000" b="0" i="0" u="none" strike="noStrike" cap="none" normalizeH="0" baseline="0" dirty="0" smtClean="0">
+                        <a:ln>
+                          <a:noFill/>
+                        </a:ln>
+                        <a:solidFill>
+                          <a:schemeClr val="tx1"/>
+                        </a:solidFill>
+                        <a:effectLst/>
+                        <a:latin typeface="Arial" charset="0"/>
+                      </a:endParaRPr>
                     </a:p>
                   </a:txBody>
                   <a:tcPr marL="90488" marR="90488" marT="44450" marB="44450" horzOverflow="overflow">
@@ -5718,23 +7227,37 @@
           <a:p>
             <a:r>
               <a:rPr lang="en-US" sz="1800" dirty="0" smtClean="0"/>
-              <a:t> Christina </a:t>
+              <a:t> </a:t>
             </a:r>
             <a:r>
               <a:rPr lang="de-DE" sz="1800" dirty="0" smtClean="0"/>
-              <a:t>ist 25 Jahre alt und schreibt gerade ihre Doktorarbeit in Physik. Hierfür benötigt sie einige kostenpflichtige Programme, welche sie jedoch über das Rechenzentrum umsonst bekommt.</a:t>
-            </a:r>
-          </a:p>
-          <a:p>
+              <a:t>Hubert ist 48 Jahre alt und Professor der Literaturwissenschaft an der Universität Regensburg. Seine Frau arbeitet ebenfalls an der Universität als Chemie Professorin. </a:t>
+            </a:r>
             <a:r>
               <a:rPr lang="de-DE" sz="1800" dirty="0" smtClean="0"/>
-              <a:t>Das ändern des Passworts macht Christina immer so spät wie möglich, damit Sie ihr aktuelles Passwort so lange wie möglich behalten kann, weshalb Sie ihr Passwort immer direkt über die RZ Seite ändert und nicht über den direktlink in der E-Mail</a:t>
+              <a:t>Ein Kind von ihm studiert noch an der Universität Chemie. Seine restlichen drei Kinder haben bereits fertig studiert und arbeiten in der Wirtschaft. Bei technischen Fragen zu Hause wird bei fragen immer eines der Kinder herangezogen. Auch bei Problemen in der Uni mit Software oder Hardware bezieht Hubert erst seine Kinder mit ein bevor er den Support kontaktiert.</a:t>
             </a:r>
           </a:p>
           <a:p>
             <a:r>
               <a:rPr lang="de-DE" sz="1800" dirty="0" smtClean="0"/>
-              <a:t>Da Christina ihre Ergebnisse lieber auf Papier ausgedruckt auswertet, muss sie regelmäßig ihr Guthaben aufladen</a:t>
+              <a:t>Informationen zu seinen Fragen und Problemen hat Hubert meist auch der Rechenzentrum Seite gefunden, jedoch ist der Weg dorthin für ihn meist sehr beschwerlich, wenn er nicht genau weiß wo er suchen muss.</a:t>
+            </a:r>
+          </a:p>
+          <a:p>
+            <a:r>
+              <a:rPr lang="de-DE" sz="1800" dirty="0" smtClean="0"/>
+              <a:t>Hubert arbeitet außerdem ein bis zwei mal pro Woche von zu Hause aus, je nachdem welche Termine er in der Universität wahrnehmen muss</a:t>
+            </a:r>
+          </a:p>
+          <a:p>
+            <a:r>
+              <a:rPr lang="de-DE" sz="1800" dirty="0" smtClean="0"/>
+              <a:t>Interessiert ist Hubert vor allem am Softwareangebot.</a:t>
+            </a:r>
+            <a:r>
+              <a:rPr lang="de-DE" sz="1800" dirty="0" smtClean="0"/>
+              <a:t> </a:t>
             </a:r>
             <a:endParaRPr lang="en-US" sz="1400" dirty="0"/>
           </a:p>
@@ -5852,131 +7375,70 @@
           <a:lstStyle/>
           <a:p>
             <a:r>
-              <a:rPr lang="de-DE" sz="1800"/>
+              <a:rPr lang="de-DE" sz="1800" dirty="0"/>
               <a:t>Szenario 1:</a:t>
             </a:r>
           </a:p>
           <a:p>
             <a:pPr lvl="1"/>
             <a:r>
-              <a:rPr lang="de-DE" sz="1500" smtClean="0"/>
-              <a:t>Christina </a:t>
-            </a:r>
-            <a:r>
-              <a:rPr lang="de-DE" sz="1500"/>
-              <a:t>soll zunächst </a:t>
-            </a:r>
-            <a:r>
-              <a:rPr lang="de-DE" sz="1500" smtClean="0"/>
-              <a:t>ihr </a:t>
-            </a:r>
-            <a:r>
-              <a:rPr lang="de-DE" sz="1500"/>
-              <a:t>Passwort </a:t>
-            </a:r>
-            <a:r>
-              <a:rPr lang="de-DE" sz="1500" smtClean="0"/>
-              <a:t>ändern und Druckerguthaben aufladen</a:t>
-            </a:r>
-            <a:endParaRPr lang="de-DE" sz="1800"/>
-          </a:p>
-          <a:p>
-            <a:r>
-              <a:rPr lang="de-DE" sz="1800"/>
-              <a:t>Szenario 2</a:t>
-            </a:r>
-            <a:r>
-              <a:rPr lang="de-DE" sz="1800" smtClean="0"/>
-              <a:t>:</a:t>
+              <a:rPr lang="de-DE" sz="1500" dirty="0" smtClean="0"/>
+              <a:t>Hubert ist heute zu Hause und möchte sich ein Programm herunterladen. </a:t>
+            </a:r>
+            <a:r>
+              <a:rPr lang="de-DE" sz="1500" dirty="0" smtClean="0"/>
+              <a:t>Jedoch geht dies nicht ohne VPN. Deswegen informiert sich Hubert wie dies funktioniert und richtet sich seinen VPN Zugang ein.</a:t>
+            </a:r>
+            <a:endParaRPr lang="de-DE" sz="1800" dirty="0" smtClean="0"/>
+          </a:p>
+          <a:p>
+            <a:r>
+              <a:rPr lang="de-DE" sz="1800" dirty="0" smtClean="0"/>
+              <a:t>Szenario 2:</a:t>
             </a:r>
           </a:p>
           <a:p>
             <a:pPr lvl="1"/>
             <a:r>
-              <a:rPr lang="de-DE" sz="1500" smtClean="0"/>
-              <a:t>Christina bekommt demnächst einen neuen Laptop, da </a:t>
-            </a:r>
-            <a:r>
-              <a:rPr lang="de-DE" sz="1500" err="1" smtClean="0"/>
-              <a:t>iher</a:t>
-            </a:r>
-            <a:r>
-              <a:rPr lang="de-DE" sz="1500" smtClean="0"/>
-              <a:t> alter bereits 5 Jahre alt ist und nicht mehr zu gebrauchen ist um größere Auswertungen laufen zu lassen. Deshalb informiert Sie sich, wie sie diesen im Uni Netz anmeldet und wie man das W-</a:t>
-            </a:r>
-            <a:r>
-              <a:rPr lang="de-DE" sz="1500" err="1" smtClean="0"/>
-              <a:t>Lan</a:t>
-            </a:r>
-            <a:r>
-              <a:rPr lang="de-DE" sz="1500" smtClean="0"/>
-              <a:t> einrichtet </a:t>
-            </a:r>
-            <a:endParaRPr lang="de-DE" sz="1500"/>
-          </a:p>
-          <a:p>
-            <a:r>
-              <a:rPr lang="de-DE" sz="1800" smtClean="0"/>
+              <a:rPr lang="de-DE" sz="1500" dirty="0" smtClean="0"/>
+              <a:t>Anschließend macht Hubert auch die Suche nach dem Statistik Programm SPSS und prüft zunächst ob die Angebotene Version mit seinem Rechner kompatibel ist. </a:t>
+            </a:r>
+            <a:endParaRPr lang="de-DE" sz="1500" dirty="0"/>
+          </a:p>
+          <a:p>
+            <a:r>
+              <a:rPr lang="de-DE" sz="1800" dirty="0" smtClean="0"/>
               <a:t>Szenario 3:</a:t>
             </a:r>
           </a:p>
           <a:p>
             <a:pPr lvl="1"/>
             <a:r>
-              <a:rPr lang="de-DE" sz="1500" smtClean="0"/>
-              <a:t>Um jedoch bereits mit der Arbeit anzufangen sucht Christina nach </a:t>
-            </a:r>
-            <a:r>
-              <a:rPr lang="de-DE" sz="1500" err="1" smtClean="0"/>
-              <a:t>Cip</a:t>
-            </a:r>
-            <a:r>
-              <a:rPr lang="de-DE" sz="1500" smtClean="0"/>
-              <a:t> Pools welche </a:t>
-            </a:r>
-            <a:r>
-              <a:rPr lang="de-DE" sz="1500" err="1" smtClean="0"/>
-              <a:t>MathLab</a:t>
-            </a:r>
-            <a:r>
-              <a:rPr lang="de-DE" sz="1500" smtClean="0"/>
-              <a:t> vorinstalliert und einen Drucker haben.</a:t>
-            </a:r>
-            <a:endParaRPr lang="de-DE" sz="1500"/>
-          </a:p>
-          <a:p>
-            <a:r>
-              <a:rPr lang="de-DE" sz="1800" smtClean="0"/>
+              <a:rPr lang="de-DE" sz="1500" dirty="0" smtClean="0"/>
+              <a:t>Da Hubert dieses Semester zum ersten mal seine eigenen Vorlesungen aufzeichnen lassen will, informiert er sich, welche Qualität diese Videos haben werden.</a:t>
+            </a:r>
+          </a:p>
+          <a:p>
+            <a:r>
+              <a:rPr lang="de-DE" sz="1800" dirty="0" smtClean="0"/>
               <a:t>Szenario 4:</a:t>
             </a:r>
-            <a:endParaRPr lang="de-DE" sz="1800"/>
           </a:p>
           <a:p>
             <a:pPr lvl="1"/>
             <a:r>
-              <a:rPr lang="de-DE" sz="1500" smtClean="0"/>
-              <a:t>Da Christina sobald Sie ihren neuen Laptop hat dort mit der Auswertung weiter machen möchte, sucht Sie nach dem Programm (</a:t>
-            </a:r>
-            <a:r>
-              <a:rPr lang="de-DE" sz="1500" err="1" smtClean="0"/>
-              <a:t>MathLab</a:t>
-            </a:r>
-            <a:r>
-              <a:rPr lang="de-DE" sz="1500" smtClean="0"/>
-              <a:t>) auf der RZ-Seite und ob hierfür Installationshilfen angeboten werden.</a:t>
-            </a:r>
+              <a:rPr lang="de-DE" sz="1500" dirty="0" smtClean="0"/>
+              <a:t>Hubert ist mit der Videos zufrieden und beschließt sich nun weiter damit Vertraut zu machen, welche Schritte unternommen werden müssen um seine Vorlesung aufzeichnen zu lassen</a:t>
+            </a:r>
+            <a:endParaRPr lang="de-DE" sz="1500" dirty="0"/>
           </a:p>
           <a:p>
             <a:pPr lvl="1"/>
-            <a:endParaRPr lang="de-DE" sz="1500"/>
+            <a:endParaRPr lang="de-DE" sz="700" dirty="0"/>
           </a:p>
           <a:p>
             <a:pPr lvl="1"/>
-            <a:endParaRPr lang="de-DE" sz="700"/>
-          </a:p>
-          <a:p>
-            <a:pPr lvl="1"/>
-            <a:endParaRPr lang="de-DE" sz="1500"/>
+            <a:endParaRPr lang="de-DE" sz="1500" dirty="0"/>
           </a:p>
         </p:txBody>
       </p:sp>
@@ -6069,17 +7531,17 @@
           <a:lstStyle/>
           <a:p>
             <a:r>
-              <a:rPr lang="de-DE" sz="2800" smtClean="0"/>
+              <a:rPr lang="de-DE" sz="2800" dirty="0" smtClean="0"/>
               <a:t/>
             </a:r>
             <a:br>
-              <a:rPr lang="de-DE" sz="2800" smtClean="0"/>
+              <a:rPr lang="de-DE" sz="2800" dirty="0" smtClean="0"/>
             </a:br>
             <a:r>
-              <a:rPr lang="en-US" sz="2800" b="1" err="1" smtClean="0"/>
+              <a:rPr lang="de-DE" sz="2800" b="1" dirty="0" smtClean="0"/>
               <a:t>Franziska</a:t>
             </a:r>
-            <a:endParaRPr lang="de-DE" sz="2800"/>
+            <a:endParaRPr lang="de-DE" sz="2800" dirty="0"/>
           </a:p>
         </p:txBody>
       </p:sp>
@@ -6092,7 +7554,7 @@
           <p:nvPr>
             <p:extLst>
               <p:ext uri="{D42A27DB-BD31-4B8C-83A1-F6EECF244321}">
-                <p14:modId xmlns:p14="http://schemas.microsoft.com/office/powerpoint/2010/main" val="129454792"/>
+                <p14:modId xmlns:p14="http://schemas.microsoft.com/office/powerpoint/2010/main" val="1525238180"/>
               </p:ext>
             </p:extLst>
           </p:nvPr>
@@ -6212,16 +7674,6 @@
                         </a:rPr>
                         <a:t>42</a:t>
                       </a:r>
-                      <a:endParaRPr kumimoji="0" lang="en-US" sz="1000" b="0" i="0" u="none" strike="noStrike" cap="none" normalizeH="0" baseline="0" dirty="0" smtClean="0">
-                        <a:ln>
-                          <a:noFill/>
-                        </a:ln>
-                        <a:solidFill>
-                          <a:schemeClr val="tx1"/>
-                        </a:solidFill>
-                        <a:effectLst/>
-                        <a:latin typeface="Arial" charset="0"/>
-                      </a:endParaRPr>
                     </a:p>
                   </a:txBody>
                   <a:tcPr marL="90488" marR="90488" marT="44450" marB="44450" horzOverflow="overflow">
@@ -6553,6 +8005,19 @@
                         <a:defRPr/>
                       </a:pPr>
                       <a:r>
+                        <a:rPr kumimoji="0" lang="en-US" sz="1000" b="0" i="0" u="none" strike="noStrike" cap="none" normalizeH="0" baseline="0" dirty="0" err="1" smtClean="0">
+                          <a:ln>
+                            <a:noFill/>
+                          </a:ln>
+                          <a:solidFill>
+                            <a:schemeClr val="tx1"/>
+                          </a:solidFill>
+                          <a:effectLst/>
+                          <a:latin typeface="Arial" charset="0"/>
+                        </a:rPr>
+                        <a:t>Erst</a:t>
+                      </a:r>
+                      <a:r>
                         <a:rPr kumimoji="0" lang="en-US" sz="1000" b="0" i="0" u="none" strike="noStrike" cap="none" normalizeH="0" baseline="0" dirty="0" smtClean="0">
                           <a:ln>
                             <a:noFill/>
@@ -6563,8 +8028,652 @@
                           <a:effectLst/>
                           <a:latin typeface="Arial" charset="0"/>
                         </a:rPr>
-                        <a:t>…</a:t>
-                      </a:r>
+                        <a:t> </a:t>
+                      </a:r>
+                      <a:r>
+                        <a:rPr kumimoji="0" lang="en-US" sz="1000" b="0" i="0" u="none" strike="noStrike" cap="none" normalizeH="0" baseline="0" dirty="0" err="1" smtClean="0">
+                          <a:ln>
+                            <a:noFill/>
+                          </a:ln>
+                          <a:solidFill>
+                            <a:schemeClr val="tx1"/>
+                          </a:solidFill>
+                          <a:effectLst/>
+                          <a:latin typeface="Arial" charset="0"/>
+                        </a:rPr>
+                        <a:t>seit</a:t>
+                      </a:r>
+                      <a:r>
+                        <a:rPr kumimoji="0" lang="en-US" sz="1000" b="0" i="0" u="none" strike="noStrike" cap="none" normalizeH="0" baseline="0" dirty="0" smtClean="0">
+                          <a:ln>
+                            <a:noFill/>
+                          </a:ln>
+                          <a:solidFill>
+                            <a:schemeClr val="tx1"/>
+                          </a:solidFill>
+                          <a:effectLst/>
+                          <a:latin typeface="Arial" charset="0"/>
+                        </a:rPr>
+                        <a:t> </a:t>
+                      </a:r>
+                      <a:r>
+                        <a:rPr kumimoji="0" lang="en-US" sz="1000" b="0" i="0" u="none" strike="noStrike" cap="none" normalizeH="0" baseline="0" dirty="0" err="1" smtClean="0">
+                          <a:ln>
+                            <a:noFill/>
+                          </a:ln>
+                          <a:solidFill>
+                            <a:schemeClr val="tx1"/>
+                          </a:solidFill>
+                          <a:effectLst/>
+                          <a:latin typeface="Arial" charset="0"/>
+                        </a:rPr>
+                        <a:t>kurzem</a:t>
+                      </a:r>
+                      <a:r>
+                        <a:rPr kumimoji="0" lang="en-US" sz="1000" b="0" i="0" u="none" strike="noStrike" cap="none" normalizeH="0" baseline="0" dirty="0" smtClean="0">
+                          <a:ln>
+                            <a:noFill/>
+                          </a:ln>
+                          <a:solidFill>
+                            <a:schemeClr val="tx1"/>
+                          </a:solidFill>
+                          <a:effectLst/>
+                          <a:latin typeface="Arial" charset="0"/>
+                        </a:rPr>
+                        <a:t> an der </a:t>
+                      </a:r>
+                      <a:r>
+                        <a:rPr kumimoji="0" lang="en-US" sz="1000" b="0" i="0" u="none" strike="noStrike" cap="none" normalizeH="0" baseline="0" dirty="0" err="1" smtClean="0">
+                          <a:ln>
+                            <a:noFill/>
+                          </a:ln>
+                          <a:solidFill>
+                            <a:schemeClr val="tx1"/>
+                          </a:solidFill>
+                          <a:effectLst/>
+                          <a:latin typeface="Arial" charset="0"/>
+                        </a:rPr>
+                        <a:t>Universität</a:t>
+                      </a:r>
+                      <a:r>
+                        <a:rPr kumimoji="0" lang="en-US" sz="1000" b="0" i="0" u="none" strike="noStrike" cap="none" normalizeH="0" baseline="0" dirty="0" smtClean="0">
+                          <a:ln>
+                            <a:noFill/>
+                          </a:ln>
+                          <a:solidFill>
+                            <a:schemeClr val="tx1"/>
+                          </a:solidFill>
+                          <a:effectLst/>
+                          <a:latin typeface="Arial" charset="0"/>
+                        </a:rPr>
+                        <a:t> und muss </a:t>
+                      </a:r>
+                      <a:r>
+                        <a:rPr kumimoji="0" lang="en-US" sz="1000" b="0" i="0" u="none" strike="noStrike" cap="none" normalizeH="0" baseline="0" dirty="0" err="1" smtClean="0">
+                          <a:ln>
+                            <a:noFill/>
+                          </a:ln>
+                          <a:solidFill>
+                            <a:schemeClr val="tx1"/>
+                          </a:solidFill>
+                          <a:effectLst/>
+                          <a:latin typeface="Arial" charset="0"/>
+                        </a:rPr>
+                        <a:t>sich</a:t>
+                      </a:r>
+                      <a:r>
+                        <a:rPr kumimoji="0" lang="en-US" sz="1000" b="0" i="0" u="none" strike="noStrike" cap="none" normalizeH="0" baseline="0" dirty="0" smtClean="0">
+                          <a:ln>
+                            <a:noFill/>
+                          </a:ln>
+                          <a:solidFill>
+                            <a:schemeClr val="tx1"/>
+                          </a:solidFill>
+                          <a:effectLst/>
+                          <a:latin typeface="Arial" charset="0"/>
+                        </a:rPr>
+                        <a:t> </a:t>
+                      </a:r>
+                      <a:r>
+                        <a:rPr kumimoji="0" lang="en-US" sz="1000" b="0" i="0" u="none" strike="noStrike" cap="none" normalizeH="0" baseline="0" dirty="0" err="1" smtClean="0">
+                          <a:ln>
+                            <a:noFill/>
+                          </a:ln>
+                          <a:solidFill>
+                            <a:schemeClr val="tx1"/>
+                          </a:solidFill>
+                          <a:effectLst/>
+                          <a:latin typeface="Arial" charset="0"/>
+                        </a:rPr>
+                        <a:t>noch</a:t>
+                      </a:r>
+                      <a:r>
+                        <a:rPr kumimoji="0" lang="en-US" sz="1000" b="0" i="0" u="none" strike="noStrike" cap="none" normalizeH="0" baseline="0" dirty="0" smtClean="0">
+                          <a:ln>
+                            <a:noFill/>
+                          </a:ln>
+                          <a:solidFill>
+                            <a:schemeClr val="tx1"/>
+                          </a:solidFill>
+                          <a:effectLst/>
+                          <a:latin typeface="Arial" charset="0"/>
+                        </a:rPr>
+                        <a:t> </a:t>
+                      </a:r>
+                      <a:r>
+                        <a:rPr kumimoji="0" lang="en-US" sz="1000" b="0" i="0" u="none" strike="noStrike" cap="none" normalizeH="0" baseline="0" dirty="0" err="1" smtClean="0">
+                          <a:ln>
+                            <a:noFill/>
+                          </a:ln>
+                          <a:solidFill>
+                            <a:schemeClr val="tx1"/>
+                          </a:solidFill>
+                          <a:effectLst/>
+                          <a:latin typeface="Arial" charset="0"/>
+                        </a:rPr>
+                        <a:t>zurecht</a:t>
+                      </a:r>
+                      <a:r>
+                        <a:rPr kumimoji="0" lang="en-US" sz="1000" b="0" i="0" u="none" strike="noStrike" cap="none" normalizeH="0" baseline="0" dirty="0" smtClean="0">
+                          <a:ln>
+                            <a:noFill/>
+                          </a:ln>
+                          <a:solidFill>
+                            <a:schemeClr val="tx1"/>
+                          </a:solidFill>
+                          <a:effectLst/>
+                          <a:latin typeface="Arial" charset="0"/>
+                        </a:rPr>
+                        <a:t> </a:t>
+                      </a:r>
+                      <a:r>
+                        <a:rPr kumimoji="0" lang="en-US" sz="1000" b="0" i="0" u="none" strike="noStrike" cap="none" normalizeH="0" baseline="0" dirty="0" err="1" smtClean="0">
+                          <a:ln>
+                            <a:noFill/>
+                          </a:ln>
+                          <a:solidFill>
+                            <a:schemeClr val="tx1"/>
+                          </a:solidFill>
+                          <a:effectLst/>
+                          <a:latin typeface="Arial" charset="0"/>
+                        </a:rPr>
+                        <a:t>finden</a:t>
+                      </a:r>
+                      <a:endParaRPr kumimoji="0" lang="en-US" sz="1000" b="0" i="0" u="none" strike="noStrike" cap="none" normalizeH="0" baseline="0" dirty="0" smtClean="0">
+                        <a:ln>
+                          <a:noFill/>
+                        </a:ln>
+                        <a:solidFill>
+                          <a:schemeClr val="tx1"/>
+                        </a:solidFill>
+                        <a:effectLst/>
+                        <a:latin typeface="Arial" charset="0"/>
+                      </a:endParaRPr>
+                    </a:p>
+                    <a:p>
+                      <a:pPr marL="0" marR="0" lvl="0" indent="0" algn="l" defTabSz="914400" rtl="0" eaLnBrk="1" fontAlgn="base" latinLnBrk="0" hangingPunct="1">
+                        <a:lnSpc>
+                          <a:spcPct val="100000"/>
+                        </a:lnSpc>
+                        <a:spcBef>
+                          <a:spcPct val="20000"/>
+                        </a:spcBef>
+                        <a:spcAft>
+                          <a:spcPct val="0"/>
+                        </a:spcAft>
+                        <a:buClr>
+                          <a:schemeClr val="accent2"/>
+                        </a:buClr>
+                        <a:buSzPct val="100000"/>
+                        <a:buFont typeface="Wingdings" pitchFamily="2" charset="2"/>
+                        <a:buChar char="§"/>
+                        <a:tabLst/>
+                        <a:defRPr/>
+                      </a:pPr>
+                      <a:r>
+                        <a:rPr kumimoji="0" lang="en-US" sz="1000" b="0" i="0" u="none" strike="noStrike" cap="none" normalizeH="0" baseline="0" dirty="0" err="1" smtClean="0">
+                          <a:ln>
+                            <a:noFill/>
+                          </a:ln>
+                          <a:solidFill>
+                            <a:schemeClr val="tx1"/>
+                          </a:solidFill>
+                          <a:effectLst/>
+                          <a:latin typeface="Arial" charset="0"/>
+                        </a:rPr>
+                        <a:t>Lässt</a:t>
+                      </a:r>
+                      <a:r>
+                        <a:rPr kumimoji="0" lang="en-US" sz="1000" b="0" i="0" u="none" strike="noStrike" cap="none" normalizeH="0" baseline="0" dirty="0" smtClean="0">
+                          <a:ln>
+                            <a:noFill/>
+                          </a:ln>
+                          <a:solidFill>
+                            <a:schemeClr val="tx1"/>
+                          </a:solidFill>
+                          <a:effectLst/>
+                          <a:latin typeface="Arial" charset="0"/>
+                        </a:rPr>
+                        <a:t> </a:t>
+                      </a:r>
+                      <a:r>
+                        <a:rPr kumimoji="0" lang="en-US" sz="1000" b="0" i="0" u="none" strike="noStrike" cap="none" normalizeH="0" baseline="0" dirty="0" err="1" smtClean="0">
+                          <a:ln>
+                            <a:noFill/>
+                          </a:ln>
+                          <a:solidFill>
+                            <a:schemeClr val="tx1"/>
+                          </a:solidFill>
+                          <a:effectLst/>
+                          <a:latin typeface="Arial" charset="0"/>
+                        </a:rPr>
+                        <a:t>technische</a:t>
+                      </a:r>
+                      <a:r>
+                        <a:rPr kumimoji="0" lang="en-US" sz="1000" b="0" i="0" u="none" strike="noStrike" cap="none" normalizeH="0" baseline="0" dirty="0" smtClean="0">
+                          <a:ln>
+                            <a:noFill/>
+                          </a:ln>
+                          <a:solidFill>
+                            <a:schemeClr val="tx1"/>
+                          </a:solidFill>
+                          <a:effectLst/>
+                          <a:latin typeface="Arial" charset="0"/>
+                        </a:rPr>
+                        <a:t> </a:t>
+                      </a:r>
+                      <a:r>
+                        <a:rPr kumimoji="0" lang="en-US" sz="1000" b="0" i="0" u="none" strike="noStrike" cap="none" normalizeH="0" baseline="0" dirty="0" err="1" smtClean="0">
+                          <a:ln>
+                            <a:noFill/>
+                          </a:ln>
+                          <a:solidFill>
+                            <a:schemeClr val="tx1"/>
+                          </a:solidFill>
+                          <a:effectLst/>
+                          <a:latin typeface="Arial" charset="0"/>
+                        </a:rPr>
+                        <a:t>Sachen</a:t>
+                      </a:r>
+                      <a:r>
+                        <a:rPr kumimoji="0" lang="en-US" sz="1000" b="0" i="0" u="none" strike="noStrike" cap="none" normalizeH="0" baseline="0" dirty="0" smtClean="0">
+                          <a:ln>
+                            <a:noFill/>
+                          </a:ln>
+                          <a:solidFill>
+                            <a:schemeClr val="tx1"/>
+                          </a:solidFill>
+                          <a:effectLst/>
+                          <a:latin typeface="Arial" charset="0"/>
+                        </a:rPr>
+                        <a:t> </a:t>
+                      </a:r>
+                      <a:r>
+                        <a:rPr kumimoji="0" lang="en-US" sz="1000" b="0" i="0" u="none" strike="noStrike" cap="none" normalizeH="0" baseline="0" dirty="0" err="1" smtClean="0">
+                          <a:ln>
+                            <a:noFill/>
+                          </a:ln>
+                          <a:solidFill>
+                            <a:schemeClr val="tx1"/>
+                          </a:solidFill>
+                          <a:effectLst/>
+                          <a:latin typeface="Arial" charset="0"/>
+                        </a:rPr>
+                        <a:t>sofern</a:t>
+                      </a:r>
+                      <a:r>
+                        <a:rPr kumimoji="0" lang="en-US" sz="1000" b="0" i="0" u="none" strike="noStrike" cap="none" normalizeH="0" baseline="0" dirty="0" smtClean="0">
+                          <a:ln>
+                            <a:noFill/>
+                          </a:ln>
+                          <a:solidFill>
+                            <a:schemeClr val="tx1"/>
+                          </a:solidFill>
+                          <a:effectLst/>
+                          <a:latin typeface="Arial" charset="0"/>
+                        </a:rPr>
+                        <a:t> </a:t>
+                      </a:r>
+                      <a:r>
+                        <a:rPr kumimoji="0" lang="en-US" sz="1000" b="0" i="0" u="none" strike="noStrike" cap="none" normalizeH="0" baseline="0" dirty="0" err="1" smtClean="0">
+                          <a:ln>
+                            <a:noFill/>
+                          </a:ln>
+                          <a:solidFill>
+                            <a:schemeClr val="tx1"/>
+                          </a:solidFill>
+                          <a:effectLst/>
+                          <a:latin typeface="Arial" charset="0"/>
+                        </a:rPr>
+                        <a:t>sie</a:t>
+                      </a:r>
+                      <a:r>
+                        <a:rPr kumimoji="0" lang="en-US" sz="1000" b="0" i="0" u="none" strike="noStrike" cap="none" normalizeH="0" baseline="0" dirty="0" smtClean="0">
+                          <a:ln>
+                            <a:noFill/>
+                          </a:ln>
+                          <a:solidFill>
+                            <a:schemeClr val="tx1"/>
+                          </a:solidFill>
+                          <a:effectLst/>
+                          <a:latin typeface="Arial" charset="0"/>
+                        </a:rPr>
+                        <a:t> </a:t>
+                      </a:r>
+                      <a:r>
+                        <a:rPr kumimoji="0" lang="en-US" sz="1000" b="0" i="0" u="none" strike="noStrike" cap="none" normalizeH="0" baseline="0" dirty="0" err="1" smtClean="0">
+                          <a:ln>
+                            <a:noFill/>
+                          </a:ln>
+                          <a:solidFill>
+                            <a:schemeClr val="tx1"/>
+                          </a:solidFill>
+                          <a:effectLst/>
+                          <a:latin typeface="Arial" charset="0"/>
+                        </a:rPr>
+                        <a:t>umsonst</a:t>
+                      </a:r>
+                      <a:r>
+                        <a:rPr kumimoji="0" lang="en-US" sz="1000" b="0" i="0" u="none" strike="noStrike" cap="none" normalizeH="0" baseline="0" dirty="0" smtClean="0">
+                          <a:ln>
+                            <a:noFill/>
+                          </a:ln>
+                          <a:solidFill>
+                            <a:schemeClr val="tx1"/>
+                          </a:solidFill>
+                          <a:effectLst/>
+                          <a:latin typeface="Arial" charset="0"/>
+                        </a:rPr>
+                        <a:t> </a:t>
+                      </a:r>
+                      <a:r>
+                        <a:rPr kumimoji="0" lang="en-US" sz="1000" b="0" i="0" u="none" strike="noStrike" cap="none" normalizeH="0" baseline="0" dirty="0" err="1" smtClean="0">
+                          <a:ln>
+                            <a:noFill/>
+                          </a:ln>
+                          <a:solidFill>
+                            <a:schemeClr val="tx1"/>
+                          </a:solidFill>
+                          <a:effectLst/>
+                          <a:latin typeface="Arial" charset="0"/>
+                        </a:rPr>
+                        <a:t>gemacht</a:t>
+                      </a:r>
+                      <a:r>
+                        <a:rPr kumimoji="0" lang="en-US" sz="1000" b="0" i="0" u="none" strike="noStrike" cap="none" normalizeH="0" baseline="0" dirty="0" smtClean="0">
+                          <a:ln>
+                            <a:noFill/>
+                          </a:ln>
+                          <a:solidFill>
+                            <a:schemeClr val="tx1"/>
+                          </a:solidFill>
+                          <a:effectLst/>
+                          <a:latin typeface="Arial" charset="0"/>
+                        </a:rPr>
+                        <a:t> warden den Support </a:t>
+                      </a:r>
+                      <a:r>
+                        <a:rPr kumimoji="0" lang="en-US" sz="1000" b="0" i="0" u="none" strike="noStrike" cap="none" normalizeH="0" baseline="0" dirty="0" err="1" smtClean="0">
+                          <a:ln>
+                            <a:noFill/>
+                          </a:ln>
+                          <a:solidFill>
+                            <a:schemeClr val="tx1"/>
+                          </a:solidFill>
+                          <a:effectLst/>
+                          <a:latin typeface="Arial" charset="0"/>
+                        </a:rPr>
+                        <a:t>erledigen</a:t>
+                      </a:r>
+                      <a:endParaRPr kumimoji="0" lang="en-US" sz="1000" b="0" i="0" u="none" strike="noStrike" cap="none" normalizeH="0" baseline="0" dirty="0" smtClean="0">
+                        <a:ln>
+                          <a:noFill/>
+                        </a:ln>
+                        <a:solidFill>
+                          <a:schemeClr val="tx1"/>
+                        </a:solidFill>
+                        <a:effectLst/>
+                        <a:latin typeface="Arial" charset="0"/>
+                      </a:endParaRPr>
+                    </a:p>
+                    <a:p>
+                      <a:pPr marL="0" marR="0" lvl="0" indent="0" algn="l" defTabSz="914400" rtl="0" eaLnBrk="1" fontAlgn="base" latinLnBrk="0" hangingPunct="1">
+                        <a:lnSpc>
+                          <a:spcPct val="100000"/>
+                        </a:lnSpc>
+                        <a:spcBef>
+                          <a:spcPct val="20000"/>
+                        </a:spcBef>
+                        <a:spcAft>
+                          <a:spcPct val="0"/>
+                        </a:spcAft>
+                        <a:buClr>
+                          <a:schemeClr val="accent2"/>
+                        </a:buClr>
+                        <a:buSzPct val="100000"/>
+                        <a:buFont typeface="Wingdings" pitchFamily="2" charset="2"/>
+                        <a:buChar char="§"/>
+                        <a:tabLst/>
+                        <a:defRPr/>
+                      </a:pPr>
+                      <a:r>
+                        <a:rPr kumimoji="0" lang="en-US" sz="1000" b="0" i="0" u="none" strike="noStrike" cap="none" normalizeH="0" baseline="0" dirty="0" err="1" smtClean="0">
+                          <a:ln>
+                            <a:noFill/>
+                          </a:ln>
+                          <a:solidFill>
+                            <a:schemeClr val="tx1"/>
+                          </a:solidFill>
+                          <a:effectLst/>
+                          <a:latin typeface="Arial" charset="0"/>
+                        </a:rPr>
+                        <a:t>Ist</a:t>
+                      </a:r>
+                      <a:r>
+                        <a:rPr kumimoji="0" lang="en-US" sz="1000" b="0" i="0" u="none" strike="noStrike" cap="none" normalizeH="0" baseline="0" dirty="0" smtClean="0">
+                          <a:ln>
+                            <a:noFill/>
+                          </a:ln>
+                          <a:solidFill>
+                            <a:schemeClr val="tx1"/>
+                          </a:solidFill>
+                          <a:effectLst/>
+                          <a:latin typeface="Arial" charset="0"/>
+                        </a:rPr>
+                        <a:t> </a:t>
+                      </a:r>
+                      <a:r>
+                        <a:rPr kumimoji="0" lang="en-US" sz="1000" b="0" i="0" u="none" strike="noStrike" cap="none" normalizeH="0" baseline="0" dirty="0" err="1" smtClean="0">
+                          <a:ln>
+                            <a:noFill/>
+                          </a:ln>
+                          <a:solidFill>
+                            <a:schemeClr val="tx1"/>
+                          </a:solidFill>
+                          <a:effectLst/>
+                          <a:latin typeface="Arial" charset="0"/>
+                        </a:rPr>
+                        <a:t>ein</a:t>
+                      </a:r>
+                      <a:r>
+                        <a:rPr kumimoji="0" lang="en-US" sz="1000" b="0" i="0" u="none" strike="noStrike" cap="none" normalizeH="0" baseline="0" dirty="0" smtClean="0">
+                          <a:ln>
+                            <a:noFill/>
+                          </a:ln>
+                          <a:solidFill>
+                            <a:schemeClr val="tx1"/>
+                          </a:solidFill>
+                          <a:effectLst/>
+                          <a:latin typeface="Arial" charset="0"/>
+                        </a:rPr>
+                        <a:t> </a:t>
+                      </a:r>
+                      <a:r>
+                        <a:rPr kumimoji="0" lang="en-US" sz="1000" b="0" i="0" u="none" strike="noStrike" cap="none" normalizeH="0" baseline="0" dirty="0" err="1" smtClean="0">
+                          <a:ln>
+                            <a:noFill/>
+                          </a:ln>
+                          <a:solidFill>
+                            <a:schemeClr val="tx1"/>
+                          </a:solidFill>
+                          <a:effectLst/>
+                          <a:latin typeface="Arial" charset="0"/>
+                        </a:rPr>
+                        <a:t>sehr</a:t>
+                      </a:r>
+                      <a:r>
+                        <a:rPr kumimoji="0" lang="en-US" sz="1000" b="0" i="0" u="none" strike="noStrike" cap="none" normalizeH="0" baseline="0" dirty="0" smtClean="0">
+                          <a:ln>
+                            <a:noFill/>
+                          </a:ln>
+                          <a:solidFill>
+                            <a:schemeClr val="tx1"/>
+                          </a:solidFill>
+                          <a:effectLst/>
+                          <a:latin typeface="Arial" charset="0"/>
+                        </a:rPr>
+                        <a:t> </a:t>
+                      </a:r>
+                      <a:r>
+                        <a:rPr kumimoji="0" lang="en-US" sz="1000" b="0" i="0" u="none" strike="noStrike" cap="none" normalizeH="0" baseline="0" dirty="0" err="1" smtClean="0">
+                          <a:ln>
+                            <a:noFill/>
+                          </a:ln>
+                          <a:solidFill>
+                            <a:schemeClr val="tx1"/>
+                          </a:solidFill>
+                          <a:effectLst/>
+                          <a:latin typeface="Arial" charset="0"/>
+                        </a:rPr>
+                        <a:t>ordentlicher</a:t>
+                      </a:r>
+                      <a:r>
+                        <a:rPr kumimoji="0" lang="en-US" sz="1000" b="0" i="0" u="none" strike="noStrike" cap="none" normalizeH="0" baseline="0" dirty="0" smtClean="0">
+                          <a:ln>
+                            <a:noFill/>
+                          </a:ln>
+                          <a:solidFill>
+                            <a:schemeClr val="tx1"/>
+                          </a:solidFill>
+                          <a:effectLst/>
+                          <a:latin typeface="Arial" charset="0"/>
+                        </a:rPr>
+                        <a:t> Mensch und mag </a:t>
+                      </a:r>
+                      <a:r>
+                        <a:rPr kumimoji="0" lang="en-US" sz="1000" b="0" i="0" u="none" strike="noStrike" cap="none" normalizeH="0" baseline="0" dirty="0" err="1" smtClean="0">
+                          <a:ln>
+                            <a:noFill/>
+                          </a:ln>
+                          <a:solidFill>
+                            <a:schemeClr val="tx1"/>
+                          </a:solidFill>
+                          <a:effectLst/>
+                          <a:latin typeface="Arial" charset="0"/>
+                        </a:rPr>
+                        <a:t>deshalb</a:t>
+                      </a:r>
+                      <a:r>
+                        <a:rPr kumimoji="0" lang="en-US" sz="1000" b="0" i="0" u="none" strike="noStrike" cap="none" normalizeH="0" baseline="0" dirty="0" smtClean="0">
+                          <a:ln>
+                            <a:noFill/>
+                          </a:ln>
+                          <a:solidFill>
+                            <a:schemeClr val="tx1"/>
+                          </a:solidFill>
+                          <a:effectLst/>
+                          <a:latin typeface="Arial" charset="0"/>
+                        </a:rPr>
+                        <a:t> </a:t>
+                      </a:r>
+                      <a:r>
+                        <a:rPr kumimoji="0" lang="en-US" sz="1000" b="0" i="0" u="none" strike="noStrike" cap="none" normalizeH="0" baseline="0" dirty="0" err="1" smtClean="0">
+                          <a:ln>
+                            <a:noFill/>
+                          </a:ln>
+                          <a:solidFill>
+                            <a:schemeClr val="tx1"/>
+                          </a:solidFill>
+                          <a:effectLst/>
+                          <a:latin typeface="Arial" charset="0"/>
+                        </a:rPr>
+                        <a:t>auch</a:t>
+                      </a:r>
+                      <a:r>
+                        <a:rPr kumimoji="0" lang="en-US" sz="1000" b="0" i="0" u="none" strike="noStrike" cap="none" normalizeH="0" baseline="0" dirty="0" smtClean="0">
+                          <a:ln>
+                            <a:noFill/>
+                          </a:ln>
+                          <a:solidFill>
+                            <a:schemeClr val="tx1"/>
+                          </a:solidFill>
+                          <a:effectLst/>
+                          <a:latin typeface="Arial" charset="0"/>
+                        </a:rPr>
+                        <a:t> </a:t>
+                      </a:r>
+                      <a:r>
+                        <a:rPr kumimoji="0" lang="en-US" sz="1000" b="0" i="0" u="none" strike="noStrike" cap="none" normalizeH="0" baseline="0" dirty="0" err="1" smtClean="0">
+                          <a:ln>
+                            <a:noFill/>
+                          </a:ln>
+                          <a:solidFill>
+                            <a:schemeClr val="tx1"/>
+                          </a:solidFill>
+                          <a:effectLst/>
+                          <a:latin typeface="Arial" charset="0"/>
+                        </a:rPr>
+                        <a:t>aufgeräumte</a:t>
+                      </a:r>
+                      <a:r>
+                        <a:rPr kumimoji="0" lang="en-US" sz="1000" b="0" i="0" u="none" strike="noStrike" cap="none" normalizeH="0" baseline="0" dirty="0" smtClean="0">
+                          <a:ln>
+                            <a:noFill/>
+                          </a:ln>
+                          <a:solidFill>
+                            <a:schemeClr val="tx1"/>
+                          </a:solidFill>
+                          <a:effectLst/>
+                          <a:latin typeface="Arial" charset="0"/>
+                        </a:rPr>
+                        <a:t> </a:t>
+                      </a:r>
+                      <a:r>
+                        <a:rPr kumimoji="0" lang="en-US" sz="1000" b="0" i="0" u="none" strike="noStrike" cap="none" normalizeH="0" baseline="0" dirty="0" err="1" smtClean="0">
+                          <a:ln>
+                            <a:noFill/>
+                          </a:ln>
+                          <a:solidFill>
+                            <a:schemeClr val="tx1"/>
+                          </a:solidFill>
+                          <a:effectLst/>
+                          <a:latin typeface="Arial" charset="0"/>
+                        </a:rPr>
+                        <a:t>Strukturen</a:t>
+                      </a:r>
+                      <a:r>
+                        <a:rPr kumimoji="0" lang="en-US" sz="1000" b="0" i="0" u="none" strike="noStrike" cap="none" normalizeH="0" baseline="0" dirty="0" smtClean="0">
+                          <a:ln>
+                            <a:noFill/>
+                          </a:ln>
+                          <a:solidFill>
+                            <a:schemeClr val="tx1"/>
+                          </a:solidFill>
+                          <a:effectLst/>
+                          <a:latin typeface="Arial" charset="0"/>
+                        </a:rPr>
+                        <a:t> </a:t>
+                      </a:r>
+                      <a:endParaRPr kumimoji="0" lang="en-US" sz="1000" b="0" i="0" u="none" strike="noStrike" cap="none" normalizeH="0" baseline="0" dirty="0" smtClean="0">
+                        <a:ln>
+                          <a:noFill/>
+                        </a:ln>
+                        <a:solidFill>
+                          <a:schemeClr val="tx1"/>
+                        </a:solidFill>
+                        <a:effectLst/>
+                        <a:latin typeface="Arial" charset="0"/>
+                      </a:endParaRPr>
                     </a:p>
                   </a:txBody>
                   <a:tcPr marL="90488" marR="90488" marT="44450" marB="44450" horzOverflow="overflow">
@@ -6787,18 +8896,370 @@
                         <a:tabLst/>
                       </a:pPr>
                       <a:r>
-                        <a:rPr kumimoji="0" lang="en-US" sz="1000" b="0" i="0" u="none" strike="noStrike" cap="none" normalizeH="0" baseline="0" smtClean="0">
-                          <a:ln>
-                            <a:noFill/>
-                          </a:ln>
-                          <a:solidFill>
-                            <a:schemeClr val="tx1"/>
-                          </a:solidFill>
-                          <a:effectLst/>
-                          <a:latin typeface="Arial" charset="0"/>
-                        </a:rPr>
-                        <a:t> …</a:t>
-                      </a:r>
+                        <a:rPr kumimoji="0" lang="en-US" sz="1000" b="0" i="0" u="none" strike="noStrike" cap="none" normalizeH="0" baseline="0" dirty="0" smtClean="0">
+                          <a:ln>
+                            <a:noFill/>
+                          </a:ln>
+                          <a:solidFill>
+                            <a:schemeClr val="tx1"/>
+                          </a:solidFill>
+                          <a:effectLst/>
+                          <a:latin typeface="Arial" charset="0"/>
+                        </a:rPr>
+                        <a:t> </a:t>
+                      </a:r>
+                      <a:r>
+                        <a:rPr kumimoji="0" lang="en-US" sz="1000" b="0" i="0" u="none" strike="noStrike" cap="none" normalizeH="0" baseline="0" dirty="0" smtClean="0">
+                          <a:ln>
+                            <a:noFill/>
+                          </a:ln>
+                          <a:solidFill>
+                            <a:schemeClr val="tx1"/>
+                          </a:solidFill>
+                          <a:effectLst/>
+                          <a:latin typeface="Arial" charset="0"/>
+                        </a:rPr>
+                        <a:t>Solange </a:t>
+                      </a:r>
+                      <a:r>
+                        <a:rPr kumimoji="0" lang="en-US" sz="1000" b="0" i="0" u="none" strike="noStrike" cap="none" normalizeH="0" baseline="0" dirty="0" err="1" smtClean="0">
+                          <a:ln>
+                            <a:noFill/>
+                          </a:ln>
+                          <a:solidFill>
+                            <a:schemeClr val="tx1"/>
+                          </a:solidFill>
+                          <a:effectLst/>
+                          <a:latin typeface="Arial" charset="0"/>
+                        </a:rPr>
+                        <a:t>eine</a:t>
+                      </a:r>
+                      <a:r>
+                        <a:rPr kumimoji="0" lang="en-US" sz="1000" b="0" i="0" u="none" strike="noStrike" cap="none" normalizeH="0" baseline="0" dirty="0" smtClean="0">
+                          <a:ln>
+                            <a:noFill/>
+                          </a:ln>
+                          <a:solidFill>
+                            <a:schemeClr val="tx1"/>
+                          </a:solidFill>
+                          <a:effectLst/>
+                          <a:latin typeface="Arial" charset="0"/>
+                        </a:rPr>
+                        <a:t> </a:t>
+                      </a:r>
+                      <a:r>
+                        <a:rPr kumimoji="0" lang="en-US" sz="1000" b="0" i="0" u="none" strike="noStrike" cap="none" normalizeH="0" baseline="0" dirty="0" err="1" smtClean="0">
+                          <a:ln>
+                            <a:noFill/>
+                          </a:ln>
+                          <a:solidFill>
+                            <a:schemeClr val="tx1"/>
+                          </a:solidFill>
+                          <a:effectLst/>
+                          <a:latin typeface="Arial" charset="0"/>
+                        </a:rPr>
+                        <a:t>einheitliche</a:t>
+                      </a:r>
+                      <a:r>
+                        <a:rPr kumimoji="0" lang="en-US" sz="1000" b="0" i="0" u="none" strike="noStrike" cap="none" normalizeH="0" baseline="0" dirty="0" smtClean="0">
+                          <a:ln>
+                            <a:noFill/>
+                          </a:ln>
+                          <a:solidFill>
+                            <a:schemeClr val="tx1"/>
+                          </a:solidFill>
+                          <a:effectLst/>
+                          <a:latin typeface="Arial" charset="0"/>
+                        </a:rPr>
+                        <a:t> </a:t>
+                      </a:r>
+                      <a:r>
+                        <a:rPr kumimoji="0" lang="en-US" sz="1000" b="0" i="0" u="none" strike="noStrike" cap="none" normalizeH="0" baseline="0" dirty="0" err="1" smtClean="0">
+                          <a:ln>
+                            <a:noFill/>
+                          </a:ln>
+                          <a:solidFill>
+                            <a:schemeClr val="tx1"/>
+                          </a:solidFill>
+                          <a:effectLst/>
+                          <a:latin typeface="Arial" charset="0"/>
+                        </a:rPr>
+                        <a:t>Struktur</a:t>
+                      </a:r>
+                      <a:r>
+                        <a:rPr kumimoji="0" lang="en-US" sz="1000" b="0" i="0" u="none" strike="noStrike" cap="none" normalizeH="0" baseline="0" dirty="0" smtClean="0">
+                          <a:ln>
+                            <a:noFill/>
+                          </a:ln>
+                          <a:solidFill>
+                            <a:schemeClr val="tx1"/>
+                          </a:solidFill>
+                          <a:effectLst/>
+                          <a:latin typeface="Arial" charset="0"/>
+                        </a:rPr>
+                        <a:t> und </a:t>
+                      </a:r>
+                      <a:r>
+                        <a:rPr kumimoji="0" lang="en-US" sz="1000" b="0" i="0" u="none" strike="noStrike" cap="none" normalizeH="0" baseline="0" dirty="0" err="1" smtClean="0">
+                          <a:ln>
+                            <a:noFill/>
+                          </a:ln>
+                          <a:solidFill>
+                            <a:schemeClr val="tx1"/>
+                          </a:solidFill>
+                          <a:effectLst/>
+                          <a:latin typeface="Arial" charset="0"/>
+                        </a:rPr>
+                        <a:t>Bezeichung</a:t>
+                      </a:r>
+                      <a:r>
+                        <a:rPr kumimoji="0" lang="en-US" sz="1000" b="0" i="0" u="none" strike="noStrike" cap="none" normalizeH="0" baseline="0" dirty="0" smtClean="0">
+                          <a:ln>
+                            <a:noFill/>
+                          </a:ln>
+                          <a:solidFill>
+                            <a:schemeClr val="tx1"/>
+                          </a:solidFill>
+                          <a:effectLst/>
+                          <a:latin typeface="Arial" charset="0"/>
+                        </a:rPr>
+                        <a:t> </a:t>
+                      </a:r>
+                      <a:r>
+                        <a:rPr kumimoji="0" lang="en-US" sz="1000" b="0" i="0" u="none" strike="noStrike" cap="none" normalizeH="0" baseline="0" dirty="0" err="1" smtClean="0">
+                          <a:ln>
+                            <a:noFill/>
+                          </a:ln>
+                          <a:solidFill>
+                            <a:schemeClr val="tx1"/>
+                          </a:solidFill>
+                          <a:effectLst/>
+                          <a:latin typeface="Arial" charset="0"/>
+                        </a:rPr>
+                        <a:t>vorhanden</a:t>
+                      </a:r>
+                      <a:r>
+                        <a:rPr kumimoji="0" lang="en-US" sz="1000" b="0" i="0" u="none" strike="noStrike" cap="none" normalizeH="0" baseline="0" dirty="0" smtClean="0">
+                          <a:ln>
+                            <a:noFill/>
+                          </a:ln>
+                          <a:solidFill>
+                            <a:schemeClr val="tx1"/>
+                          </a:solidFill>
+                          <a:effectLst/>
+                          <a:latin typeface="Arial" charset="0"/>
+                        </a:rPr>
+                        <a:t> </a:t>
+                      </a:r>
+                      <a:r>
+                        <a:rPr kumimoji="0" lang="en-US" sz="1000" b="0" i="0" u="none" strike="noStrike" cap="none" normalizeH="0" baseline="0" dirty="0" err="1" smtClean="0">
+                          <a:ln>
+                            <a:noFill/>
+                          </a:ln>
+                          <a:solidFill>
+                            <a:schemeClr val="tx1"/>
+                          </a:solidFill>
+                          <a:effectLst/>
+                          <a:latin typeface="Arial" charset="0"/>
+                        </a:rPr>
+                        <a:t>ist</a:t>
+                      </a:r>
+                      <a:r>
+                        <a:rPr kumimoji="0" lang="en-US" sz="1000" b="0" i="0" u="none" strike="noStrike" cap="none" normalizeH="0" baseline="0" dirty="0" smtClean="0">
+                          <a:ln>
+                            <a:noFill/>
+                          </a:ln>
+                          <a:solidFill>
+                            <a:schemeClr val="tx1"/>
+                          </a:solidFill>
+                          <a:effectLst/>
+                          <a:latin typeface="Arial" charset="0"/>
+                        </a:rPr>
+                        <a:t> </a:t>
+                      </a:r>
+                      <a:r>
+                        <a:rPr kumimoji="0" lang="en-US" sz="1000" b="0" i="0" u="none" strike="noStrike" cap="none" normalizeH="0" baseline="0" dirty="0" err="1" smtClean="0">
+                          <a:ln>
+                            <a:noFill/>
+                          </a:ln>
+                          <a:solidFill>
+                            <a:schemeClr val="tx1"/>
+                          </a:solidFill>
+                          <a:effectLst/>
+                          <a:latin typeface="Arial" charset="0"/>
+                        </a:rPr>
+                        <a:t>arbeitet</a:t>
+                      </a:r>
+                      <a:r>
+                        <a:rPr kumimoji="0" lang="en-US" sz="1000" b="0" i="0" u="none" strike="noStrike" cap="none" normalizeH="0" baseline="0" dirty="0" smtClean="0">
+                          <a:ln>
+                            <a:noFill/>
+                          </a:ln>
+                          <a:solidFill>
+                            <a:schemeClr val="tx1"/>
+                          </a:solidFill>
+                          <a:effectLst/>
+                          <a:latin typeface="Arial" charset="0"/>
+                        </a:rPr>
+                        <a:t> </a:t>
+                      </a:r>
+                      <a:r>
+                        <a:rPr kumimoji="0" lang="en-US" sz="1000" b="0" i="0" u="none" strike="noStrike" cap="none" normalizeH="0" baseline="0" dirty="0" err="1" smtClean="0">
+                          <a:ln>
+                            <a:noFill/>
+                          </a:ln>
+                          <a:solidFill>
+                            <a:schemeClr val="tx1"/>
+                          </a:solidFill>
+                          <a:effectLst/>
+                          <a:latin typeface="Arial" charset="0"/>
+                        </a:rPr>
+                        <a:t>sie</a:t>
+                      </a:r>
+                      <a:r>
+                        <a:rPr kumimoji="0" lang="en-US" sz="1000" b="0" i="0" u="none" strike="noStrike" cap="none" normalizeH="0" baseline="0" dirty="0" smtClean="0">
+                          <a:ln>
+                            <a:noFill/>
+                          </a:ln>
+                          <a:solidFill>
+                            <a:schemeClr val="tx1"/>
+                          </a:solidFill>
+                          <a:effectLst/>
+                          <a:latin typeface="Arial" charset="0"/>
+                        </a:rPr>
+                        <a:t> </a:t>
+                      </a:r>
+                      <a:r>
+                        <a:rPr kumimoji="0" lang="en-US" sz="1000" b="0" i="0" u="none" strike="noStrike" cap="none" normalizeH="0" baseline="0" dirty="0" err="1" smtClean="0">
+                          <a:ln>
+                            <a:noFill/>
+                          </a:ln>
+                          <a:solidFill>
+                            <a:schemeClr val="tx1"/>
+                          </a:solidFill>
+                          <a:effectLst/>
+                          <a:latin typeface="Arial" charset="0"/>
+                        </a:rPr>
+                        <a:t>gerne</a:t>
+                      </a:r>
+                      <a:r>
+                        <a:rPr kumimoji="0" lang="en-US" sz="1000" b="0" i="0" u="none" strike="noStrike" cap="none" normalizeH="0" baseline="0" dirty="0" smtClean="0">
+                          <a:ln>
+                            <a:noFill/>
+                          </a:ln>
+                          <a:solidFill>
+                            <a:schemeClr val="tx1"/>
+                          </a:solidFill>
+                          <a:effectLst/>
+                          <a:latin typeface="Arial" charset="0"/>
+                        </a:rPr>
+                        <a:t> </a:t>
+                      </a:r>
+                      <a:r>
+                        <a:rPr kumimoji="0" lang="en-US" sz="1000" b="0" i="0" u="none" strike="noStrike" cap="none" normalizeH="0" baseline="0" dirty="0" err="1" smtClean="0">
+                          <a:ln>
+                            <a:noFill/>
+                          </a:ln>
+                          <a:solidFill>
+                            <a:schemeClr val="tx1"/>
+                          </a:solidFill>
+                          <a:effectLst/>
+                          <a:latin typeface="Arial" charset="0"/>
+                        </a:rPr>
+                        <a:t>mit</a:t>
+                      </a:r>
+                      <a:r>
+                        <a:rPr kumimoji="0" lang="en-US" sz="1000" b="0" i="0" u="none" strike="noStrike" cap="none" normalizeH="0" baseline="0" dirty="0" smtClean="0">
+                          <a:ln>
+                            <a:noFill/>
+                          </a:ln>
+                          <a:solidFill>
+                            <a:schemeClr val="tx1"/>
+                          </a:solidFill>
+                          <a:effectLst/>
+                          <a:latin typeface="Arial" charset="0"/>
+                        </a:rPr>
+                        <a:t> </a:t>
+                      </a:r>
+                      <a:r>
+                        <a:rPr kumimoji="0" lang="en-US" sz="1000" b="0" i="0" u="none" strike="noStrike" cap="none" normalizeH="0" baseline="0" dirty="0" err="1" smtClean="0">
+                          <a:ln>
+                            <a:noFill/>
+                          </a:ln>
+                          <a:solidFill>
+                            <a:schemeClr val="tx1"/>
+                          </a:solidFill>
+                          <a:effectLst/>
+                          <a:latin typeface="Arial" charset="0"/>
+                        </a:rPr>
+                        <a:t>neuen</a:t>
+                      </a:r>
+                      <a:r>
+                        <a:rPr kumimoji="0" lang="en-US" sz="1000" b="0" i="0" u="none" strike="noStrike" cap="none" normalizeH="0" baseline="0" dirty="0" smtClean="0">
+                          <a:ln>
+                            <a:noFill/>
+                          </a:ln>
+                          <a:solidFill>
+                            <a:schemeClr val="tx1"/>
+                          </a:solidFill>
+                          <a:effectLst/>
+                          <a:latin typeface="Arial" charset="0"/>
+                        </a:rPr>
+                        <a:t> </a:t>
+                      </a:r>
+                      <a:r>
+                        <a:rPr kumimoji="0" lang="en-US" sz="1000" b="0" i="0" u="none" strike="noStrike" cap="none" normalizeH="0" baseline="0" dirty="0" err="1" smtClean="0">
+                          <a:ln>
+                            <a:noFill/>
+                          </a:ln>
+                          <a:solidFill>
+                            <a:schemeClr val="tx1"/>
+                          </a:solidFill>
+                          <a:effectLst/>
+                          <a:latin typeface="Arial" charset="0"/>
+                        </a:rPr>
+                        <a:t>Sachen</a:t>
+                      </a:r>
+                      <a:endParaRPr kumimoji="0" lang="en-US" sz="1000" b="0" i="0" u="none" strike="noStrike" cap="none" normalizeH="0" baseline="0" dirty="0" smtClean="0">
+                        <a:ln>
+                          <a:noFill/>
+                        </a:ln>
+                        <a:solidFill>
+                          <a:schemeClr val="tx1"/>
+                        </a:solidFill>
+                        <a:effectLst/>
+                        <a:latin typeface="Arial" charset="0"/>
+                      </a:endParaRPr>
+                    </a:p>
+                    <a:p>
+                      <a:pPr marL="0" marR="0" lvl="0" indent="0" algn="l" defTabSz="914400" rtl="0" eaLnBrk="1" fontAlgn="base" latinLnBrk="0" hangingPunct="1">
+                        <a:lnSpc>
+                          <a:spcPct val="100000"/>
+                        </a:lnSpc>
+                        <a:spcBef>
+                          <a:spcPct val="20000"/>
+                        </a:spcBef>
+                        <a:spcAft>
+                          <a:spcPct val="0"/>
+                        </a:spcAft>
+                        <a:buClr>
+                          <a:schemeClr val="accent2"/>
+                        </a:buClr>
+                        <a:buSzPct val="100000"/>
+                        <a:buFont typeface="Wingdings" pitchFamily="2" charset="2"/>
+                        <a:buChar char="§"/>
+                        <a:tabLst/>
+                      </a:pPr>
+                      <a:endParaRPr kumimoji="0" lang="en-US" sz="1000" b="0" i="0" u="none" strike="noStrike" cap="none" normalizeH="0" baseline="0" dirty="0" smtClean="0">
+                        <a:ln>
+                          <a:noFill/>
+                        </a:ln>
+                        <a:solidFill>
+                          <a:schemeClr val="tx1"/>
+                        </a:solidFill>
+                        <a:effectLst/>
+                        <a:latin typeface="Arial" charset="0"/>
+                      </a:endParaRPr>
                     </a:p>
                   </a:txBody>
                   <a:tcPr marL="90488" marR="90488" marT="44450" marB="44450" horzOverflow="overflow">
@@ -6937,8 +9398,239 @@
                           <a:effectLst/>
                           <a:latin typeface="Arial" charset="0"/>
                         </a:rPr>
-                        <a:t> …</a:t>
-                      </a:r>
+                        <a:t> </a:t>
+                      </a:r>
+                      <a:r>
+                        <a:rPr kumimoji="0" lang="en-US" sz="1000" b="0" i="0" u="none" strike="noStrike" cap="none" normalizeH="0" baseline="0" dirty="0" err="1" smtClean="0">
+                          <a:ln>
+                            <a:noFill/>
+                          </a:ln>
+                          <a:solidFill>
+                            <a:schemeClr val="tx1"/>
+                          </a:solidFill>
+                          <a:effectLst/>
+                          <a:latin typeface="Arial" charset="0"/>
+                        </a:rPr>
+                        <a:t>Ist</a:t>
+                      </a:r>
+                      <a:r>
+                        <a:rPr kumimoji="0" lang="en-US" sz="1000" b="0" i="0" u="none" strike="noStrike" cap="none" normalizeH="0" baseline="0" dirty="0" smtClean="0">
+                          <a:ln>
+                            <a:noFill/>
+                          </a:ln>
+                          <a:solidFill>
+                            <a:schemeClr val="tx1"/>
+                          </a:solidFill>
+                          <a:effectLst/>
+                          <a:latin typeface="Arial" charset="0"/>
+                        </a:rPr>
+                        <a:t> </a:t>
+                      </a:r>
+                      <a:r>
+                        <a:rPr kumimoji="0" lang="en-US" sz="1000" b="0" i="0" u="none" strike="noStrike" cap="none" normalizeH="0" baseline="0" dirty="0" err="1" smtClean="0">
+                          <a:ln>
+                            <a:noFill/>
+                          </a:ln>
+                          <a:solidFill>
+                            <a:schemeClr val="tx1"/>
+                          </a:solidFill>
+                          <a:effectLst/>
+                          <a:latin typeface="Arial" charset="0"/>
+                        </a:rPr>
+                        <a:t>neu</a:t>
+                      </a:r>
+                      <a:r>
+                        <a:rPr kumimoji="0" lang="en-US" sz="1000" b="0" i="0" u="none" strike="noStrike" cap="none" normalizeH="0" baseline="0" dirty="0" smtClean="0">
+                          <a:ln>
+                            <a:noFill/>
+                          </a:ln>
+                          <a:solidFill>
+                            <a:schemeClr val="tx1"/>
+                          </a:solidFill>
+                          <a:effectLst/>
+                          <a:latin typeface="Arial" charset="0"/>
+                        </a:rPr>
+                        <a:t> an der </a:t>
+                      </a:r>
+                      <a:r>
+                        <a:rPr kumimoji="0" lang="en-US" sz="1000" b="0" i="0" u="none" strike="noStrike" cap="none" normalizeH="0" baseline="0" dirty="0" err="1" smtClean="0">
+                          <a:ln>
+                            <a:noFill/>
+                          </a:ln>
+                          <a:solidFill>
+                            <a:schemeClr val="tx1"/>
+                          </a:solidFill>
+                          <a:effectLst/>
+                          <a:latin typeface="Arial" charset="0"/>
+                        </a:rPr>
+                        <a:t>Uni</a:t>
+                      </a:r>
+                      <a:r>
+                        <a:rPr kumimoji="0" lang="en-US" sz="1000" b="0" i="0" u="none" strike="noStrike" cap="none" normalizeH="0" baseline="0" dirty="0" smtClean="0">
+                          <a:ln>
+                            <a:noFill/>
+                          </a:ln>
+                          <a:solidFill>
+                            <a:schemeClr val="tx1"/>
+                          </a:solidFill>
+                          <a:effectLst/>
+                          <a:latin typeface="Arial" charset="0"/>
+                        </a:rPr>
+                        <a:t> und </a:t>
+                      </a:r>
+                      <a:r>
+                        <a:rPr kumimoji="0" lang="en-US" sz="1000" b="0" i="0" u="none" strike="noStrike" cap="none" normalizeH="0" baseline="0" dirty="0" err="1" smtClean="0">
+                          <a:ln>
+                            <a:noFill/>
+                          </a:ln>
+                          <a:solidFill>
+                            <a:schemeClr val="tx1"/>
+                          </a:solidFill>
+                          <a:effectLst/>
+                          <a:latin typeface="Arial" charset="0"/>
+                        </a:rPr>
+                        <a:t>möchte</a:t>
+                      </a:r>
+                      <a:r>
+                        <a:rPr kumimoji="0" lang="en-US" sz="1000" b="0" i="0" u="none" strike="noStrike" cap="none" normalizeH="0" baseline="0" dirty="0" smtClean="0">
+                          <a:ln>
+                            <a:noFill/>
+                          </a:ln>
+                          <a:solidFill>
+                            <a:schemeClr val="tx1"/>
+                          </a:solidFill>
+                          <a:effectLst/>
+                          <a:latin typeface="Arial" charset="0"/>
+                        </a:rPr>
+                        <a:t> </a:t>
+                      </a:r>
+                      <a:r>
+                        <a:rPr kumimoji="0" lang="en-US" sz="1000" b="0" i="0" u="none" strike="noStrike" cap="none" normalizeH="0" baseline="0" dirty="0" err="1" smtClean="0">
+                          <a:ln>
+                            <a:noFill/>
+                          </a:ln>
+                          <a:solidFill>
+                            <a:schemeClr val="tx1"/>
+                          </a:solidFill>
+                          <a:effectLst/>
+                          <a:latin typeface="Arial" charset="0"/>
+                        </a:rPr>
+                        <a:t>wissen</a:t>
+                      </a:r>
+                      <a:r>
+                        <a:rPr kumimoji="0" lang="en-US" sz="1000" b="0" i="0" u="none" strike="noStrike" cap="none" normalizeH="0" baseline="0" dirty="0" smtClean="0">
+                          <a:ln>
+                            <a:noFill/>
+                          </a:ln>
+                          <a:solidFill>
+                            <a:schemeClr val="tx1"/>
+                          </a:solidFill>
+                          <a:effectLst/>
+                          <a:latin typeface="Arial" charset="0"/>
+                        </a:rPr>
+                        <a:t> </a:t>
+                      </a:r>
+                      <a:r>
+                        <a:rPr kumimoji="0" lang="en-US" sz="1000" b="0" i="0" u="none" strike="noStrike" cap="none" normalizeH="0" baseline="0" dirty="0" err="1" smtClean="0">
+                          <a:ln>
+                            <a:noFill/>
+                          </a:ln>
+                          <a:solidFill>
+                            <a:schemeClr val="tx1"/>
+                          </a:solidFill>
+                          <a:effectLst/>
+                          <a:latin typeface="Arial" charset="0"/>
+                        </a:rPr>
+                        <a:t>wie</a:t>
+                      </a:r>
+                      <a:r>
+                        <a:rPr kumimoji="0" lang="en-US" sz="1000" b="0" i="0" u="none" strike="noStrike" cap="none" normalizeH="0" baseline="0" dirty="0" smtClean="0">
+                          <a:ln>
+                            <a:noFill/>
+                          </a:ln>
+                          <a:solidFill>
+                            <a:schemeClr val="tx1"/>
+                          </a:solidFill>
+                          <a:effectLst/>
+                          <a:latin typeface="Arial" charset="0"/>
+                        </a:rPr>
+                        <a:t> </a:t>
+                      </a:r>
+                      <a:r>
+                        <a:rPr kumimoji="0" lang="en-US" sz="1000" b="0" i="0" u="none" strike="noStrike" cap="none" normalizeH="0" baseline="0" dirty="0" err="1" smtClean="0">
+                          <a:ln>
+                            <a:noFill/>
+                          </a:ln>
+                          <a:solidFill>
+                            <a:schemeClr val="tx1"/>
+                          </a:solidFill>
+                          <a:effectLst/>
+                          <a:latin typeface="Arial" charset="0"/>
+                        </a:rPr>
+                        <a:t>hier</a:t>
+                      </a:r>
+                      <a:r>
+                        <a:rPr kumimoji="0" lang="en-US" sz="1000" b="0" i="0" u="none" strike="noStrike" cap="none" normalizeH="0" baseline="0" dirty="0" smtClean="0">
+                          <a:ln>
+                            <a:noFill/>
+                          </a:ln>
+                          <a:solidFill>
+                            <a:schemeClr val="tx1"/>
+                          </a:solidFill>
+                          <a:effectLst/>
+                          <a:latin typeface="Arial" charset="0"/>
+                        </a:rPr>
+                        <a:t> die </a:t>
+                      </a:r>
+                      <a:r>
+                        <a:rPr kumimoji="0" lang="en-US" sz="1000" b="0" i="0" u="none" strike="noStrike" cap="none" normalizeH="0" baseline="0" dirty="0" err="1" smtClean="0">
+                          <a:ln>
+                            <a:noFill/>
+                          </a:ln>
+                          <a:solidFill>
+                            <a:schemeClr val="tx1"/>
+                          </a:solidFill>
+                          <a:effectLst/>
+                          <a:latin typeface="Arial" charset="0"/>
+                        </a:rPr>
+                        <a:t>Sachen</a:t>
+                      </a:r>
+                      <a:r>
+                        <a:rPr kumimoji="0" lang="en-US" sz="1000" b="0" i="0" u="none" strike="noStrike" cap="none" normalizeH="0" baseline="0" dirty="0" smtClean="0">
+                          <a:ln>
+                            <a:noFill/>
+                          </a:ln>
+                          <a:solidFill>
+                            <a:schemeClr val="tx1"/>
+                          </a:solidFill>
+                          <a:effectLst/>
+                          <a:latin typeface="Arial" charset="0"/>
+                        </a:rPr>
+                        <a:t> so </a:t>
+                      </a:r>
+                      <a:r>
+                        <a:rPr kumimoji="0" lang="en-US" sz="1000" b="0" i="0" u="none" strike="noStrike" cap="none" normalizeH="0" baseline="0" dirty="0" err="1" smtClean="0">
+                          <a:ln>
+                            <a:noFill/>
+                          </a:ln>
+                          <a:solidFill>
+                            <a:schemeClr val="tx1"/>
+                          </a:solidFill>
+                          <a:effectLst/>
+                          <a:latin typeface="Arial" charset="0"/>
+                        </a:rPr>
+                        <a:t>laufen</a:t>
+                      </a:r>
+                      <a:endParaRPr kumimoji="0" lang="en-US" sz="1000" b="0" i="0" u="none" strike="noStrike" cap="none" normalizeH="0" baseline="0" dirty="0" smtClean="0">
+                        <a:ln>
+                          <a:noFill/>
+                        </a:ln>
+                        <a:solidFill>
+                          <a:schemeClr val="tx1"/>
+                        </a:solidFill>
+                        <a:effectLst/>
+                        <a:latin typeface="Arial" charset="0"/>
+                      </a:endParaRPr>
                     </a:p>
                   </a:txBody>
                   <a:tcPr marL="90488" marR="90488" marT="44450" marB="44450" horzOverflow="overflow">
@@ -7091,26 +9783,468 @@
           <a:lstStyle/>
           <a:p>
             <a:r>
-              <a:rPr lang="en-US" sz="1800" smtClean="0"/>
-              <a:t> Christina </a:t>
-            </a:r>
-            <a:r>
-              <a:rPr lang="de-DE" sz="1800" smtClean="0"/>
-              <a:t>ist 25 Jahre alt und schreibt gerade ihre Doktorarbeit in Physik. Hierfür benötigt sie einige kostenpflichtige Programme, welche sie jedoch über das Rechenzentrum umsonst bekommt.</a:t>
-            </a:r>
-          </a:p>
-          <a:p>
-            <a:r>
-              <a:rPr lang="de-DE" sz="1800" smtClean="0"/>
-              <a:t>Das ändern des Passworts macht Christina immer so spät wie möglich, damit Sie ihr aktuelles Passwort so lange wie möglich behalten kann, weshalb Sie ihr Passwort immer direkt über die RZ Seite ändert und nicht über den direktlink in der E-Mail</a:t>
-            </a:r>
-          </a:p>
-          <a:p>
-            <a:r>
-              <a:rPr lang="de-DE" sz="1800" smtClean="0"/>
-              <a:t>Da Christina ihre Ergebnisse lieber auf Papier ausgedruckt auswertet, muss sie regelmäßig ihr Guthaben aufladen</a:t>
-            </a:r>
-            <a:endParaRPr lang="en-US" sz="1400"/>
+              <a:rPr lang="en-US" sz="1800" dirty="0" err="1" smtClean="0"/>
+              <a:t>Franziska</a:t>
+            </a:r>
+            <a:r>
+              <a:rPr lang="en-US" sz="1800" dirty="0" smtClean="0"/>
+              <a:t> </a:t>
+            </a:r>
+            <a:r>
+              <a:rPr lang="en-US" sz="1800" dirty="0" err="1" smtClean="0"/>
+              <a:t>ist</a:t>
+            </a:r>
+            <a:r>
+              <a:rPr lang="en-US" sz="1800" dirty="0" smtClean="0"/>
+              <a:t> 42 </a:t>
+            </a:r>
+            <a:r>
+              <a:rPr lang="en-US" sz="1800" dirty="0" err="1" smtClean="0"/>
+              <a:t>Jahre</a:t>
+            </a:r>
+            <a:r>
+              <a:rPr lang="en-US" sz="1800" dirty="0" smtClean="0"/>
+              <a:t> alt und </a:t>
+            </a:r>
+            <a:r>
+              <a:rPr lang="en-US" sz="1800" dirty="0" err="1" smtClean="0"/>
+              <a:t>neu</a:t>
+            </a:r>
+            <a:r>
+              <a:rPr lang="en-US" sz="1800" dirty="0" smtClean="0"/>
+              <a:t> an der </a:t>
+            </a:r>
+            <a:r>
+              <a:rPr lang="en-US" sz="1800" dirty="0" err="1" smtClean="0"/>
+              <a:t>Universität</a:t>
+            </a:r>
+            <a:r>
+              <a:rPr lang="en-US" sz="1800" dirty="0" smtClean="0"/>
+              <a:t> Regensburg. </a:t>
+            </a:r>
+            <a:endParaRPr lang="en-US" sz="1800" dirty="0"/>
+          </a:p>
+          <a:p>
+            <a:r>
+              <a:rPr lang="en-US" sz="1800" dirty="0" err="1" smtClean="0"/>
+              <a:t>Familie</a:t>
+            </a:r>
+            <a:r>
+              <a:rPr lang="en-US" sz="1800" dirty="0" smtClean="0"/>
+              <a:t> hat </a:t>
+            </a:r>
+            <a:r>
+              <a:rPr lang="en-US" sz="1800" dirty="0" err="1" smtClean="0"/>
+              <a:t>sie</a:t>
+            </a:r>
+            <a:r>
+              <a:rPr lang="en-US" sz="1800" dirty="0" smtClean="0"/>
+              <a:t> </a:t>
+            </a:r>
+            <a:r>
+              <a:rPr lang="en-US" sz="1800" dirty="0" err="1" smtClean="0"/>
+              <a:t>keine</a:t>
+            </a:r>
+            <a:r>
+              <a:rPr lang="en-US" sz="1800" dirty="0" smtClean="0"/>
+              <a:t> </a:t>
+            </a:r>
+            <a:r>
+              <a:rPr lang="en-US" sz="1800" dirty="0" err="1" smtClean="0"/>
+              <a:t>mehr</a:t>
+            </a:r>
+            <a:r>
+              <a:rPr lang="en-US" sz="1800" dirty="0" smtClean="0"/>
+              <a:t>, da </a:t>
+            </a:r>
+            <a:r>
+              <a:rPr lang="en-US" sz="1800" dirty="0" err="1" smtClean="0"/>
+              <a:t>sie</a:t>
+            </a:r>
+            <a:r>
+              <a:rPr lang="en-US" sz="1800" dirty="0" smtClean="0"/>
+              <a:t> </a:t>
+            </a:r>
+            <a:r>
+              <a:rPr lang="en-US" sz="1800" dirty="0" err="1" smtClean="0"/>
+              <a:t>als</a:t>
+            </a:r>
+            <a:r>
+              <a:rPr lang="en-US" sz="1800" dirty="0" smtClean="0"/>
+              <a:t> </a:t>
+            </a:r>
+            <a:r>
+              <a:rPr lang="en-US" sz="1800" dirty="0" err="1" smtClean="0"/>
+              <a:t>Einzelkind</a:t>
+            </a:r>
+            <a:r>
+              <a:rPr lang="en-US" sz="1800" dirty="0" smtClean="0"/>
+              <a:t> </a:t>
+            </a:r>
+            <a:r>
+              <a:rPr lang="en-US" sz="1800" dirty="0" err="1" smtClean="0"/>
+              <a:t>aufgewachsen</a:t>
+            </a:r>
+            <a:r>
+              <a:rPr lang="en-US" sz="1800" dirty="0" smtClean="0"/>
+              <a:t> </a:t>
+            </a:r>
+            <a:r>
+              <a:rPr lang="de-DE" sz="1800" dirty="0" smtClean="0"/>
+              <a:t>ist und ihre Eltern bereits verstorben sind. Nach Regensburg ist Franziska gegangen, da hier ihr Lebensgefährt arbeitet und wohnt. </a:t>
+            </a:r>
+          </a:p>
+          <a:p>
+            <a:r>
+              <a:rPr lang="en-US" sz="1800" dirty="0" err="1" smtClean="0"/>
+              <a:t>Bei</a:t>
+            </a:r>
+            <a:r>
+              <a:rPr lang="en-US" sz="1800" dirty="0" smtClean="0"/>
+              <a:t> </a:t>
+            </a:r>
+            <a:r>
+              <a:rPr lang="en-US" sz="1800" dirty="0" err="1" smtClean="0"/>
+              <a:t>technischen</a:t>
+            </a:r>
+            <a:r>
+              <a:rPr lang="en-US" sz="1800" dirty="0" smtClean="0"/>
+              <a:t> </a:t>
+            </a:r>
+            <a:r>
+              <a:rPr lang="en-US" sz="1800" dirty="0" err="1" smtClean="0"/>
+              <a:t>Fragen</a:t>
+            </a:r>
+            <a:r>
+              <a:rPr lang="en-US" sz="1800" dirty="0" smtClean="0"/>
+              <a:t> hat </a:t>
+            </a:r>
+            <a:r>
+              <a:rPr lang="en-US" sz="1800" dirty="0" err="1" smtClean="0"/>
+              <a:t>sie</a:t>
+            </a:r>
+            <a:r>
+              <a:rPr lang="en-US" sz="1800" dirty="0" smtClean="0"/>
+              <a:t> in </a:t>
+            </a:r>
+            <a:r>
+              <a:rPr lang="en-US" sz="1800" dirty="0" err="1" smtClean="0"/>
+              <a:t>ihrer</a:t>
+            </a:r>
+            <a:r>
+              <a:rPr lang="en-US" sz="1800" dirty="0" smtClean="0"/>
+              <a:t> </a:t>
+            </a:r>
+            <a:r>
+              <a:rPr lang="en-US" sz="1800" dirty="0" err="1" smtClean="0"/>
+              <a:t>alten</a:t>
+            </a:r>
+            <a:r>
+              <a:rPr lang="en-US" sz="1800" dirty="0" smtClean="0"/>
+              <a:t> </a:t>
+            </a:r>
+            <a:r>
+              <a:rPr lang="en-US" sz="1800" dirty="0" err="1" smtClean="0"/>
+              <a:t>Universität</a:t>
+            </a:r>
+            <a:r>
+              <a:rPr lang="en-US" sz="1800" dirty="0" smtClean="0"/>
+              <a:t> </a:t>
+            </a:r>
+            <a:r>
+              <a:rPr lang="en-US" sz="1800" dirty="0" err="1" smtClean="0"/>
+              <a:t>immer</a:t>
+            </a:r>
+            <a:r>
+              <a:rPr lang="en-US" sz="1800" dirty="0" smtClean="0"/>
+              <a:t> den Support </a:t>
+            </a:r>
+            <a:r>
+              <a:rPr lang="en-US" sz="1800" dirty="0" err="1" smtClean="0"/>
+              <a:t>angerufen</a:t>
+            </a:r>
+            <a:r>
+              <a:rPr lang="en-US" sz="1800" dirty="0" smtClean="0"/>
+              <a:t>, </a:t>
+            </a:r>
+            <a:r>
+              <a:rPr lang="en-US" sz="1800" dirty="0" err="1" smtClean="0"/>
+              <a:t>welcher</a:t>
+            </a:r>
+            <a:r>
+              <a:rPr lang="en-US" sz="1800" dirty="0" smtClean="0"/>
+              <a:t> </a:t>
+            </a:r>
+            <a:r>
+              <a:rPr lang="en-US" sz="1800" dirty="0" err="1" smtClean="0"/>
+              <a:t>dann</a:t>
+            </a:r>
+            <a:r>
+              <a:rPr lang="en-US" sz="1800" dirty="0" smtClean="0"/>
+              <a:t> </a:t>
+            </a:r>
+            <a:r>
+              <a:rPr lang="en-US" sz="1800" dirty="0" err="1" smtClean="0"/>
+              <a:t>gekommen</a:t>
+            </a:r>
+            <a:r>
+              <a:rPr lang="en-US" sz="1800" dirty="0" smtClean="0"/>
+              <a:t> </a:t>
+            </a:r>
+            <a:r>
+              <a:rPr lang="en-US" sz="1800" dirty="0" err="1" smtClean="0"/>
+              <a:t>ist</a:t>
+            </a:r>
+            <a:r>
+              <a:rPr lang="en-US" sz="1800" dirty="0" smtClean="0"/>
+              <a:t> und </a:t>
+            </a:r>
+            <a:r>
+              <a:rPr lang="en-US" sz="1800" dirty="0" err="1" smtClean="0"/>
+              <a:t>ihr</a:t>
+            </a:r>
+            <a:r>
+              <a:rPr lang="en-US" sz="1800" dirty="0" smtClean="0"/>
+              <a:t> </a:t>
+            </a:r>
+            <a:r>
+              <a:rPr lang="en-US" sz="1800" dirty="0" err="1" smtClean="0"/>
+              <a:t>geholfen</a:t>
+            </a:r>
+            <a:r>
+              <a:rPr lang="en-US" sz="1800" dirty="0" smtClean="0"/>
+              <a:t> hat.</a:t>
+            </a:r>
+          </a:p>
+          <a:p>
+            <a:r>
+              <a:rPr lang="en-US" sz="1800" dirty="0" err="1" smtClean="0"/>
+              <a:t>Franziska</a:t>
+            </a:r>
+            <a:r>
+              <a:rPr lang="en-US" sz="1800" dirty="0" smtClean="0"/>
+              <a:t> </a:t>
+            </a:r>
+            <a:r>
+              <a:rPr lang="en-US" sz="1800" dirty="0" err="1" smtClean="0"/>
+              <a:t>ist</a:t>
+            </a:r>
+            <a:r>
+              <a:rPr lang="en-US" sz="1800" dirty="0" smtClean="0"/>
+              <a:t> </a:t>
+            </a:r>
+            <a:r>
+              <a:rPr lang="en-US" sz="1800" dirty="0" err="1" smtClean="0"/>
+              <a:t>ein</a:t>
+            </a:r>
+            <a:r>
+              <a:rPr lang="en-US" sz="1800" dirty="0" smtClean="0"/>
+              <a:t> </a:t>
+            </a:r>
+            <a:r>
+              <a:rPr lang="en-US" sz="1800" dirty="0" err="1" smtClean="0"/>
+              <a:t>typischer</a:t>
+            </a:r>
+            <a:r>
+              <a:rPr lang="en-US" sz="1800" dirty="0" smtClean="0"/>
+              <a:t> </a:t>
+            </a:r>
+            <a:r>
+              <a:rPr lang="en-US" sz="1800" dirty="0" err="1" smtClean="0"/>
+              <a:t>Verbraucher</a:t>
+            </a:r>
+            <a:r>
+              <a:rPr lang="en-US" sz="1800" dirty="0" smtClean="0"/>
+              <a:t>, </a:t>
+            </a:r>
+            <a:r>
+              <a:rPr lang="en-US" sz="1800" dirty="0" err="1" smtClean="0"/>
+              <a:t>wenn</a:t>
+            </a:r>
+            <a:r>
+              <a:rPr lang="en-US" sz="1800" dirty="0" smtClean="0"/>
+              <a:t> </a:t>
+            </a:r>
+            <a:r>
+              <a:rPr lang="en-US" sz="1800" dirty="0" err="1" smtClean="0"/>
+              <a:t>etwas</a:t>
+            </a:r>
+            <a:r>
+              <a:rPr lang="en-US" sz="1800" dirty="0" smtClean="0"/>
+              <a:t> </a:t>
+            </a:r>
+            <a:r>
+              <a:rPr lang="en-US" sz="1800" dirty="0" err="1" smtClean="0"/>
+              <a:t>nicht</a:t>
+            </a:r>
+            <a:r>
+              <a:rPr lang="en-US" sz="1800" dirty="0" smtClean="0"/>
+              <a:t> </a:t>
+            </a:r>
+            <a:r>
+              <a:rPr lang="en-US" sz="1800" dirty="0" err="1" smtClean="0"/>
+              <a:t>funkioniert</a:t>
+            </a:r>
+            <a:r>
+              <a:rPr lang="en-US" sz="1800" dirty="0" smtClean="0"/>
+              <a:t> </a:t>
+            </a:r>
+            <a:r>
+              <a:rPr lang="en-US" sz="1800" dirty="0" err="1" smtClean="0"/>
+              <a:t>erkundigt</a:t>
+            </a:r>
+            <a:r>
+              <a:rPr lang="en-US" sz="1800" dirty="0" smtClean="0"/>
+              <a:t> </a:t>
+            </a:r>
+            <a:r>
+              <a:rPr lang="en-US" sz="1800" dirty="0" err="1" smtClean="0"/>
+              <a:t>sie</a:t>
+            </a:r>
+            <a:r>
+              <a:rPr lang="en-US" sz="1800" dirty="0" smtClean="0"/>
+              <a:t> </a:t>
+            </a:r>
+            <a:r>
+              <a:rPr lang="en-US" sz="1800" dirty="0" err="1" smtClean="0"/>
+              <a:t>sich</a:t>
+            </a:r>
+            <a:r>
+              <a:rPr lang="en-US" sz="1800" dirty="0" smtClean="0"/>
+              <a:t> </a:t>
+            </a:r>
+            <a:r>
+              <a:rPr lang="en-US" sz="1800" dirty="0" err="1" smtClean="0"/>
+              <a:t>kurz</a:t>
+            </a:r>
+            <a:r>
+              <a:rPr lang="en-US" sz="1800" dirty="0" smtClean="0"/>
+              <a:t>, such </a:t>
+            </a:r>
+            <a:r>
+              <a:rPr lang="en-US" sz="1800" dirty="0" err="1" smtClean="0"/>
+              <a:t>jedoch</a:t>
+            </a:r>
+            <a:r>
+              <a:rPr lang="en-US" sz="1800" dirty="0" smtClean="0"/>
+              <a:t> </a:t>
+            </a:r>
+            <a:r>
+              <a:rPr lang="en-US" sz="1800" dirty="0" err="1" smtClean="0"/>
+              <a:t>schnell</a:t>
+            </a:r>
+            <a:r>
+              <a:rPr lang="en-US" sz="1800" dirty="0" smtClean="0"/>
+              <a:t> </a:t>
+            </a:r>
+            <a:r>
+              <a:rPr lang="en-US" sz="1800" dirty="0" err="1" smtClean="0"/>
+              <a:t>nach</a:t>
+            </a:r>
+            <a:r>
+              <a:rPr lang="en-US" sz="1800" dirty="0" smtClean="0"/>
+              <a:t> </a:t>
+            </a:r>
+            <a:r>
+              <a:rPr lang="en-US" sz="1800" dirty="0" err="1" smtClean="0"/>
+              <a:t>Hilfe</a:t>
+            </a:r>
+            <a:r>
+              <a:rPr lang="en-US" sz="1800" dirty="0" smtClean="0"/>
+              <a:t>, </a:t>
+            </a:r>
+            <a:r>
+              <a:rPr lang="en-US" sz="1800" dirty="0" err="1" smtClean="0"/>
+              <a:t>oder</a:t>
+            </a:r>
+            <a:r>
+              <a:rPr lang="en-US" sz="1800" dirty="0" smtClean="0"/>
+              <a:t> </a:t>
+            </a:r>
+            <a:r>
+              <a:rPr lang="en-US" sz="1800" dirty="0" err="1" smtClean="0"/>
+              <a:t>lässt</a:t>
+            </a:r>
+            <a:r>
+              <a:rPr lang="en-US" sz="1800" dirty="0" smtClean="0"/>
+              <a:t> </a:t>
+            </a:r>
+            <a:r>
+              <a:rPr lang="en-US" sz="1800" dirty="0" err="1" smtClean="0"/>
+              <a:t>es</a:t>
+            </a:r>
+            <a:r>
+              <a:rPr lang="en-US" sz="1800" dirty="0" smtClean="0"/>
+              <a:t> </a:t>
+            </a:r>
+            <a:r>
+              <a:rPr lang="en-US" sz="1800" dirty="0" err="1" smtClean="0"/>
+              <a:t>einfach</a:t>
+            </a:r>
+            <a:r>
+              <a:rPr lang="en-US" sz="1800" dirty="0" smtClean="0"/>
+              <a:t> </a:t>
+            </a:r>
+            <a:r>
+              <a:rPr lang="en-US" sz="1800" dirty="0" err="1" smtClean="0"/>
+              <a:t>bleiben</a:t>
+            </a:r>
+            <a:r>
+              <a:rPr lang="en-US" sz="1800" dirty="0" smtClean="0"/>
+              <a:t> </a:t>
+            </a:r>
+            <a:r>
+              <a:rPr lang="en-US" sz="1800" dirty="0" err="1" smtClean="0"/>
+              <a:t>sofern</a:t>
+            </a:r>
+            <a:r>
+              <a:rPr lang="en-US" sz="1800" dirty="0" smtClean="0"/>
+              <a:t> </a:t>
+            </a:r>
+            <a:r>
+              <a:rPr lang="en-US" sz="1800" dirty="0" err="1" smtClean="0"/>
+              <a:t>sie</a:t>
+            </a:r>
+            <a:r>
+              <a:rPr lang="en-US" sz="1800" dirty="0" smtClean="0"/>
+              <a:t> </a:t>
+            </a:r>
+            <a:r>
+              <a:rPr lang="en-US" sz="1800" dirty="0" err="1" smtClean="0"/>
+              <a:t>auch</a:t>
+            </a:r>
+            <a:r>
+              <a:rPr lang="en-US" sz="1800" dirty="0" smtClean="0"/>
+              <a:t> so </a:t>
+            </a:r>
+            <a:r>
+              <a:rPr lang="en-US" sz="1800" dirty="0" err="1" smtClean="0"/>
+              <a:t>weiter</a:t>
+            </a:r>
+            <a:r>
+              <a:rPr lang="en-US" sz="1800" dirty="0" smtClean="0"/>
+              <a:t> </a:t>
+            </a:r>
+            <a:r>
+              <a:rPr lang="en-US" sz="1800" dirty="0" err="1" smtClean="0"/>
+              <a:t>arbeiten</a:t>
+            </a:r>
+            <a:r>
+              <a:rPr lang="en-US" sz="1800" dirty="0" smtClean="0"/>
+              <a:t> </a:t>
+            </a:r>
+            <a:r>
+              <a:rPr lang="en-US" sz="1800" dirty="0" err="1" smtClean="0"/>
+              <a:t>kann</a:t>
+            </a:r>
+            <a:r>
+              <a:rPr lang="en-US" sz="1800" dirty="0" smtClean="0"/>
+              <a:t>.</a:t>
+            </a:r>
+            <a:endParaRPr lang="en-US" sz="1800" dirty="0" smtClean="0"/>
+          </a:p>
+          <a:p>
+            <a:endParaRPr lang="de-DE" sz="1800" dirty="0" smtClean="0"/>
           </a:p>
         </p:txBody>
       </p:sp>
@@ -7226,131 +10360,108 @@
           <a:lstStyle/>
           <a:p>
             <a:r>
-              <a:rPr lang="de-DE" sz="1800"/>
+              <a:rPr lang="de-DE" sz="1800" dirty="0"/>
               <a:t>Szenario 1:</a:t>
             </a:r>
           </a:p>
           <a:p>
             <a:pPr lvl="1"/>
             <a:r>
-              <a:rPr lang="de-DE" sz="1500" smtClean="0"/>
-              <a:t>Christina </a:t>
-            </a:r>
-            <a:r>
-              <a:rPr lang="de-DE" sz="1500"/>
+              <a:rPr lang="de-DE" sz="1500" dirty="0" smtClean="0"/>
+              <a:t>Franziska </a:t>
+            </a:r>
+            <a:r>
+              <a:rPr lang="de-DE" sz="1500" dirty="0"/>
               <a:t>soll zunächst </a:t>
             </a:r>
             <a:r>
-              <a:rPr lang="de-DE" sz="1500" smtClean="0"/>
+              <a:rPr lang="de-DE" sz="1500" dirty="0" smtClean="0"/>
               <a:t>ihr </a:t>
             </a:r>
             <a:r>
-              <a:rPr lang="de-DE" sz="1500"/>
+              <a:rPr lang="de-DE" sz="1500" dirty="0"/>
               <a:t>Passwort </a:t>
             </a:r>
             <a:r>
-              <a:rPr lang="de-DE" sz="1500" smtClean="0"/>
-              <a:t>ändern und Druckerguthaben aufladen</a:t>
-            </a:r>
-            <a:endParaRPr lang="de-DE" sz="1800"/>
-          </a:p>
-          <a:p>
-            <a:r>
-              <a:rPr lang="de-DE" sz="1800"/>
+              <a:rPr lang="de-DE" sz="1500" dirty="0" smtClean="0"/>
+              <a:t>ändern und </a:t>
+            </a:r>
+            <a:r>
+              <a:rPr lang="de-DE" sz="1500" dirty="0" smtClean="0"/>
+              <a:t>nachsehen wie viele Geräte sie Registriert hat.</a:t>
+            </a:r>
+            <a:endParaRPr lang="de-DE" sz="1800" dirty="0"/>
+          </a:p>
+          <a:p>
+            <a:r>
+              <a:rPr lang="de-DE" sz="1800" dirty="0"/>
               <a:t>Szenario 2</a:t>
             </a:r>
             <a:r>
-              <a:rPr lang="de-DE" sz="1800" smtClean="0"/>
+              <a:rPr lang="de-DE" sz="1800" dirty="0" smtClean="0"/>
               <a:t>:</a:t>
             </a:r>
           </a:p>
           <a:p>
             <a:pPr lvl="1"/>
             <a:r>
-              <a:rPr lang="de-DE" sz="1500" smtClean="0"/>
-              <a:t>Christina bekommt demnächst einen neuen Laptop, da </a:t>
-            </a:r>
-            <a:r>
-              <a:rPr lang="de-DE" sz="1500" err="1" smtClean="0"/>
-              <a:t>iher</a:t>
-            </a:r>
-            <a:r>
-              <a:rPr lang="de-DE" sz="1500" smtClean="0"/>
-              <a:t> alter bereits 5 Jahre alt ist und nicht mehr zu gebrauchen ist um größere Auswertungen laufen zu lassen. Deshalb informiert Sie sich, wie sie diesen im Uni Netz anmeldet und wie man das W-</a:t>
-            </a:r>
-            <a:r>
-              <a:rPr lang="de-DE" sz="1500" err="1" smtClean="0"/>
-              <a:t>Lan</a:t>
-            </a:r>
-            <a:r>
-              <a:rPr lang="de-DE" sz="1500" smtClean="0"/>
-              <a:t> einrichtet </a:t>
-            </a:r>
-            <a:endParaRPr lang="de-DE" sz="1500"/>
-          </a:p>
-          <a:p>
-            <a:r>
-              <a:rPr lang="de-DE" sz="1800" smtClean="0"/>
-              <a:t>Szenario 3:</a:t>
+              <a:rPr lang="de-DE" sz="1500" dirty="0" smtClean="0"/>
+              <a:t> Franziska benötigt außerdem einen neuen Computer un</a:t>
+            </a:r>
+            <a:r>
+              <a:rPr lang="de-DE" sz="1500" dirty="0" smtClean="0"/>
+              <a:t>d Drucker, weshalb sie sich übers Rechenzentrum informiert wie sie einen bekommt.</a:t>
+            </a:r>
+            <a:endParaRPr lang="de-DE" sz="1500" dirty="0"/>
+          </a:p>
+          <a:p>
+            <a:r>
+              <a:rPr lang="de-DE" sz="1800" dirty="0" smtClean="0"/>
+              <a:t>Szenario </a:t>
+            </a:r>
+            <a:r>
+              <a:rPr lang="de-DE" sz="1800" dirty="0" smtClean="0"/>
+              <a:t>3:</a:t>
             </a:r>
           </a:p>
           <a:p>
             <a:pPr lvl="1"/>
             <a:r>
-              <a:rPr lang="de-DE" sz="1500" smtClean="0"/>
-              <a:t>Um jedoch bereits mit der Arbeit anzufangen sucht Christina nach </a:t>
-            </a:r>
-            <a:r>
-              <a:rPr lang="de-DE" sz="1500" err="1" smtClean="0"/>
-              <a:t>Cip</a:t>
-            </a:r>
-            <a:r>
-              <a:rPr lang="de-DE" sz="1500" smtClean="0"/>
-              <a:t> Pools welche </a:t>
-            </a:r>
-            <a:r>
-              <a:rPr lang="de-DE" sz="1500" err="1" smtClean="0"/>
-              <a:t>MathLab</a:t>
-            </a:r>
-            <a:r>
-              <a:rPr lang="de-DE" sz="1500" smtClean="0"/>
-              <a:t> vorinstalliert und einen Drucker haben.</a:t>
-            </a:r>
-            <a:endParaRPr lang="de-DE" sz="1500"/>
-          </a:p>
-          <a:p>
-            <a:r>
-              <a:rPr lang="de-DE" sz="1800" smtClean="0"/>
-              <a:t>Szenario 4:</a:t>
-            </a:r>
-            <a:endParaRPr lang="de-DE" sz="1800"/>
+              <a:rPr lang="de-DE" sz="1500" dirty="0" smtClean="0"/>
+              <a:t> Nachdem ihr Computer angekommen ist bemerkt sie, dass noch kein Zugang für sie eingerichtet wurde, weshalb sie nach ihrem zuständigen Workgroup Manager sucht.</a:t>
+            </a:r>
+            <a:endParaRPr lang="de-DE" sz="1500" dirty="0"/>
+          </a:p>
+          <a:p>
+            <a:r>
+              <a:rPr lang="de-DE" sz="1800" dirty="0" smtClean="0"/>
+              <a:t>Szenario </a:t>
+            </a:r>
+            <a:r>
+              <a:rPr lang="de-DE" sz="1800" dirty="0" smtClean="0"/>
+              <a:t>4:</a:t>
+            </a:r>
+            <a:endParaRPr lang="de-DE" sz="1800" dirty="0"/>
           </a:p>
           <a:p>
             <a:pPr lvl="1"/>
             <a:r>
-              <a:rPr lang="de-DE" sz="1500" smtClean="0"/>
-              <a:t>Da Christina sobald Sie ihren neuen Laptop hat dort mit der Auswertung weiter machen möchte, sucht Sie nach dem Programm (</a:t>
-            </a:r>
-            <a:r>
-              <a:rPr lang="de-DE" sz="1500" err="1" smtClean="0"/>
-              <a:t>MathLab</a:t>
-            </a:r>
-            <a:r>
-              <a:rPr lang="de-DE" sz="1500" smtClean="0"/>
-              <a:t>) auf der RZ-Seite und ob hierfür Installationshilfen angeboten werden.</a:t>
-            </a:r>
+              <a:rPr lang="de-DE" sz="1500" dirty="0" smtClean="0"/>
+              <a:t>Nachdem ihr Zugang gewährt wurde, sucht sich Franziska zunächst das Office Paket aus dem Softwarekatalog und wie man dieses installiert.</a:t>
+            </a:r>
+            <a:endParaRPr lang="de-DE" sz="1500" dirty="0" smtClean="0"/>
           </a:p>
           <a:p>
             <a:pPr lvl="1"/>
-            <a:endParaRPr lang="de-DE" sz="1500"/>
+            <a:endParaRPr lang="de-DE" sz="1500" dirty="0"/>
           </a:p>
           <a:p>
             <a:pPr lvl="1"/>
-            <a:endParaRPr lang="de-DE" sz="700"/>
+            <a:endParaRPr lang="de-DE" sz="700" dirty="0"/>
           </a:p>
           <a:p>
             <a:pPr lvl="1"/>
-            <a:endParaRPr lang="de-DE" sz="1500"/>
+            <a:endParaRPr lang="de-DE" sz="1500" dirty="0"/>
           </a:p>
         </p:txBody>
       </p:sp>
@@ -7443,17 +10554,17 @@
           <a:lstStyle/>
           <a:p>
             <a:r>
-              <a:rPr lang="de-DE" sz="2800" smtClean="0"/>
+              <a:rPr lang="de-DE" sz="2800" dirty="0" smtClean="0"/>
               <a:t/>
             </a:r>
             <a:br>
-              <a:rPr lang="de-DE" sz="2800" smtClean="0"/>
+              <a:rPr lang="de-DE" sz="2800" dirty="0" smtClean="0"/>
             </a:br>
             <a:r>
-              <a:rPr lang="en-US" sz="2800" b="1" smtClean="0"/>
+              <a:rPr lang="en-US" sz="2800" b="1" dirty="0" smtClean="0"/>
               <a:t>Leopold</a:t>
             </a:r>
-            <a:endParaRPr lang="de-DE" sz="2800"/>
+            <a:endParaRPr lang="de-DE" sz="2800" dirty="0"/>
           </a:p>
         </p:txBody>
       </p:sp>
@@ -7586,16 +10697,6 @@
                         </a:rPr>
                         <a:t>56</a:t>
                       </a:r>
-                      <a:endParaRPr kumimoji="0" lang="en-US" sz="1000" b="0" i="0" u="none" strike="noStrike" cap="none" normalizeH="0" baseline="0" dirty="0" smtClean="0">
-                        <a:ln>
-                          <a:noFill/>
-                        </a:ln>
-                        <a:solidFill>
-                          <a:schemeClr val="tx1"/>
-                        </a:solidFill>
-                        <a:effectLst/>
-                        <a:latin typeface="Arial" charset="0"/>
-                      </a:endParaRPr>
                     </a:p>
                   </a:txBody>
                   <a:tcPr marL="90488" marR="90488" marT="44450" marB="44450" horzOverflow="overflow">
@@ -7652,7 +10753,7 @@
                         <a:tabLst/>
                       </a:pPr>
                       <a:r>
-                        <a:rPr kumimoji="0" lang="en-US" sz="1000" b="1" i="0" u="none" strike="noStrike" cap="none" normalizeH="0" baseline="0" err="1" smtClean="0">
+                        <a:rPr kumimoji="0" lang="en-US" sz="1000" b="1" i="0" u="none" strike="noStrike" cap="none" normalizeH="0" baseline="0" dirty="0" err="1" smtClean="0">
                           <a:ln>
                             <a:noFill/>
                           </a:ln>
@@ -7664,7 +10765,7 @@
                         </a:rPr>
                         <a:t>Bezeichnung</a:t>
                       </a:r>
-                      <a:endParaRPr kumimoji="0" lang="en-US" sz="1000" b="1" i="0" u="none" strike="noStrike" cap="none" normalizeH="0" baseline="0" smtClean="0">
+                      <a:endParaRPr kumimoji="0" lang="en-US" sz="1000" b="1" i="0" u="none" strike="noStrike" cap="none" normalizeH="0" baseline="0" dirty="0" smtClean="0">
                         <a:ln>
                           <a:noFill/>
                         </a:ln>
@@ -8630,16 +11731,6 @@
                         </a:rPr>
                         <a:t> </a:t>
                       </a:r>
-                      <a:endParaRPr kumimoji="0" lang="en-US" sz="1000" b="0" i="0" u="none" strike="noStrike" cap="none" normalizeH="0" baseline="0" dirty="0" smtClean="0">
-                        <a:ln>
-                          <a:noFill/>
-                        </a:ln>
-                        <a:solidFill>
-                          <a:schemeClr val="tx1"/>
-                        </a:solidFill>
-                        <a:effectLst/>
-                        <a:latin typeface="Arial" charset="0"/>
-                      </a:endParaRPr>
                     </a:p>
                   </a:txBody>
                   <a:tcPr marL="90488" marR="90488" marT="44450" marB="44450" horzOverflow="overflow">
@@ -9441,16 +12532,6 @@
                         </a:rPr>
                         <a:t> muss</a:t>
                       </a:r>
-                      <a:endParaRPr kumimoji="0" lang="en-US" sz="1000" b="0" i="0" u="none" strike="noStrike" cap="none" normalizeH="0" baseline="0" dirty="0" smtClean="0">
-                        <a:ln>
-                          <a:noFill/>
-                        </a:ln>
-                        <a:solidFill>
-                          <a:schemeClr val="tx1"/>
-                        </a:solidFill>
-                        <a:effectLst/>
-                        <a:latin typeface="Arial" charset="0"/>
-                      </a:endParaRPr>
                     </a:p>
                   </a:txBody>
                   <a:tcPr marL="90488" marR="90488" marT="44450" marB="44450" horzOverflow="overflow">
@@ -9903,16 +12984,6 @@
                         </a:rPr>
                         <a:t> gut</a:t>
                       </a:r>
-                      <a:endParaRPr kumimoji="0" lang="en-US" sz="1000" b="0" i="0" u="none" strike="noStrike" cap="none" normalizeH="0" baseline="0" dirty="0" smtClean="0">
-                        <a:ln>
-                          <a:noFill/>
-                        </a:ln>
-                        <a:solidFill>
-                          <a:schemeClr val="tx1"/>
-                        </a:solidFill>
-                        <a:effectLst/>
-                        <a:latin typeface="Arial" charset="0"/>
-                      </a:endParaRPr>
                     </a:p>
                   </a:txBody>
                   <a:tcPr marL="90488" marR="90488" marT="44450" marB="44450" horzOverflow="overflow">
@@ -10066,11 +13137,7 @@
           <a:p>
             <a:r>
               <a:rPr lang="en-US" sz="1800" dirty="0" smtClean="0"/>
-              <a:t> </a:t>
-            </a:r>
-            <a:r>
-              <a:rPr lang="en-US" sz="1800" dirty="0" smtClean="0"/>
-              <a:t>Leopold </a:t>
+              <a:t> Leopold </a:t>
             </a:r>
             <a:r>
               <a:rPr lang="en-US" sz="1800" dirty="0" err="1" smtClean="0"/>
@@ -10189,7 +13256,6 @@
               <a:rPr lang="de-DE" sz="1800" dirty="0" smtClean="0"/>
               <a:t>Leopold benutzt Google, wenn er nach kurzer Zeit nicht findet nach was er sucht.</a:t>
             </a:r>
-            <a:endParaRPr lang="de-DE" sz="1800" dirty="0" smtClean="0"/>
           </a:p>
           <a:p>
             <a:endParaRPr lang="de-DE" sz="1400" dirty="0"/>
@@ -10633,11 +13699,7 @@
             <a:pPr lvl="1"/>
             <a:r>
               <a:rPr lang="de-DE" sz="1500" dirty="0" smtClean="0"/>
-              <a:t>Leopold</a:t>
-            </a:r>
-            <a:r>
-              <a:rPr lang="de-DE" sz="1500" dirty="0" smtClean="0"/>
-              <a:t> </a:t>
+              <a:t>Leopold </a:t>
             </a:r>
             <a:r>
               <a:rPr lang="de-DE" sz="1500" dirty="0"/>
@@ -10653,11 +13715,7 @@
             </a:r>
             <a:r>
               <a:rPr lang="de-DE" sz="1500" dirty="0" smtClean="0"/>
-              <a:t>ändern und </a:t>
-            </a:r>
-            <a:r>
-              <a:rPr lang="de-DE" sz="1500" dirty="0" smtClean="0"/>
-              <a:t>seinen SMS Service einrichten </a:t>
+              <a:t>ändern und seinen SMS Service einrichten </a:t>
             </a:r>
             <a:endParaRPr lang="de-DE" sz="1800" dirty="0"/>
           </a:p>
@@ -10682,11 +13740,7 @@
           <a:p>
             <a:r>
               <a:rPr lang="de-DE" sz="1800" dirty="0" smtClean="0"/>
-              <a:t>Szenario 3</a:t>
-            </a:r>
-            <a:r>
-              <a:rPr lang="de-DE" sz="1800" dirty="0" smtClean="0"/>
-              <a:t>:</a:t>
+              <a:t>Szenario 3:</a:t>
             </a:r>
           </a:p>
           <a:p>
@@ -10717,7 +13771,6 @@
               <a:rPr lang="de-DE" sz="1500" dirty="0" smtClean="0"/>
               <a:t> informiert.</a:t>
             </a:r>
-            <a:endParaRPr lang="de-DE" sz="1500" dirty="0" smtClean="0"/>
           </a:p>
           <a:p>
             <a:r>
@@ -10732,7 +13785,6 @@
               <a:rPr lang="de-DE" sz="1500" dirty="0" smtClean="0"/>
               <a:t>Nach zwei Wochen beginnt Leopolds seltsame Geräusche zu machen, weshalb er sich erkundigt, ob das Rechenzentrum ihm hierbei helfen kann.</a:t>
             </a:r>
-            <a:endParaRPr lang="de-DE" sz="1500" dirty="0" smtClean="0"/>
           </a:p>
           <a:p>
             <a:pPr lvl="1"/>
@@ -10980,16 +14032,6 @@
                         </a:rPr>
                         <a:t>35</a:t>
                       </a:r>
-                      <a:endParaRPr kumimoji="0" lang="en-US" sz="1000" b="0" i="0" u="none" strike="noStrike" cap="none" normalizeH="0" baseline="0" dirty="0" smtClean="0">
-                        <a:ln>
-                          <a:noFill/>
-                        </a:ln>
-                        <a:solidFill>
-                          <a:schemeClr val="tx1"/>
-                        </a:solidFill>
-                        <a:effectLst/>
-                        <a:latin typeface="Arial" charset="0"/>
-                      </a:endParaRPr>
                     </a:p>
                   </a:txBody>
                   <a:tcPr marL="90488" marR="90488" marT="44450" marB="44450" horzOverflow="overflow">
@@ -13736,16 +16778,6 @@
                         </a:rPr>
                         <a:t> </a:t>
                       </a:r>
-                      <a:endParaRPr kumimoji="0" lang="en-US" sz="1000" b="0" i="0" u="none" strike="noStrike" cap="none" normalizeH="0" baseline="0" dirty="0" smtClean="0">
-                        <a:ln>
-                          <a:noFill/>
-                        </a:ln>
-                        <a:solidFill>
-                          <a:schemeClr val="tx1"/>
-                        </a:solidFill>
-                        <a:effectLst/>
-                        <a:latin typeface="Arial" charset="0"/>
-                      </a:endParaRPr>
                     </a:p>
                   </a:txBody>
                   <a:tcPr marL="90488" marR="90488" marT="44450" marB="44450" horzOverflow="overflow">
@@ -13899,11 +16931,7 @@
           <a:p>
             <a:r>
               <a:rPr lang="en-US" sz="1800" dirty="0" smtClean="0"/>
-              <a:t> </a:t>
-            </a:r>
-            <a:r>
-              <a:rPr lang="en-US" sz="1800" dirty="0" smtClean="0"/>
-              <a:t>Sofia </a:t>
+              <a:t> Sofia </a:t>
             </a:r>
             <a:r>
               <a:rPr lang="en-US" sz="1800" dirty="0" err="1" smtClean="0"/>
@@ -14079,11 +17107,7 @@
             </a:r>
             <a:r>
               <a:rPr lang="de-DE" sz="1500" dirty="0" smtClean="0"/>
-              <a:t>ändern und </a:t>
-            </a:r>
-            <a:r>
-              <a:rPr lang="de-DE" sz="1500" dirty="0" smtClean="0"/>
-              <a:t>den SMS Service einrichten.</a:t>
+              <a:t>ändern und den SMS Service einrichten.</a:t>
             </a:r>
             <a:endParaRPr lang="de-DE" sz="1800" dirty="0"/>
           </a:p>
@@ -14125,7 +17149,6 @@
               <a:rPr lang="de-DE" sz="1500" dirty="0" smtClean="0"/>
               <a:t>-Pools BIB 3 um den Professor des Lehrstuhl zu erreichen.</a:t>
             </a:r>
-            <a:endParaRPr lang="de-DE" sz="1500" dirty="0" smtClean="0"/>
           </a:p>
           <a:p>
             <a:r>

</xml_diff>

<commit_message>
update personas und Szenarien
</commit_message>
<xml_diff>
--- a/Personas und Szenarien/Personas_Redsign_RZ.pptx
+++ b/Personas und Szenarien/Personas_Redsign_RZ.pptx
@@ -437,7 +437,7 @@
             <a:fld id="{9423E4B3-2C73-4EB6-894D-4ED28E44A2E3}" type="datetimeFigureOut">
               <a:rPr lang="de-DE" smtClean="0"/>
               <a:pPr/>
-              <a:t>03.09.2015</a:t>
+              <a:t>09.09.2015</a:t>
             </a:fld>
             <a:endParaRPr lang="de-DE"/>
           </a:p>
@@ -630,7 +630,7 @@
             <a:fld id="{9423E4B3-2C73-4EB6-894D-4ED28E44A2E3}" type="datetimeFigureOut">
               <a:rPr lang="de-DE" smtClean="0"/>
               <a:pPr/>
-              <a:t>03.09.2015</a:t>
+              <a:t>09.09.2015</a:t>
             </a:fld>
             <a:endParaRPr lang="de-DE"/>
           </a:p>
@@ -817,7 +817,7 @@
             <a:fld id="{9423E4B3-2C73-4EB6-894D-4ED28E44A2E3}" type="datetimeFigureOut">
               <a:rPr lang="de-DE" smtClean="0"/>
               <a:pPr/>
-              <a:t>03.09.2015</a:t>
+              <a:t>09.09.2015</a:t>
             </a:fld>
             <a:endParaRPr lang="de-DE"/>
           </a:p>
@@ -1082,7 +1082,7 @@
             <a:fld id="{9423E4B3-2C73-4EB6-894D-4ED28E44A2E3}" type="datetimeFigureOut">
               <a:rPr lang="de-DE" smtClean="0"/>
               <a:pPr/>
-              <a:t>03.09.2015</a:t>
+              <a:t>09.09.2015</a:t>
             </a:fld>
             <a:endParaRPr lang="de-DE"/>
           </a:p>
@@ -1500,7 +1500,7 @@
             <a:fld id="{9423E4B3-2C73-4EB6-894D-4ED28E44A2E3}" type="datetimeFigureOut">
               <a:rPr lang="de-DE" smtClean="0"/>
               <a:pPr/>
-              <a:t>03.09.2015</a:t>
+              <a:t>09.09.2015</a:t>
             </a:fld>
             <a:endParaRPr lang="de-DE"/>
           </a:p>
@@ -1744,7 +1744,7 @@
             <a:fld id="{9423E4B3-2C73-4EB6-894D-4ED28E44A2E3}" type="datetimeFigureOut">
               <a:rPr lang="de-DE" smtClean="0"/>
               <a:pPr/>
-              <a:t>03.09.2015</a:t>
+              <a:t>09.09.2015</a:t>
             </a:fld>
             <a:endParaRPr lang="de-DE"/>
           </a:p>
@@ -1982,7 +1982,7 @@
             <a:fld id="{9423E4B3-2C73-4EB6-894D-4ED28E44A2E3}" type="datetimeFigureOut">
               <a:rPr lang="de-DE" smtClean="0"/>
               <a:pPr/>
-              <a:t>03.09.2015</a:t>
+              <a:t>09.09.2015</a:t>
             </a:fld>
             <a:endParaRPr lang="de-DE"/>
           </a:p>
@@ -2179,7 +2179,7 @@
             <a:fld id="{9423E4B3-2C73-4EB6-894D-4ED28E44A2E3}" type="datetimeFigureOut">
               <a:rPr lang="de-DE" smtClean="0"/>
               <a:pPr/>
-              <a:t>03.09.2015</a:t>
+              <a:t>09.09.2015</a:t>
             </a:fld>
             <a:endParaRPr lang="de-DE"/>
           </a:p>
@@ -2279,7 +2279,7 @@
             <a:fld id="{9423E4B3-2C73-4EB6-894D-4ED28E44A2E3}" type="datetimeFigureOut">
               <a:rPr lang="de-DE" smtClean="0"/>
               <a:pPr/>
-              <a:t>03.09.2015</a:t>
+              <a:t>09.09.2015</a:t>
             </a:fld>
             <a:endParaRPr lang="de-DE"/>
           </a:p>
@@ -2417,7 +2417,7 @@
             <a:fld id="{9423E4B3-2C73-4EB6-894D-4ED28E44A2E3}" type="datetimeFigureOut">
               <a:rPr lang="de-DE" smtClean="0"/>
               <a:pPr/>
-              <a:t>03.09.2015</a:t>
+              <a:t>09.09.2015</a:t>
             </a:fld>
             <a:endParaRPr lang="de-DE"/>
           </a:p>
@@ -2937,7 +2937,7 @@
             <a:fld id="{9423E4B3-2C73-4EB6-894D-4ED28E44A2E3}" type="datetimeFigureOut">
               <a:rPr lang="de-DE" smtClean="0"/>
               <a:pPr/>
-              <a:t>03.09.2015</a:t>
+              <a:t>09.09.2015</a:t>
             </a:fld>
             <a:endParaRPr lang="de-DE"/>
           </a:p>
@@ -3200,7 +3200,7 @@
             <a:fld id="{9423E4B3-2C73-4EB6-894D-4ED28E44A2E3}" type="datetimeFigureOut">
               <a:rPr lang="de-DE" smtClean="0"/>
               <a:pPr/>
-              <a:t>03.09.2015</a:t>
+              <a:t>09.09.2015</a:t>
             </a:fld>
             <a:endParaRPr lang="de-DE"/>
           </a:p>
@@ -7231,11 +7231,7 @@
             </a:r>
             <a:r>
               <a:rPr lang="de-DE" sz="1800" dirty="0" smtClean="0"/>
-              <a:t>Hubert ist 48 Jahre alt und Professor der Literaturwissenschaft an der Universität Regensburg. Seine Frau arbeitet ebenfalls an der Universität als Chemie Professorin. </a:t>
-            </a:r>
-            <a:r>
-              <a:rPr lang="de-DE" sz="1800" dirty="0" smtClean="0"/>
-              <a:t>Ein Kind von ihm studiert noch an der Universität Chemie. Seine restlichen drei Kinder haben bereits fertig studiert und arbeiten in der Wirtschaft. Bei technischen Fragen zu Hause wird bei fragen immer eines der Kinder herangezogen. Auch bei Problemen in der Uni mit Software oder Hardware bezieht Hubert erst seine Kinder mit ein bevor er den Support kontaktiert.</a:t>
+              <a:t>Hubert ist 48 Jahre alt und Professor der Literaturwissenschaft an der Universität Regensburg. Seine Frau arbeitet ebenfalls an der Universität als Chemie Professorin. Ein Kind von ihm studiert noch an der Universität Chemie. Seine restlichen drei Kinder haben bereits fertig studiert und arbeiten in der Wirtschaft. Bei technischen Fragen zu Hause wird bei fragen immer eines der Kinder herangezogen. Auch bei Problemen in der Uni mit Software oder Hardware bezieht Hubert erst seine Kinder mit ein bevor er den Support kontaktiert.</a:t>
             </a:r>
           </a:p>
           <a:p>
@@ -7253,11 +7249,7 @@
           <a:p>
             <a:r>
               <a:rPr lang="de-DE" sz="1800" dirty="0" smtClean="0"/>
-              <a:t>Interessiert ist Hubert vor allem am Softwareangebot.</a:t>
-            </a:r>
-            <a:r>
-              <a:rPr lang="de-DE" sz="1800" dirty="0" smtClean="0"/>
-              <a:t> </a:t>
+              <a:t>Interessiert ist Hubert vor allem am Softwareangebot. </a:t>
             </a:r>
             <a:endParaRPr lang="en-US" sz="1400" dirty="0"/>
           </a:p>
@@ -7383,11 +7375,7 @@
             <a:pPr lvl="1"/>
             <a:r>
               <a:rPr lang="de-DE" sz="1500" dirty="0" smtClean="0"/>
-              <a:t>Hubert ist heute zu Hause und möchte sich ein Programm herunterladen. </a:t>
-            </a:r>
-            <a:r>
-              <a:rPr lang="de-DE" sz="1500" dirty="0" smtClean="0"/>
-              <a:t>Jedoch geht dies nicht ohne VPN. Deswegen informiert sich Hubert wie dies funktioniert und richtet sich seinen VPN Zugang ein.</a:t>
+              <a:t>Hubert ist heute zu Hause und möchte sich ein Programm herunterladen. Jedoch geht dies nicht ohne VPN. Deswegen informiert sich Hubert wie dies funktioniert und richtet sich seinen VPN Zugang ein.</a:t>
             </a:r>
             <a:endParaRPr lang="de-DE" sz="1800" dirty="0" smtClean="0"/>
           </a:p>
@@ -8664,16 +8652,6 @@
                         </a:rPr>
                         <a:t> </a:t>
                       </a:r>
-                      <a:endParaRPr kumimoji="0" lang="en-US" sz="1000" b="0" i="0" u="none" strike="noStrike" cap="none" normalizeH="0" baseline="0" dirty="0" smtClean="0">
-                        <a:ln>
-                          <a:noFill/>
-                        </a:ln>
-                        <a:solidFill>
-                          <a:schemeClr val="tx1"/>
-                        </a:solidFill>
-                        <a:effectLst/>
-                        <a:latin typeface="Arial" charset="0"/>
-                      </a:endParaRPr>
                     </a:p>
                   </a:txBody>
                   <a:tcPr marL="90488" marR="90488" marT="44450" marB="44450" horzOverflow="overflow">
@@ -8906,20 +8884,7 @@
                           <a:effectLst/>
                           <a:latin typeface="Arial" charset="0"/>
                         </a:rPr>
-                        <a:t> </a:t>
-                      </a:r>
-                      <a:r>
-                        <a:rPr kumimoji="0" lang="en-US" sz="1000" b="0" i="0" u="none" strike="noStrike" cap="none" normalizeH="0" baseline="0" dirty="0" smtClean="0">
-                          <a:ln>
-                            <a:noFill/>
-                          </a:ln>
-                          <a:solidFill>
-                            <a:schemeClr val="tx1"/>
-                          </a:solidFill>
-                          <a:effectLst/>
-                          <a:latin typeface="Arial" charset="0"/>
-                        </a:rPr>
-                        <a:t>Solange </a:t>
+                        <a:t> Solange </a:t>
                       </a:r>
                       <a:r>
                         <a:rPr kumimoji="0" lang="en-US" sz="1000" b="0" i="0" u="none" strike="noStrike" cap="none" normalizeH="0" baseline="0" dirty="0" err="1" smtClean="0">
@@ -10241,7 +10206,6 @@
               <a:rPr lang="en-US" sz="1800" dirty="0" smtClean="0"/>
               <a:t>.</a:t>
             </a:r>
-            <a:endParaRPr lang="en-US" sz="1800" dirty="0" smtClean="0"/>
           </a:p>
           <a:p>
             <a:endParaRPr lang="de-DE" sz="1800" dirty="0" smtClean="0"/>
@@ -10384,11 +10348,7 @@
             </a:r>
             <a:r>
               <a:rPr lang="de-DE" sz="1500" dirty="0" smtClean="0"/>
-              <a:t>ändern und </a:t>
-            </a:r>
-            <a:r>
-              <a:rPr lang="de-DE" sz="1500" dirty="0" smtClean="0"/>
-              <a:t>nachsehen wie viele Geräte sie Registriert hat.</a:t>
+              <a:t>ändern und nachsehen wie viele Geräte sie Registriert hat.</a:t>
             </a:r>
             <a:endParaRPr lang="de-DE" sz="1800" dirty="0"/>
           </a:p>
@@ -10406,22 +10366,14 @@
             <a:pPr lvl="1"/>
             <a:r>
               <a:rPr lang="de-DE" sz="1500" dirty="0" smtClean="0"/>
-              <a:t> Franziska benötigt außerdem einen neuen Computer un</a:t>
-            </a:r>
-            <a:r>
-              <a:rPr lang="de-DE" sz="1500" dirty="0" smtClean="0"/>
-              <a:t>d Drucker, weshalb sie sich übers Rechenzentrum informiert wie sie einen bekommt.</a:t>
+              <a:t> Franziska benötigt außerdem einen neuen Computer und Drucker, weshalb sie sich übers Rechenzentrum informiert wie sie einen bekommt.</a:t>
             </a:r>
             <a:endParaRPr lang="de-DE" sz="1500" dirty="0"/>
           </a:p>
           <a:p>
             <a:r>
               <a:rPr lang="de-DE" sz="1800" dirty="0" smtClean="0"/>
-              <a:t>Szenario </a:t>
-            </a:r>
-            <a:r>
-              <a:rPr lang="de-DE" sz="1800" dirty="0" smtClean="0"/>
-              <a:t>3:</a:t>
+              <a:t>Szenario 3:</a:t>
             </a:r>
           </a:p>
           <a:p>
@@ -10435,11 +10387,7 @@
           <a:p>
             <a:r>
               <a:rPr lang="de-DE" sz="1800" dirty="0" smtClean="0"/>
-              <a:t>Szenario </a:t>
-            </a:r>
-            <a:r>
-              <a:rPr lang="de-DE" sz="1800" dirty="0" smtClean="0"/>
-              <a:t>4:</a:t>
+              <a:t>Szenario 4:</a:t>
             </a:r>
             <a:endParaRPr lang="de-DE" sz="1800" dirty="0"/>
           </a:p>
@@ -10449,7 +10397,6 @@
               <a:rPr lang="de-DE" sz="1500" dirty="0" smtClean="0"/>
               <a:t>Nachdem ihr Zugang gewährt wurde, sucht sich Franziska zunächst das Office Paket aus dem Softwarekatalog und wie man dieses installiert.</a:t>
             </a:r>
-            <a:endParaRPr lang="de-DE" sz="1500" dirty="0" smtClean="0"/>
           </a:p>
           <a:p>
             <a:pPr lvl="1"/>
@@ -13374,62 +13321,86 @@
           <a:lstStyle/>
           <a:p>
             <a:r>
-              <a:rPr lang="de-DE" sz="1800" smtClean="0"/>
+              <a:rPr lang="de-DE" sz="1800" dirty="0" smtClean="0"/>
               <a:t>Ziel dieses Dokuments ist die Beschreibung der typischen Nutzer der Rechenzentrumsseite der Universität Regensburg</a:t>
             </a:r>
           </a:p>
           <a:p>
             <a:pPr lvl="1"/>
             <a:r>
-              <a:rPr lang="de-DE" sz="1600" smtClean="0"/>
+              <a:rPr lang="de-DE" sz="1600" dirty="0" smtClean="0"/>
               <a:t>Die beschriebenen Persona dienen der verbesserten Kommunikation innerhalb des Entwicklungsteams und ermöglicht Rückbezug, wenn fragen zu Informationsarchitektur zu treffen sind („Braucht dieser Nutzer wirklich diese Information?“)</a:t>
             </a:r>
           </a:p>
           <a:p>
             <a:pPr lvl="1"/>
             <a:r>
-              <a:rPr lang="de-DE" sz="1600" smtClean="0"/>
+              <a:rPr lang="de-DE" sz="1600" dirty="0" smtClean="0"/>
               <a:t>Die hier dargestellten Persona wurden aus den folgenden Dokumenten abgeleitet:</a:t>
             </a:r>
           </a:p>
           <a:p>
             <a:pPr lvl="2"/>
             <a:r>
+              <a:rPr lang="de-DE" sz="1300" dirty="0" smtClean="0"/>
+              <a:t>Fragebögen</a:t>
+            </a:r>
+          </a:p>
+          <a:p>
+            <a:pPr lvl="2"/>
+            <a:r>
+              <a:rPr lang="de-DE" sz="1300" dirty="0" smtClean="0"/>
+              <a:t>Nutzerinterviews</a:t>
+            </a:r>
+          </a:p>
+          <a:p>
+            <a:pPr lvl="2"/>
+            <a:r>
+              <a:rPr lang="de-DE" sz="1300" dirty="0" smtClean="0"/>
+              <a:t>Fokusgruppen</a:t>
+            </a:r>
+          </a:p>
+          <a:p>
+            <a:pPr lvl="2"/>
+            <a:r>
+              <a:rPr lang="de-DE" sz="1300" dirty="0" smtClean="0"/>
+              <a:t>User &amp; Task </a:t>
+            </a:r>
+            <a:r>
+              <a:rPr lang="de-DE" sz="1300" dirty="0" smtClean="0"/>
+              <a:t>Analyse</a:t>
+            </a:r>
+          </a:p>
+          <a:p>
+            <a:pPr lvl="2"/>
+            <a:r>
+              <a:rPr lang="de-DE" sz="1300" dirty="0" err="1" smtClean="0"/>
+              <a:t>Piwik</a:t>
+            </a:r>
+            <a:r>
               <a:rPr lang="de-DE" sz="1300" smtClean="0"/>
-              <a:t>Fragebögen</a:t>
-            </a:r>
-          </a:p>
-          <a:p>
-            <a:pPr lvl="2"/>
-            <a:r>
-              <a:rPr lang="de-DE" sz="1300" smtClean="0"/>
-              <a:t>Nutzerinterviews</a:t>
-            </a:r>
-          </a:p>
-          <a:p>
-            <a:pPr lvl="2"/>
-            <a:r>
-              <a:rPr lang="de-DE" sz="1300" smtClean="0"/>
-              <a:t>Fokusgruppen</a:t>
-            </a:r>
-          </a:p>
-          <a:p>
-            <a:pPr lvl="2"/>
-            <a:r>
-              <a:rPr lang="de-DE" sz="1300" smtClean="0"/>
-              <a:t>User &amp; Task Analyse</a:t>
-            </a:r>
+              <a:t> Analyse</a:t>
+            </a:r>
+            <a:endParaRPr lang="de-DE" sz="1300" smtClean="0"/>
           </a:p>
           <a:p>
             <a:pPr lvl="2">
               <a:buNone/>
             </a:pPr>
-            <a:endParaRPr lang="de-DE" sz="1300" smtClean="0"/>
-          </a:p>
-          <a:p>
-            <a:r>
-              <a:rPr lang="de-DE" sz="1900" smtClean="0"/>
-              <a:t>Was sind Personas?</a:t>
+            <a:endParaRPr lang="de-DE" sz="1300" dirty="0" smtClean="0"/>
+          </a:p>
+          <a:p>
+            <a:r>
+              <a:rPr lang="de-DE" sz="1900" dirty="0" smtClean="0"/>
+              <a:t>Was sind </a:t>
+            </a:r>
+            <a:r>
+              <a:rPr lang="de-DE" sz="1900" dirty="0" err="1" smtClean="0"/>
+              <a:t>Personas</a:t>
+            </a:r>
+            <a:r>
+              <a:rPr lang="de-DE" sz="1900" dirty="0" smtClean="0"/>
+              <a:t>?</a:t>
             </a:r>
           </a:p>
           <a:p>
@@ -13439,83 +13410,75 @@
               </a:lnSpc>
             </a:pPr>
             <a:r>
-              <a:rPr lang="en-US" sz="1200" err="1" smtClean="0"/>
+              <a:rPr lang="en-US" sz="1200" dirty="0" err="1" smtClean="0"/>
               <a:t>Typische</a:t>
             </a:r>
             <a:r>
-              <a:rPr lang="en-US" sz="1200" smtClean="0"/>
+              <a:rPr lang="en-US" sz="1200" dirty="0" smtClean="0"/>
               <a:t> User </a:t>
             </a:r>
             <a:r>
-              <a:rPr lang="en-US" sz="1200" err="1" smtClean="0"/>
+              <a:rPr lang="en-US" sz="1200" dirty="0" err="1" smtClean="0"/>
               <a:t>basierend</a:t>
             </a:r>
             <a:r>
-              <a:rPr lang="en-US" sz="1200" smtClean="0"/>
+              <a:rPr lang="en-US" sz="1200" dirty="0" smtClean="0"/>
               <a:t> auf </a:t>
             </a:r>
             <a:r>
-              <a:rPr lang="en-US" sz="1200" err="1" smtClean="0"/>
+              <a:rPr lang="en-US" sz="1200" dirty="0" err="1" smtClean="0"/>
               <a:t>tatsächlichen</a:t>
             </a:r>
             <a:r>
-              <a:rPr lang="en-US" sz="1200" smtClean="0"/>
+              <a:rPr lang="en-US" sz="1200" dirty="0" smtClean="0"/>
               <a:t> </a:t>
             </a:r>
             <a:r>
-              <a:rPr lang="en-US" sz="1200" err="1" smtClean="0"/>
+              <a:rPr lang="en-US" sz="1200" dirty="0" err="1" smtClean="0"/>
               <a:t>Nutzerdaten</a:t>
             </a:r>
             <a:r>
-              <a:rPr lang="en-US" sz="1200" smtClean="0"/>
+              <a:rPr lang="en-US" sz="1200" dirty="0" smtClean="0"/>
               <a:t> – </a:t>
             </a:r>
             <a:r>
-              <a:rPr lang="en-US" sz="1200" err="1" smtClean="0"/>
+              <a:rPr lang="en-US" sz="1200" dirty="0" err="1" smtClean="0"/>
               <a:t>Wer</a:t>
             </a:r>
             <a:r>
-              <a:rPr lang="en-US" sz="1200" smtClean="0"/>
+              <a:rPr lang="en-US" sz="1200" dirty="0" smtClean="0"/>
               <a:t> </a:t>
             </a:r>
             <a:r>
-              <a:rPr lang="en-US" sz="1200" err="1" smtClean="0"/>
+              <a:rPr lang="en-US" sz="1200" dirty="0" err="1" smtClean="0"/>
               <a:t>ist</a:t>
             </a:r>
             <a:r>
-              <a:rPr lang="en-US" sz="1200" smtClean="0"/>
+              <a:rPr lang="en-US" sz="1200" dirty="0" smtClean="0"/>
+              <a:t> der User, was </a:t>
+            </a:r>
+            <a:r>
+              <a:rPr lang="en-US" sz="1200" dirty="0" err="1" smtClean="0"/>
+              <a:t>sind</a:t>
+            </a:r>
+            <a:r>
+              <a:rPr lang="en-US" sz="1200" dirty="0" smtClean="0"/>
+              <a:t> seine/</a:t>
+            </a:r>
+            <a:r>
+              <a:rPr lang="en-US" sz="1200" dirty="0" err="1" smtClean="0"/>
+              <a:t>ihre</a:t>
+            </a:r>
+            <a:r>
+              <a:rPr lang="en-US" sz="1200" dirty="0" smtClean="0"/>
               <a:t> </a:t>
             </a:r>
             <a:r>
-              <a:rPr lang="en-US" sz="1200" err="1" smtClean="0"/>
-              <a:t>der</a:t>
-            </a:r>
-            <a:r>
-              <a:rPr lang="en-US" sz="1200" smtClean="0"/>
-              <a:t> User, was </a:t>
-            </a:r>
-            <a:r>
-              <a:rPr lang="en-US" sz="1200" err="1" smtClean="0"/>
-              <a:t>sind</a:t>
-            </a:r>
-            <a:r>
-              <a:rPr lang="en-US" sz="1200" smtClean="0"/>
-              <a:t> seine/</a:t>
-            </a:r>
-            <a:r>
-              <a:rPr lang="en-US" sz="1200" err="1" smtClean="0"/>
-              <a:t>ihre</a:t>
-            </a:r>
-            <a:r>
-              <a:rPr lang="en-US" sz="1200" smtClean="0"/>
-              <a:t> </a:t>
-            </a:r>
-            <a:r>
-              <a:rPr lang="en-US" sz="1200" err="1" smtClean="0"/>
+              <a:rPr lang="en-US" sz="1200" dirty="0" err="1" smtClean="0"/>
               <a:t>Ziele</a:t>
             </a:r>
             <a:r>
-              <a:rPr lang="en-US" sz="1200" smtClean="0"/>
+              <a:rPr lang="en-US" sz="1200" dirty="0" smtClean="0"/>
               <a:t>?</a:t>
             </a:r>
           </a:p>
@@ -13526,34 +13489,34 @@
               </a:lnSpc>
             </a:pPr>
             <a:r>
-              <a:rPr lang="en-US" sz="1200" err="1" smtClean="0"/>
+              <a:rPr lang="en-US" sz="1200" dirty="0" err="1" smtClean="0"/>
               <a:t>Stellen</a:t>
             </a:r>
             <a:r>
-              <a:rPr lang="en-US" sz="1200" smtClean="0"/>
+              <a:rPr lang="en-US" sz="1200" dirty="0" smtClean="0"/>
               <a:t> </a:t>
             </a:r>
             <a:r>
-              <a:rPr lang="en-US" sz="1200" err="1" smtClean="0"/>
+              <a:rPr lang="en-US" sz="1200" dirty="0" err="1" smtClean="0"/>
               <a:t>gemeinsames</a:t>
             </a:r>
             <a:r>
-              <a:rPr lang="en-US" sz="1200" smtClean="0"/>
+              <a:rPr lang="en-US" sz="1200" dirty="0" smtClean="0"/>
               <a:t> </a:t>
             </a:r>
             <a:r>
-              <a:rPr lang="en-US" sz="1200" err="1" smtClean="0"/>
+              <a:rPr lang="en-US" sz="1200" dirty="0" err="1" smtClean="0"/>
               <a:t>Verständnis</a:t>
             </a:r>
             <a:r>
-              <a:rPr lang="en-US" sz="1200" smtClean="0"/>
+              <a:rPr lang="en-US" sz="1200" dirty="0" smtClean="0"/>
               <a:t> </a:t>
             </a:r>
             <a:r>
-              <a:rPr lang="en-US" sz="1200" err="1" smtClean="0"/>
+              <a:rPr lang="en-US" sz="1200" dirty="0" err="1" smtClean="0"/>
               <a:t>sicher</a:t>
             </a:r>
-            <a:endParaRPr lang="en-US" sz="1200" smtClean="0"/>
+            <a:endParaRPr lang="en-US" sz="1200" dirty="0" smtClean="0"/>
           </a:p>
           <a:p>
             <a:pPr lvl="2">
@@ -13562,66 +13525,66 @@
               </a:lnSpc>
             </a:pPr>
             <a:r>
-              <a:rPr lang="en-US" sz="1200" err="1" smtClean="0"/>
+              <a:rPr lang="en-US" sz="1200" dirty="0" err="1" smtClean="0"/>
               <a:t>Eine</a:t>
             </a:r>
             <a:r>
-              <a:rPr lang="en-US" sz="1200" smtClean="0"/>
+              <a:rPr lang="en-US" sz="1200" dirty="0" smtClean="0"/>
               <a:t> Persona </a:t>
             </a:r>
             <a:r>
-              <a:rPr lang="en-US" sz="1200" err="1" smtClean="0"/>
+              <a:rPr lang="en-US" sz="1200" dirty="0" err="1" smtClean="0"/>
               <a:t>steht</a:t>
             </a:r>
             <a:r>
-              <a:rPr lang="en-US" sz="1200" smtClean="0"/>
+              <a:rPr lang="en-US" sz="1200" dirty="0" smtClean="0"/>
               <a:t> </a:t>
             </a:r>
             <a:r>
-              <a:rPr lang="en-US" sz="1200" err="1" smtClean="0"/>
+              <a:rPr lang="en-US" sz="1200" dirty="0" err="1" smtClean="0"/>
               <a:t>stellvertrend</a:t>
             </a:r>
             <a:r>
-              <a:rPr lang="en-US" sz="1200" smtClean="0"/>
+              <a:rPr lang="en-US" sz="1200" dirty="0" smtClean="0"/>
               <a:t> </a:t>
             </a:r>
             <a:r>
-              <a:rPr lang="en-US" sz="1200" err="1" smtClean="0"/>
+              <a:rPr lang="en-US" sz="1200" dirty="0" err="1" smtClean="0"/>
               <a:t>für</a:t>
             </a:r>
             <a:r>
-              <a:rPr lang="en-US" sz="1200" smtClean="0"/>
+              <a:rPr lang="en-US" sz="1200" dirty="0" smtClean="0"/>
               <a:t> </a:t>
             </a:r>
             <a:r>
-              <a:rPr lang="en-US" sz="1200" err="1" smtClean="0"/>
+              <a:rPr lang="en-US" sz="1200" dirty="0" err="1" smtClean="0"/>
               <a:t>eine</a:t>
             </a:r>
             <a:r>
-              <a:rPr lang="en-US" sz="1200" smtClean="0"/>
+              <a:rPr lang="en-US" sz="1200" dirty="0" smtClean="0"/>
               <a:t> </a:t>
             </a:r>
             <a:r>
-              <a:rPr lang="en-US" sz="1200" err="1" smtClean="0"/>
+              <a:rPr lang="en-US" sz="1200" dirty="0" err="1" smtClean="0"/>
               <a:t>größere</a:t>
             </a:r>
             <a:r>
-              <a:rPr lang="en-US" sz="1200" smtClean="0"/>
+              <a:rPr lang="en-US" sz="1200" dirty="0" smtClean="0"/>
               <a:t> </a:t>
             </a:r>
             <a:r>
-              <a:rPr lang="en-US" sz="1200" err="1" smtClean="0"/>
+              <a:rPr lang="en-US" sz="1200" dirty="0" err="1" smtClean="0"/>
               <a:t>Klasse</a:t>
             </a:r>
             <a:r>
-              <a:rPr lang="en-US" sz="1200" smtClean="0"/>
+              <a:rPr lang="en-US" sz="1200" dirty="0" smtClean="0"/>
               <a:t> von </a:t>
             </a:r>
             <a:r>
-              <a:rPr lang="en-US" sz="1200" err="1" smtClean="0"/>
+              <a:rPr lang="en-US" sz="1200" dirty="0" err="1" smtClean="0"/>
               <a:t>Nutzern</a:t>
             </a:r>
-            <a:endParaRPr lang="en-US" sz="1200" smtClean="0"/>
+            <a:endParaRPr lang="en-US" sz="1200" dirty="0" smtClean="0"/>
           </a:p>
         </p:txBody>
       </p:sp>

</xml_diff>